<commit_message>
Updating powerpoint comments, adding a contact slide at the end
</commit_message>
<xml_diff>
--- a/JointSpeakerTalks/PhoneGapXamarin/M3Conf2013/PhoneGap and Xamarin.pptx
+++ b/JointSpeakerTalks/PhoneGapXamarin/M3Conf2013/PhoneGap and Xamarin.pptx
@@ -124,7 +124,7 @@
   </p:defaultTextStyle>
   <p:extLst>
     <p:ext uri="{EFAFB233-063F-42B5-8137-9DF3F51BA10A}">
-      <p15:sldGuideLst xmlns:p15="http://schemas.microsoft.com/office/powerpoint/2012/main">
+      <p15:sldGuideLst xmlns:p15="http://schemas.microsoft.com/office/powerpoint/2012/main" xmlns="">
         <p15:guide id="1" orient="horz" pos="2160">
           <p15:clr>
             <a:srgbClr val="A4A3A4"/>
@@ -223,7 +223,8 @@
           <a:p>
             <a:fld id="{3471AF3C-204D-4F74-AA97-D43D4FF73362}" type="datetimeFigureOut">
               <a:rPr lang="en-US" smtClean="0"/>
-              <a:t>10/21/2013</a:t>
+              <a:pPr/>
+              <a:t>10/22/2013</a:t>
             </a:fld>
             <a:endParaRPr lang="en-US"/>
           </a:p>
@@ -384,6 +385,7 @@
           <a:p>
             <a:fld id="{B9DFB3AD-BC26-4EB1-9A72-FD37058C7E87}" type="slidenum">
               <a:rPr lang="en-US" smtClean="0"/>
+              <a:pPr/>
               <a:t>‹#›</a:t>
             </a:fld>
             <a:endParaRPr lang="en-US"/>
@@ -393,7 +395,7 @@
     </p:spTree>
     <p:extLst>
       <p:ext uri="{BB962C8B-B14F-4D97-AF65-F5344CB8AC3E}">
-        <p14:creationId xmlns:p14="http://schemas.microsoft.com/office/powerpoint/2010/main" val="1411853916"/>
+        <p14:creationId xmlns:p14="http://schemas.microsoft.com/office/powerpoint/2010/main" xmlns="" val="1411853916"/>
       </p:ext>
     </p:extLst>
   </p:cSld>
@@ -560,6 +562,7 @@
           <a:p>
             <a:fld id="{B9DFB3AD-BC26-4EB1-9A72-FD37058C7E87}" type="slidenum">
               <a:rPr lang="en-US" smtClean="0"/>
+              <a:pPr/>
               <a:t>2</a:t>
             </a:fld>
             <a:endParaRPr lang="en-US"/>
@@ -569,7 +572,7 @@
     </p:spTree>
     <p:extLst>
       <p:ext uri="{BB962C8B-B14F-4D97-AF65-F5344CB8AC3E}">
-        <p14:creationId xmlns:p14="http://schemas.microsoft.com/office/powerpoint/2010/main" val="3453155578"/>
+        <p14:creationId xmlns:p14="http://schemas.microsoft.com/office/powerpoint/2010/main" xmlns="" val="3453155578"/>
       </p:ext>
     </p:extLst>
   </p:cSld>
@@ -646,6 +649,7 @@
           <a:p>
             <a:fld id="{B9DFB3AD-BC26-4EB1-9A72-FD37058C7E87}" type="slidenum">
               <a:rPr lang="en-US" smtClean="0"/>
+              <a:pPr/>
               <a:t>3</a:t>
             </a:fld>
             <a:endParaRPr lang="en-US"/>
@@ -655,7 +659,7 @@
     </p:spTree>
     <p:extLst>
       <p:ext uri="{BB962C8B-B14F-4D97-AF65-F5344CB8AC3E}">
-        <p14:creationId xmlns:p14="http://schemas.microsoft.com/office/powerpoint/2010/main" val="2469189636"/>
+        <p14:creationId xmlns:p14="http://schemas.microsoft.com/office/powerpoint/2010/main" xmlns="" val="2469189636"/>
       </p:ext>
     </p:extLst>
   </p:cSld>
@@ -711,124 +715,6 @@
           </a:bodyPr>
           <a:lstStyle/>
           <a:p>
-            <a:pPr marL="0" marR="0" indent="0" algn="l" defTabSz="914400" rtl="0" eaLnBrk="1" fontAlgn="auto" latinLnBrk="0" hangingPunct="1">
-              <a:lnSpc>
-                <a:spcPct val="100000"/>
-              </a:lnSpc>
-              <a:spcBef>
-                <a:spcPts val="0"/>
-              </a:spcBef>
-              <a:spcAft>
-                <a:spcPts val="0"/>
-              </a:spcAft>
-              <a:buClrTx/>
-              <a:buSzTx/>
-              <a:buFontTx/>
-              <a:buNone/>
-              <a:tabLst/>
-              <a:defRPr/>
-            </a:pPr>
-            <a:r>
-              <a:rPr lang="en-US" dirty="0" err="1" smtClean="0"/>
-              <a:t>PhoneGap</a:t>
-            </a:r>
-            <a:r>
-              <a:rPr lang="en-US" dirty="0" smtClean="0"/>
-              <a:t> is an open source framework for creating mobile apps using a single codebase that can deploy across the major mobile platforms – </a:t>
-            </a:r>
-            <a:r>
-              <a:rPr lang="en-US" dirty="0" err="1" smtClean="0"/>
-              <a:t>iOS</a:t>
-            </a:r>
-            <a:r>
-              <a:rPr lang="en-US" dirty="0" smtClean="0"/>
-              <a:t>, Android, Windows Phone, Blackberry, and </a:t>
-            </a:r>
-            <a:r>
-              <a:rPr lang="en-US" dirty="0" err="1" smtClean="0"/>
-              <a:t>webOS</a:t>
-            </a:r>
-            <a:r>
-              <a:rPr lang="en-US" dirty="0" smtClean="0"/>
-              <a:t>.</a:t>
-            </a:r>
-          </a:p>
-          <a:p>
-            <a:pPr marL="0" marR="0" indent="0" algn="l" defTabSz="914400" rtl="0" eaLnBrk="1" fontAlgn="auto" latinLnBrk="0" hangingPunct="1">
-              <a:lnSpc>
-                <a:spcPct val="100000"/>
-              </a:lnSpc>
-              <a:spcBef>
-                <a:spcPts val="0"/>
-              </a:spcBef>
-              <a:spcAft>
-                <a:spcPts val="0"/>
-              </a:spcAft>
-              <a:buClrTx/>
-              <a:buSzTx/>
-              <a:buFontTx/>
-              <a:buNone/>
-              <a:tabLst/>
-              <a:defRPr/>
-            </a:pPr>
-            <a:endParaRPr lang="en-US" dirty="0" smtClean="0"/>
-          </a:p>
-          <a:p>
-            <a:pPr marL="0" marR="0" indent="0" algn="l" defTabSz="914400" rtl="0" eaLnBrk="1" fontAlgn="auto" latinLnBrk="0" hangingPunct="1">
-              <a:lnSpc>
-                <a:spcPct val="100000"/>
-              </a:lnSpc>
-              <a:spcBef>
-                <a:spcPts val="0"/>
-              </a:spcBef>
-              <a:spcAft>
-                <a:spcPts val="0"/>
-              </a:spcAft>
-              <a:buClrTx/>
-              <a:buSzTx/>
-              <a:buFontTx/>
-              <a:buNone/>
-              <a:tabLst/>
-              <a:defRPr/>
-            </a:pPr>
-            <a:r>
-              <a:rPr lang="en-US" dirty="0" smtClean="0"/>
-              <a:t>There are multiple frameworks for creating cross-platform mobile applications, including </a:t>
-            </a:r>
-            <a:r>
-              <a:rPr lang="en-US" dirty="0" err="1" smtClean="0"/>
-              <a:t>Xamarin</a:t>
-            </a:r>
-            <a:r>
-              <a:rPr lang="en-US" baseline="0" dirty="0" smtClean="0"/>
-              <a:t> and app </a:t>
-            </a:r>
-            <a:r>
-              <a:rPr lang="en-US" baseline="0" dirty="0" err="1" smtClean="0"/>
-              <a:t>Mobi</a:t>
-            </a:r>
-            <a:r>
-              <a:rPr lang="en-US" baseline="0" dirty="0" smtClean="0"/>
-              <a:t>,</a:t>
-            </a:r>
-            <a:r>
-              <a:rPr lang="en-US" dirty="0" smtClean="0"/>
-              <a:t> so what makes </a:t>
-            </a:r>
-            <a:r>
-              <a:rPr lang="en-US" dirty="0" err="1" smtClean="0"/>
-              <a:t>PhoneGap</a:t>
-            </a:r>
-            <a:r>
-              <a:rPr lang="en-US" dirty="0" smtClean="0"/>
-              <a:t> different?  For one, the technologies</a:t>
-            </a:r>
-            <a:r>
-              <a:rPr lang="en-US" baseline="0" dirty="0" smtClean="0"/>
-              <a:t> are different.  Consider the major mobile platforms.</a:t>
-            </a:r>
-          </a:p>
-          <a:p>
             <a:endParaRPr lang="en-US" dirty="0"/>
           </a:p>
         </p:txBody>
@@ -850,6 +736,7 @@
           <a:p>
             <a:fld id="{B9DFB3AD-BC26-4EB1-9A72-FD37058C7E87}" type="slidenum">
               <a:rPr lang="en-US" smtClean="0"/>
+              <a:pPr/>
               <a:t>6</a:t>
             </a:fld>
             <a:endParaRPr lang="en-US"/>
@@ -859,7 +746,7 @@
     </p:spTree>
     <p:extLst>
       <p:ext uri="{BB962C8B-B14F-4D97-AF65-F5344CB8AC3E}">
-        <p14:creationId xmlns:p14="http://schemas.microsoft.com/office/powerpoint/2010/main" val="3078225192"/>
+        <p14:creationId xmlns:p14="http://schemas.microsoft.com/office/powerpoint/2010/main" xmlns="" val="3078225192"/>
       </p:ext>
     </p:extLst>
   </p:cSld>
@@ -1044,6 +931,7 @@
           <a:p>
             <a:fld id="{B9DFB3AD-BC26-4EB1-9A72-FD37058C7E87}" type="slidenum">
               <a:rPr lang="en-US" smtClean="0"/>
+              <a:pPr/>
               <a:t>7</a:t>
             </a:fld>
             <a:endParaRPr lang="en-US"/>
@@ -1053,7 +941,7 @@
     </p:spTree>
     <p:extLst>
       <p:ext uri="{BB962C8B-B14F-4D97-AF65-F5344CB8AC3E}">
-        <p14:creationId xmlns:p14="http://schemas.microsoft.com/office/powerpoint/2010/main" val="3095546884"/>
+        <p14:creationId xmlns:p14="http://schemas.microsoft.com/office/powerpoint/2010/main" xmlns="" val="3095546884"/>
       </p:ext>
     </p:extLst>
   </p:cSld>
@@ -1222,6 +1110,7 @@
           <a:p>
             <a:fld id="{B9DFB3AD-BC26-4EB1-9A72-FD37058C7E87}" type="slidenum">
               <a:rPr lang="en-US" smtClean="0"/>
+              <a:pPr/>
               <a:t>9</a:t>
             </a:fld>
             <a:endParaRPr lang="en-US"/>
@@ -1231,7 +1120,7 @@
     </p:spTree>
     <p:extLst>
       <p:ext uri="{BB962C8B-B14F-4D97-AF65-F5344CB8AC3E}">
-        <p14:creationId xmlns:p14="http://schemas.microsoft.com/office/powerpoint/2010/main" val="2980022477"/>
+        <p14:creationId xmlns:p14="http://schemas.microsoft.com/office/powerpoint/2010/main" xmlns="" val="2980022477"/>
       </p:ext>
     </p:extLst>
   </p:cSld>
@@ -1287,181 +1176,8 @@
           </a:bodyPr>
           <a:lstStyle/>
           <a:p>
-            <a:pPr marL="0" marR="0" indent="0" algn="l" defTabSz="914400" rtl="0" eaLnBrk="1" fontAlgn="auto" latinLnBrk="0" hangingPunct="1">
-              <a:lnSpc>
-                <a:spcPct val="100000"/>
-              </a:lnSpc>
-              <a:spcBef>
-                <a:spcPts val="0"/>
-              </a:spcBef>
-              <a:spcAft>
-                <a:spcPts val="0"/>
-              </a:spcAft>
-              <a:buClrTx/>
-              <a:buSzTx/>
-              <a:buFontTx/>
-              <a:buNone/>
-              <a:tabLst/>
-              <a:defRPr/>
-            </a:pPr>
-            <a:r>
-              <a:rPr lang="en-US" dirty="0" smtClean="0"/>
-              <a:t>Once you’re ready to get started, it’s very easy to begin development on a </a:t>
-            </a:r>
-            <a:r>
-              <a:rPr lang="en-US" dirty="0" err="1" smtClean="0"/>
-              <a:t>PhoneGap</a:t>
-            </a:r>
-            <a:r>
-              <a:rPr lang="en-US" dirty="0" smtClean="0"/>
-              <a:t> app.</a:t>
-            </a:r>
-          </a:p>
-          <a:p>
-            <a:endParaRPr lang="en-US" dirty="0" smtClean="0"/>
-          </a:p>
-          <a:p>
-            <a:r>
-              <a:rPr lang="en-US" dirty="0" smtClean="0"/>
-              <a:t>The prerequisite to all of this is, of course, the Windows Phone SDK and the latest copy of </a:t>
-            </a:r>
-            <a:r>
-              <a:rPr lang="en-US" dirty="0" err="1" smtClean="0"/>
-              <a:t>PhoneGap</a:t>
-            </a:r>
-            <a:r>
-              <a:rPr lang="en-US" dirty="0" smtClean="0"/>
-              <a:t> extracted to some</a:t>
-            </a:r>
-            <a:r>
-              <a:rPr lang="en-US" baseline="0" dirty="0" smtClean="0"/>
-              <a:t> location on your machine.</a:t>
-            </a:r>
-            <a:endParaRPr lang="en-US" dirty="0" smtClean="0"/>
-          </a:p>
-          <a:p>
             <a:endParaRPr lang="en-US" baseline="0" dirty="0" smtClean="0"/>
           </a:p>
-          <a:p>
-            <a:r>
-              <a:rPr lang="en-US" baseline="0" dirty="0" smtClean="0"/>
-              <a:t>In the lib directory of the </a:t>
-            </a:r>
-            <a:r>
-              <a:rPr lang="en-US" baseline="0" dirty="0" err="1" smtClean="0"/>
-              <a:t>PhoneGap</a:t>
-            </a:r>
-            <a:r>
-              <a:rPr lang="en-US" baseline="0" dirty="0" smtClean="0"/>
-              <a:t> download is a Visual Studio template file, which you will copy into your Visual Studio project templates folder.</a:t>
-            </a:r>
-          </a:p>
-          <a:p>
-            <a:endParaRPr lang="en-US" baseline="0" dirty="0" smtClean="0"/>
-          </a:p>
-          <a:p>
-            <a:r>
-              <a:rPr lang="en-US" baseline="0" dirty="0" smtClean="0"/>
-              <a:t>When you create a new project in Visual Studio, you’ll then see your Apache Cordova template, you’ll select that, and you will then be able to begin your development.</a:t>
-            </a:r>
-            <a:endParaRPr lang="en-US" dirty="0" smtClean="0"/>
-          </a:p>
-          <a:p>
-            <a:endParaRPr lang="en-US" dirty="0" smtClean="0"/>
-          </a:p>
-          <a:p>
-            <a:r>
-              <a:rPr lang="en-US" dirty="0" smtClean="0"/>
-              <a:t>Once you’ve created your project, you’ll see three key areas of note.</a:t>
-            </a:r>
-          </a:p>
-          <a:p>
-            <a:endParaRPr lang="en-US" dirty="0" smtClean="0"/>
-          </a:p>
-          <a:p>
-            <a:r>
-              <a:rPr lang="en-US" dirty="0" smtClean="0"/>
-              <a:t>First we have the www folder, which contains all of the html, </a:t>
-            </a:r>
-            <a:r>
-              <a:rPr lang="en-US" dirty="0" err="1" smtClean="0"/>
-              <a:t>javascript</a:t>
-            </a:r>
-            <a:r>
-              <a:rPr lang="en-US" dirty="0" smtClean="0"/>
-              <a:t>, and </a:t>
-            </a:r>
-            <a:r>
-              <a:rPr lang="en-US" dirty="0" err="1" smtClean="0"/>
-              <a:t>css</a:t>
-            </a:r>
-            <a:r>
-              <a:rPr lang="en-US" dirty="0" smtClean="0"/>
-              <a:t> for the app.  It also contains the cordova.js file, which contains</a:t>
-            </a:r>
-            <a:r>
-              <a:rPr lang="en-US" baseline="0" dirty="0" smtClean="0"/>
-              <a:t> the necessary </a:t>
-            </a:r>
-            <a:r>
-              <a:rPr lang="en-US" baseline="0" dirty="0" err="1" smtClean="0"/>
-              <a:t>javascript</a:t>
-            </a:r>
-            <a:r>
-              <a:rPr lang="en-US" baseline="0" dirty="0" smtClean="0"/>
-              <a:t> to launch your app.</a:t>
-            </a:r>
-          </a:p>
-          <a:p>
-            <a:endParaRPr lang="en-US" baseline="0" dirty="0" smtClean="0"/>
-          </a:p>
-          <a:p>
-            <a:r>
-              <a:rPr lang="en-US" baseline="0" dirty="0" smtClean="0"/>
-              <a:t>You’ll also see that you have the same manifest files you have when you’re developing specifically for Windows Phone.  When you go to build your app for multiple platforms, the information in this manifest will be used in the packaging information for other platforms as well.</a:t>
-            </a:r>
-            <a:endParaRPr lang="en-US" dirty="0" smtClean="0"/>
-          </a:p>
-          <a:p>
-            <a:endParaRPr lang="en-US" dirty="0" smtClean="0"/>
-          </a:p>
-          <a:p>
-            <a:r>
-              <a:rPr lang="en-US" dirty="0" smtClean="0"/>
-              <a:t>Finally, you’ll see a list of </a:t>
-            </a:r>
-            <a:r>
-              <a:rPr lang="en-US" dirty="0" err="1" smtClean="0"/>
-              <a:t>plugins</a:t>
-            </a:r>
-            <a:r>
-              <a:rPr lang="en-US" dirty="0" smtClean="0"/>
-              <a:t>.  These</a:t>
-            </a:r>
-            <a:r>
-              <a:rPr lang="en-US" baseline="0" dirty="0" smtClean="0"/>
-              <a:t> give you the ability to do things like </a:t>
-            </a:r>
-            <a:r>
-              <a:rPr lang="en-US" dirty="0" smtClean="0"/>
-              <a:t>interact</a:t>
-            </a:r>
-            <a:r>
-              <a:rPr lang="en-US" baseline="0" dirty="0" smtClean="0"/>
-              <a:t> with your device’s camera or contact list, launch another web browser, set up app notifications, and do the same kinds of things you could do if you were developing for a particular mobile device.  The nice thing here is that you don’t have to maintain that device-specific functionality yourself, and you can use what’s already in the box.  While the files in this solution are written in C#, you’ll be writing API calls in your </a:t>
-            </a:r>
-            <a:r>
-              <a:rPr lang="en-US" baseline="0" dirty="0" err="1" smtClean="0"/>
-              <a:t>javascript</a:t>
-            </a:r>
-            <a:r>
-              <a:rPr lang="en-US" baseline="0" dirty="0" smtClean="0"/>
-              <a:t> to take advantage of this functionality on each platform. </a:t>
-            </a:r>
-          </a:p>
-          <a:p>
-            <a:endParaRPr lang="en-US" baseline="0" dirty="0" smtClean="0"/>
-          </a:p>
         </p:txBody>
       </p:sp>
       <p:sp>
@@ -1481,6 +1197,7 @@
           <a:p>
             <a:fld id="{B9DFB3AD-BC26-4EB1-9A72-FD37058C7E87}" type="slidenum">
               <a:rPr lang="en-US" smtClean="0"/>
+              <a:pPr/>
               <a:t>10</a:t>
             </a:fld>
             <a:endParaRPr lang="en-US"/>
@@ -1490,7 +1207,7 @@
     </p:spTree>
     <p:extLst>
       <p:ext uri="{BB962C8B-B14F-4D97-AF65-F5344CB8AC3E}">
-        <p14:creationId xmlns:p14="http://schemas.microsoft.com/office/powerpoint/2010/main" val="1850633223"/>
+        <p14:creationId xmlns:p14="http://schemas.microsoft.com/office/powerpoint/2010/main" xmlns="" val="1850633223"/>
       </p:ext>
     </p:extLst>
   </p:cSld>
@@ -1596,6 +1313,7 @@
           <a:p>
             <a:fld id="{B9DFB3AD-BC26-4EB1-9A72-FD37058C7E87}" type="slidenum">
               <a:rPr lang="en-US" smtClean="0"/>
+              <a:pPr/>
               <a:t>12</a:t>
             </a:fld>
             <a:endParaRPr lang="en-US"/>
@@ -1605,7 +1323,7 @@
     </p:spTree>
     <p:extLst>
       <p:ext uri="{BB962C8B-B14F-4D97-AF65-F5344CB8AC3E}">
-        <p14:creationId xmlns:p14="http://schemas.microsoft.com/office/powerpoint/2010/main" val="3915659578"/>
+        <p14:creationId xmlns:p14="http://schemas.microsoft.com/office/powerpoint/2010/main" xmlns="" val="3915659578"/>
       </p:ext>
     </p:extLst>
   </p:cSld>
@@ -1711,6 +1429,7 @@
           <a:p>
             <a:fld id="{B9DFB3AD-BC26-4EB1-9A72-FD37058C7E87}" type="slidenum">
               <a:rPr lang="en-US" smtClean="0"/>
+              <a:pPr/>
               <a:t>14</a:t>
             </a:fld>
             <a:endParaRPr lang="en-US"/>
@@ -1720,7 +1439,7 @@
     </p:spTree>
     <p:extLst>
       <p:ext uri="{BB962C8B-B14F-4D97-AF65-F5344CB8AC3E}">
-        <p14:creationId xmlns:p14="http://schemas.microsoft.com/office/powerpoint/2010/main" val="1688177331"/>
+        <p14:creationId xmlns:p14="http://schemas.microsoft.com/office/powerpoint/2010/main" xmlns="" val="1688177331"/>
       </p:ext>
     </p:extLst>
   </p:cSld>
@@ -1911,7 +1630,8 @@
           <a:p>
             <a:fld id="{8B3E8EF2-3A3D-4AB5-885C-BDF5384941A8}" type="datetimeFigureOut">
               <a:rPr lang="en-US" smtClean="0"/>
-              <a:t>10/21/2013</a:t>
+              <a:pPr/>
+              <a:t>10/22/2013</a:t>
             </a:fld>
             <a:endParaRPr lang="en-US"/>
           </a:p>
@@ -1953,6 +1673,7 @@
           <a:p>
             <a:fld id="{0FC4F668-7ED2-4D43-A73A-1C5062429D48}" type="slidenum">
               <a:rPr lang="en-US" smtClean="0"/>
+              <a:pPr/>
               <a:t>‹#›</a:t>
             </a:fld>
             <a:endParaRPr lang="en-US"/>
@@ -2076,7 +1797,8 @@
           <a:p>
             <a:fld id="{8B3E8EF2-3A3D-4AB5-885C-BDF5384941A8}" type="datetimeFigureOut">
               <a:rPr lang="en-US" smtClean="0"/>
-              <a:t>10/21/2013</a:t>
+              <a:pPr/>
+              <a:t>10/22/2013</a:t>
             </a:fld>
             <a:endParaRPr lang="en-US"/>
           </a:p>
@@ -2118,6 +1840,7 @@
           <a:p>
             <a:fld id="{0FC4F668-7ED2-4D43-A73A-1C5062429D48}" type="slidenum">
               <a:rPr lang="en-US" smtClean="0"/>
+              <a:pPr/>
               <a:t>‹#›</a:t>
             </a:fld>
             <a:endParaRPr lang="en-US"/>
@@ -2251,7 +1974,8 @@
           <a:p>
             <a:fld id="{8B3E8EF2-3A3D-4AB5-885C-BDF5384941A8}" type="datetimeFigureOut">
               <a:rPr lang="en-US" smtClean="0"/>
-              <a:t>10/21/2013</a:t>
+              <a:pPr/>
+              <a:t>10/22/2013</a:t>
             </a:fld>
             <a:endParaRPr lang="en-US"/>
           </a:p>
@@ -2293,6 +2017,7 @@
           <a:p>
             <a:fld id="{0FC4F668-7ED2-4D43-A73A-1C5062429D48}" type="slidenum">
               <a:rPr lang="en-US" smtClean="0"/>
+              <a:pPr/>
               <a:t>‹#›</a:t>
             </a:fld>
             <a:endParaRPr lang="en-US"/>
@@ -2416,7 +2141,8 @@
           <a:p>
             <a:fld id="{8B3E8EF2-3A3D-4AB5-885C-BDF5384941A8}" type="datetimeFigureOut">
               <a:rPr lang="en-US" smtClean="0"/>
-              <a:t>10/21/2013</a:t>
+              <a:pPr/>
+              <a:t>10/22/2013</a:t>
             </a:fld>
             <a:endParaRPr lang="en-US"/>
           </a:p>
@@ -2458,6 +2184,7 @@
           <a:p>
             <a:fld id="{0FC4F668-7ED2-4D43-A73A-1C5062429D48}" type="slidenum">
               <a:rPr lang="en-US" smtClean="0"/>
+              <a:pPr/>
               <a:t>‹#›</a:t>
             </a:fld>
             <a:endParaRPr lang="en-US"/>
@@ -2657,7 +2384,8 @@
           <a:p>
             <a:fld id="{8B3E8EF2-3A3D-4AB5-885C-BDF5384941A8}" type="datetimeFigureOut">
               <a:rPr lang="en-US" smtClean="0"/>
-              <a:t>10/21/2013</a:t>
+              <a:pPr/>
+              <a:t>10/22/2013</a:t>
             </a:fld>
             <a:endParaRPr lang="en-US"/>
           </a:p>
@@ -2699,6 +2427,7 @@
           <a:p>
             <a:fld id="{0FC4F668-7ED2-4D43-A73A-1C5062429D48}" type="slidenum">
               <a:rPr lang="en-US" smtClean="0"/>
+              <a:pPr/>
               <a:t>‹#›</a:t>
             </a:fld>
             <a:endParaRPr lang="en-US"/>
@@ -2940,7 +2669,8 @@
           <a:p>
             <a:fld id="{8B3E8EF2-3A3D-4AB5-885C-BDF5384941A8}" type="datetimeFigureOut">
               <a:rPr lang="en-US" smtClean="0"/>
-              <a:t>10/21/2013</a:t>
+              <a:pPr/>
+              <a:t>10/22/2013</a:t>
             </a:fld>
             <a:endParaRPr lang="en-US"/>
           </a:p>
@@ -2982,6 +2712,7 @@
           <a:p>
             <a:fld id="{0FC4F668-7ED2-4D43-A73A-1C5062429D48}" type="slidenum">
               <a:rPr lang="en-US" smtClean="0"/>
+              <a:pPr/>
               <a:t>‹#›</a:t>
             </a:fld>
             <a:endParaRPr lang="en-US"/>
@@ -3357,7 +3088,8 @@
           <a:p>
             <a:fld id="{8B3E8EF2-3A3D-4AB5-885C-BDF5384941A8}" type="datetimeFigureOut">
               <a:rPr lang="en-US" smtClean="0"/>
-              <a:t>10/21/2013</a:t>
+              <a:pPr/>
+              <a:t>10/22/2013</a:t>
             </a:fld>
             <a:endParaRPr lang="en-US"/>
           </a:p>
@@ -3399,6 +3131,7 @@
           <a:p>
             <a:fld id="{0FC4F668-7ED2-4D43-A73A-1C5062429D48}" type="slidenum">
               <a:rPr lang="en-US" smtClean="0"/>
+              <a:pPr/>
               <a:t>‹#›</a:t>
             </a:fld>
             <a:endParaRPr lang="en-US"/>
@@ -3470,7 +3203,8 @@
           <a:p>
             <a:fld id="{8B3E8EF2-3A3D-4AB5-885C-BDF5384941A8}" type="datetimeFigureOut">
               <a:rPr lang="en-US" smtClean="0"/>
-              <a:t>10/21/2013</a:t>
+              <a:pPr/>
+              <a:t>10/22/2013</a:t>
             </a:fld>
             <a:endParaRPr lang="en-US"/>
           </a:p>
@@ -3512,6 +3246,7 @@
           <a:p>
             <a:fld id="{0FC4F668-7ED2-4D43-A73A-1C5062429D48}" type="slidenum">
               <a:rPr lang="en-US" smtClean="0"/>
+              <a:pPr/>
               <a:t>‹#›</a:t>
             </a:fld>
             <a:endParaRPr lang="en-US"/>
@@ -3560,7 +3295,8 @@
           <a:p>
             <a:fld id="{8B3E8EF2-3A3D-4AB5-885C-BDF5384941A8}" type="datetimeFigureOut">
               <a:rPr lang="en-US" smtClean="0"/>
-              <a:t>10/21/2013</a:t>
+              <a:pPr/>
+              <a:t>10/22/2013</a:t>
             </a:fld>
             <a:endParaRPr lang="en-US"/>
           </a:p>
@@ -3602,6 +3338,7 @@
           <a:p>
             <a:fld id="{0FC4F668-7ED2-4D43-A73A-1C5062429D48}" type="slidenum">
               <a:rPr lang="en-US" smtClean="0"/>
+              <a:pPr/>
               <a:t>‹#›</a:t>
             </a:fld>
             <a:endParaRPr lang="en-US"/>
@@ -3832,7 +3569,8 @@
           <a:p>
             <a:fld id="{8B3E8EF2-3A3D-4AB5-885C-BDF5384941A8}" type="datetimeFigureOut">
               <a:rPr lang="en-US" smtClean="0"/>
-              <a:t>10/21/2013</a:t>
+              <a:pPr/>
+              <a:t>10/22/2013</a:t>
             </a:fld>
             <a:endParaRPr lang="en-US"/>
           </a:p>
@@ -3874,6 +3612,7 @@
           <a:p>
             <a:fld id="{0FC4F668-7ED2-4D43-A73A-1C5062429D48}" type="slidenum">
               <a:rPr lang="en-US" smtClean="0"/>
+              <a:pPr/>
               <a:t>‹#›</a:t>
             </a:fld>
             <a:endParaRPr lang="en-US"/>
@@ -4080,7 +3819,8 @@
           <a:p>
             <a:fld id="{8B3E8EF2-3A3D-4AB5-885C-BDF5384941A8}" type="datetimeFigureOut">
               <a:rPr lang="en-US" smtClean="0"/>
-              <a:t>10/21/2013</a:t>
+              <a:pPr/>
+              <a:t>10/22/2013</a:t>
             </a:fld>
             <a:endParaRPr lang="en-US"/>
           </a:p>
@@ -4122,6 +3862,7 @@
           <a:p>
             <a:fld id="{0FC4F668-7ED2-4D43-A73A-1C5062429D48}" type="slidenum">
               <a:rPr lang="en-US" smtClean="0"/>
+              <a:pPr/>
               <a:t>‹#›</a:t>
             </a:fld>
             <a:endParaRPr lang="en-US"/>
@@ -4288,7 +4029,8 @@
           <a:p>
             <a:fld id="{8B3E8EF2-3A3D-4AB5-885C-BDF5384941A8}" type="datetimeFigureOut">
               <a:rPr lang="en-US" smtClean="0"/>
-              <a:t>10/21/2013</a:t>
+              <a:pPr/>
+              <a:t>10/22/2013</a:t>
             </a:fld>
             <a:endParaRPr lang="en-US"/>
           </a:p>
@@ -4366,6 +4108,7 @@
           <a:p>
             <a:fld id="{0FC4F668-7ED2-4D43-A73A-1C5062429D48}" type="slidenum">
               <a:rPr lang="en-US" smtClean="0"/>
+              <a:pPr/>
               <a:t>‹#›</a:t>
             </a:fld>
             <a:endParaRPr lang="en-US"/>
@@ -5050,7 +4793,7 @@
     </p:spTree>
     <p:extLst>
       <p:ext uri="{BB962C8B-B14F-4D97-AF65-F5344CB8AC3E}">
-        <p14:creationId xmlns:p14="http://schemas.microsoft.com/office/powerpoint/2010/main" val="4136638121"/>
+        <p14:creationId xmlns:p14="http://schemas.microsoft.com/office/powerpoint/2010/main" xmlns="" val="4136638121"/>
       </p:ext>
     </p:extLst>
   </p:cSld>
@@ -5156,7 +4899,7 @@
           <a:p>
             <a:r>
               <a:rPr lang="en-US" dirty="0" smtClean="0"/>
-              <a:t>Contact</a:t>
+              <a:t>Contact Us</a:t>
             </a:r>
             <a:endParaRPr lang="en-US" dirty="0"/>
           </a:p>
@@ -5164,7 +4907,7 @@
       </p:sp>
       <p:sp>
         <p:nvSpPr>
-          <p:cNvPr id="3" name="Content Placeholder 2"/>
+          <p:cNvPr id="6" name="Content Placeholder 5"/>
           <p:cNvSpPr>
             <a:spLocks noGrp="1"/>
           </p:cNvSpPr>
@@ -5177,6 +4920,83 @@
           <a:bodyPr/>
           <a:lstStyle/>
           <a:p>
+            <a:pPr algn="ctr">
+              <a:buNone/>
+            </a:pPr>
+            <a:r>
+              <a:rPr lang="en-US" b="1" dirty="0" err="1" smtClean="0"/>
+              <a:t>Jerrel</a:t>
+            </a:r>
+            <a:r>
+              <a:rPr lang="en-US" b="1" dirty="0" smtClean="0"/>
+              <a:t> Blankenship</a:t>
+            </a:r>
+          </a:p>
+          <a:p>
+            <a:pPr algn="ctr">
+              <a:buNone/>
+            </a:pPr>
+            <a:r>
+              <a:rPr lang="en-US" dirty="0" smtClean="0"/>
+              <a:t>@</a:t>
+            </a:r>
+            <a:r>
+              <a:rPr lang="en-US" dirty="0" err="1" smtClean="0"/>
+              <a:t>TheJerrel</a:t>
+            </a:r>
+            <a:endParaRPr lang="en-US" dirty="0" smtClean="0"/>
+          </a:p>
+          <a:p>
+            <a:pPr algn="ctr">
+              <a:buNone/>
+            </a:pPr>
+            <a:r>
+              <a:rPr lang="en-US" dirty="0" smtClean="0"/>
+              <a:t>www.jerrelblankenship.com</a:t>
+            </a:r>
+          </a:p>
+          <a:p>
+            <a:pPr algn="ctr">
+              <a:buNone/>
+            </a:pPr>
+            <a:endParaRPr lang="en-US" dirty="0" smtClean="0"/>
+          </a:p>
+          <a:p>
+            <a:pPr algn="ctr">
+              <a:buNone/>
+            </a:pPr>
+            <a:r>
+              <a:rPr lang="en-US" b="1" dirty="0" smtClean="0"/>
+              <a:t>Jamie </a:t>
+            </a:r>
+            <a:r>
+              <a:rPr lang="en-US" b="1" dirty="0" err="1" smtClean="0"/>
+              <a:t>Dicken</a:t>
+            </a:r>
+            <a:endParaRPr lang="en-US" b="1" dirty="0" smtClean="0"/>
+          </a:p>
+          <a:p>
+            <a:pPr algn="ctr">
+              <a:buNone/>
+            </a:pPr>
+            <a:r>
+              <a:rPr lang="en-US" dirty="0" smtClean="0"/>
+              <a:t>@</a:t>
+            </a:r>
+            <a:r>
+              <a:rPr lang="en-US" dirty="0" err="1" smtClean="0"/>
+              <a:t>DotNetGeekette</a:t>
+            </a:r>
+            <a:endParaRPr lang="en-US" dirty="0" smtClean="0"/>
+          </a:p>
+          <a:p>
+            <a:pPr algn="ctr">
+              <a:buNone/>
+            </a:pPr>
+            <a:r>
+              <a:rPr lang="en-US" dirty="0" smtClean="0"/>
+              <a:t>www.dotnetgeekette.com</a:t>
+            </a:r>
             <a:endParaRPr lang="en-US" dirty="0"/>
           </a:p>
         </p:txBody>
@@ -5184,7 +5004,7 @@
     </p:spTree>
     <p:extLst>
       <p:ext uri="{BB962C8B-B14F-4D97-AF65-F5344CB8AC3E}">
-        <p14:creationId xmlns:p14="http://schemas.microsoft.com/office/powerpoint/2010/main" val="4141454704"/>
+        <p14:creationId xmlns:p14="http://schemas.microsoft.com/office/powerpoint/2010/main" xmlns="" val="4141454704"/>
       </p:ext>
     </p:extLst>
   </p:cSld>
@@ -5550,7 +5370,6 @@
               <a:rPr lang="en-US" dirty="0"/>
               <a:t>I Only Want To Write It Once</a:t>
             </a:r>
-            <a:endParaRPr lang="en-US" dirty="0"/>
           </a:p>
         </p:txBody>
       </p:sp>
@@ -5647,6 +5466,19 @@
           <a:bodyPr/>
           <a:lstStyle/>
           <a:p>
+            <a:pPr algn="ctr">
+              <a:buNone/>
+            </a:pPr>
+            <a:r>
+              <a:rPr lang="en-US" dirty="0" err="1" smtClean="0"/>
+              <a:t>PhoneGap</a:t>
+            </a:r>
+            <a:endParaRPr lang="en-US" dirty="0" smtClean="0"/>
+          </a:p>
+          <a:p>
+            <a:pPr algn="ctr">
+              <a:buNone/>
+            </a:pPr>
             <a:r>
               <a:rPr lang="en-US" dirty="0" err="1" smtClean="0"/>
               <a:t>Xamarin</a:t>
@@ -5654,10 +5486,47 @@
             <a:endParaRPr lang="en-US" dirty="0" smtClean="0"/>
           </a:p>
           <a:p>
+            <a:pPr algn="ctr">
+              <a:buNone/>
+            </a:pPr>
             <a:r>
               <a:rPr lang="en-US" dirty="0" err="1" smtClean="0"/>
-              <a:t>PhoneGap</a:t>
-            </a:r>
+              <a:t>AppMobi</a:t>
+            </a:r>
+            <a:endParaRPr lang="en-US" dirty="0" smtClean="0"/>
+          </a:p>
+          <a:p>
+            <a:pPr algn="ctr">
+              <a:buNone/>
+            </a:pPr>
+            <a:r>
+              <a:rPr lang="en-US" dirty="0" smtClean="0"/>
+              <a:t>Unity</a:t>
+            </a:r>
+          </a:p>
+          <a:p>
+            <a:pPr algn="ctr">
+              <a:buNone/>
+            </a:pPr>
+            <a:r>
+              <a:rPr lang="en-US" dirty="0" err="1" smtClean="0"/>
+              <a:t>Appcelerator</a:t>
+            </a:r>
+            <a:endParaRPr lang="en-US" dirty="0" smtClean="0"/>
+          </a:p>
+          <a:p>
+            <a:pPr algn="ctr">
+              <a:buNone/>
+            </a:pPr>
+            <a:r>
+              <a:rPr lang="en-US" dirty="0" smtClean="0"/>
+              <a:t>Adobe Flex</a:t>
+            </a:r>
+          </a:p>
+          <a:p>
+            <a:pPr algn="ctr">
+              <a:buNone/>
+            </a:pPr>
             <a:endParaRPr lang="en-US" dirty="0"/>
           </a:p>
         </p:txBody>
@@ -5665,7 +5534,7 @@
     </p:spTree>
     <p:extLst>
       <p:ext uri="{BB962C8B-B14F-4D97-AF65-F5344CB8AC3E}">
-        <p14:creationId xmlns:p14="http://schemas.microsoft.com/office/powerpoint/2010/main" val="1918943846"/>
+        <p14:creationId xmlns:p14="http://schemas.microsoft.com/office/powerpoint/2010/main" xmlns="" val="1918943846"/>
       </p:ext>
     </p:extLst>
   </p:cSld>
@@ -5800,23 +5669,38 @@
           <a:bodyPr/>
           <a:lstStyle/>
           <a:p>
-            <a:pPr marL="0" indent="0" algn="ctr">
-              <a:buNone/>
-            </a:pPr>
+            <a:pPr marL="0" indent="0"/>
+            <a:r>
+              <a:rPr lang="en-US" dirty="0" smtClean="0"/>
+              <a:t>Open-source</a:t>
+            </a:r>
+          </a:p>
+          <a:p>
+            <a:pPr marL="0" indent="0"/>
+            <a:r>
+              <a:rPr lang="en-US" dirty="0" smtClean="0"/>
+              <a:t>Single codebase</a:t>
+            </a:r>
+          </a:p>
+          <a:p>
+            <a:pPr marL="0" indent="0"/>
+            <a:r>
+              <a:rPr lang="en-US" dirty="0" smtClean="0"/>
+              <a:t>Support for </a:t>
+            </a:r>
+            <a:r>
+              <a:rPr lang="en-US" dirty="0" err="1" smtClean="0"/>
+              <a:t>iOS</a:t>
+            </a:r>
+            <a:r>
+              <a:rPr lang="en-US" dirty="0" smtClean="0"/>
+              <a:t>, Android, Windows Phone, Blackberry, </a:t>
+            </a:r>
+            <a:r>
+              <a:rPr lang="en-US" dirty="0" err="1" smtClean="0"/>
+              <a:t>webOS</a:t>
+            </a:r>
             <a:endParaRPr lang="en-US" dirty="0" smtClean="0"/>
-          </a:p>
-          <a:p>
-            <a:pPr marL="0" indent="0" algn="ctr">
-              <a:buNone/>
-            </a:pPr>
-            <a:r>
-              <a:rPr lang="en-US" dirty="0" err="1" smtClean="0"/>
-              <a:t>PhoneGap</a:t>
-            </a:r>
-            <a:r>
-              <a:rPr lang="en-US" dirty="0" smtClean="0"/>
-              <a:t> is an open source framework for creating mobile apps using a single codebase that can deploy across the major mobile platforms.</a:t>
-            </a:r>
           </a:p>
         </p:txBody>
       </p:sp>

</xml_diff>

<commit_message>
made some power point changes and started on code
</commit_message>
<xml_diff>
--- a/JointSpeakerTalks/PhoneGapXamarin/M3Conf2013/PhoneGap and Xamarin.pptx
+++ b/JointSpeakerTalks/PhoneGapXamarin/M3Conf2013/PhoneGap and Xamarin.pptx
@@ -124,7 +124,7 @@
   </p:defaultTextStyle>
   <p:extLst>
     <p:ext uri="{EFAFB233-063F-42B5-8137-9DF3F51BA10A}">
-      <p15:sldGuideLst xmlns:p15="http://schemas.microsoft.com/office/powerpoint/2012/main" xmlns="">
+      <p15:sldGuideLst xmlns:p15="http://schemas.microsoft.com/office/powerpoint/2012/main">
         <p15:guide id="1" orient="horz" pos="2160">
           <p15:clr>
             <a:srgbClr val="A4A3A4"/>
@@ -224,7 +224,7 @@
             <a:fld id="{3471AF3C-204D-4F74-AA97-D43D4FF73362}" type="datetimeFigureOut">
               <a:rPr lang="en-US" smtClean="0"/>
               <a:pPr/>
-              <a:t>10/22/2013</a:t>
+              <a:t>10/23/2013</a:t>
             </a:fld>
             <a:endParaRPr lang="en-US"/>
           </a:p>
@@ -395,7 +395,7 @@
     </p:spTree>
     <p:extLst>
       <p:ext uri="{BB962C8B-B14F-4D97-AF65-F5344CB8AC3E}">
-        <p14:creationId xmlns:p14="http://schemas.microsoft.com/office/powerpoint/2010/main" xmlns="" val="1411853916"/>
+        <p14:creationId xmlns:p14="http://schemas.microsoft.com/office/powerpoint/2010/main" val="1411853916"/>
       </p:ext>
     </p:extLst>
   </p:cSld>
@@ -572,7 +572,7 @@
     </p:spTree>
     <p:extLst>
       <p:ext uri="{BB962C8B-B14F-4D97-AF65-F5344CB8AC3E}">
-        <p14:creationId xmlns:p14="http://schemas.microsoft.com/office/powerpoint/2010/main" xmlns="" val="3453155578"/>
+        <p14:creationId xmlns:p14="http://schemas.microsoft.com/office/powerpoint/2010/main" val="3453155578"/>
       </p:ext>
     </p:extLst>
   </p:cSld>
@@ -659,7 +659,7 @@
     </p:spTree>
     <p:extLst>
       <p:ext uri="{BB962C8B-B14F-4D97-AF65-F5344CB8AC3E}">
-        <p14:creationId xmlns:p14="http://schemas.microsoft.com/office/powerpoint/2010/main" xmlns="" val="2469189636"/>
+        <p14:creationId xmlns:p14="http://schemas.microsoft.com/office/powerpoint/2010/main" val="2469189636"/>
       </p:ext>
     </p:extLst>
   </p:cSld>
@@ -746,7 +746,7 @@
     </p:spTree>
     <p:extLst>
       <p:ext uri="{BB962C8B-B14F-4D97-AF65-F5344CB8AC3E}">
-        <p14:creationId xmlns:p14="http://schemas.microsoft.com/office/powerpoint/2010/main" xmlns="" val="3078225192"/>
+        <p14:creationId xmlns:p14="http://schemas.microsoft.com/office/powerpoint/2010/main" val="3078225192"/>
       </p:ext>
     </p:extLst>
   </p:cSld>
@@ -941,7 +941,7 @@
     </p:spTree>
     <p:extLst>
       <p:ext uri="{BB962C8B-B14F-4D97-AF65-F5344CB8AC3E}">
-        <p14:creationId xmlns:p14="http://schemas.microsoft.com/office/powerpoint/2010/main" xmlns="" val="3095546884"/>
+        <p14:creationId xmlns:p14="http://schemas.microsoft.com/office/powerpoint/2010/main" val="3095546884"/>
       </p:ext>
     </p:extLst>
   </p:cSld>
@@ -1120,7 +1120,7 @@
     </p:spTree>
     <p:extLst>
       <p:ext uri="{BB962C8B-B14F-4D97-AF65-F5344CB8AC3E}">
-        <p14:creationId xmlns:p14="http://schemas.microsoft.com/office/powerpoint/2010/main" xmlns="" val="2980022477"/>
+        <p14:creationId xmlns:p14="http://schemas.microsoft.com/office/powerpoint/2010/main" val="2980022477"/>
       </p:ext>
     </p:extLst>
   </p:cSld>
@@ -1172,7 +1172,7 @@
         <p:spPr/>
         <p:txBody>
           <a:bodyPr>
-            <a:normAutofit fontScale="92500" lnSpcReduction="20000"/>
+            <a:normAutofit/>
           </a:bodyPr>
           <a:lstStyle/>
           <a:p>
@@ -1207,7 +1207,7 @@
     </p:spTree>
     <p:extLst>
       <p:ext uri="{BB962C8B-B14F-4D97-AF65-F5344CB8AC3E}">
-        <p14:creationId xmlns:p14="http://schemas.microsoft.com/office/powerpoint/2010/main" xmlns="" val="1850633223"/>
+        <p14:creationId xmlns:p14="http://schemas.microsoft.com/office/powerpoint/2010/main" val="1850633223"/>
       </p:ext>
     </p:extLst>
   </p:cSld>
@@ -1323,7 +1323,7 @@
     </p:spTree>
     <p:extLst>
       <p:ext uri="{BB962C8B-B14F-4D97-AF65-F5344CB8AC3E}">
-        <p14:creationId xmlns:p14="http://schemas.microsoft.com/office/powerpoint/2010/main" xmlns="" val="3915659578"/>
+        <p14:creationId xmlns:p14="http://schemas.microsoft.com/office/powerpoint/2010/main" val="3915659578"/>
       </p:ext>
     </p:extLst>
   </p:cSld>
@@ -1439,7 +1439,7 @@
     </p:spTree>
     <p:extLst>
       <p:ext uri="{BB962C8B-B14F-4D97-AF65-F5344CB8AC3E}">
-        <p14:creationId xmlns:p14="http://schemas.microsoft.com/office/powerpoint/2010/main" xmlns="" val="1688177331"/>
+        <p14:creationId xmlns:p14="http://schemas.microsoft.com/office/powerpoint/2010/main" val="1688177331"/>
       </p:ext>
     </p:extLst>
   </p:cSld>
@@ -1631,7 +1631,7 @@
             <a:fld id="{8B3E8EF2-3A3D-4AB5-885C-BDF5384941A8}" type="datetimeFigureOut">
               <a:rPr lang="en-US" smtClean="0"/>
               <a:pPr/>
-              <a:t>10/22/2013</a:t>
+              <a:t>10/23/2013</a:t>
             </a:fld>
             <a:endParaRPr lang="en-US"/>
           </a:p>
@@ -1798,7 +1798,7 @@
             <a:fld id="{8B3E8EF2-3A3D-4AB5-885C-BDF5384941A8}" type="datetimeFigureOut">
               <a:rPr lang="en-US" smtClean="0"/>
               <a:pPr/>
-              <a:t>10/22/2013</a:t>
+              <a:t>10/23/2013</a:t>
             </a:fld>
             <a:endParaRPr lang="en-US"/>
           </a:p>
@@ -1975,7 +1975,7 @@
             <a:fld id="{8B3E8EF2-3A3D-4AB5-885C-BDF5384941A8}" type="datetimeFigureOut">
               <a:rPr lang="en-US" smtClean="0"/>
               <a:pPr/>
-              <a:t>10/22/2013</a:t>
+              <a:t>10/23/2013</a:t>
             </a:fld>
             <a:endParaRPr lang="en-US"/>
           </a:p>
@@ -2142,7 +2142,7 @@
             <a:fld id="{8B3E8EF2-3A3D-4AB5-885C-BDF5384941A8}" type="datetimeFigureOut">
               <a:rPr lang="en-US" smtClean="0"/>
               <a:pPr/>
-              <a:t>10/22/2013</a:t>
+              <a:t>10/23/2013</a:t>
             </a:fld>
             <a:endParaRPr lang="en-US"/>
           </a:p>
@@ -2385,7 +2385,7 @@
             <a:fld id="{8B3E8EF2-3A3D-4AB5-885C-BDF5384941A8}" type="datetimeFigureOut">
               <a:rPr lang="en-US" smtClean="0"/>
               <a:pPr/>
-              <a:t>10/22/2013</a:t>
+              <a:t>10/23/2013</a:t>
             </a:fld>
             <a:endParaRPr lang="en-US"/>
           </a:p>
@@ -2670,7 +2670,7 @@
             <a:fld id="{8B3E8EF2-3A3D-4AB5-885C-BDF5384941A8}" type="datetimeFigureOut">
               <a:rPr lang="en-US" smtClean="0"/>
               <a:pPr/>
-              <a:t>10/22/2013</a:t>
+              <a:t>10/23/2013</a:t>
             </a:fld>
             <a:endParaRPr lang="en-US"/>
           </a:p>
@@ -3089,7 +3089,7 @@
             <a:fld id="{8B3E8EF2-3A3D-4AB5-885C-BDF5384941A8}" type="datetimeFigureOut">
               <a:rPr lang="en-US" smtClean="0"/>
               <a:pPr/>
-              <a:t>10/22/2013</a:t>
+              <a:t>10/23/2013</a:t>
             </a:fld>
             <a:endParaRPr lang="en-US"/>
           </a:p>
@@ -3204,7 +3204,7 @@
             <a:fld id="{8B3E8EF2-3A3D-4AB5-885C-BDF5384941A8}" type="datetimeFigureOut">
               <a:rPr lang="en-US" smtClean="0"/>
               <a:pPr/>
-              <a:t>10/22/2013</a:t>
+              <a:t>10/23/2013</a:t>
             </a:fld>
             <a:endParaRPr lang="en-US"/>
           </a:p>
@@ -3296,7 +3296,7 @@
             <a:fld id="{8B3E8EF2-3A3D-4AB5-885C-BDF5384941A8}" type="datetimeFigureOut">
               <a:rPr lang="en-US" smtClean="0"/>
               <a:pPr/>
-              <a:t>10/22/2013</a:t>
+              <a:t>10/23/2013</a:t>
             </a:fld>
             <a:endParaRPr lang="en-US"/>
           </a:p>
@@ -3570,7 +3570,7 @@
             <a:fld id="{8B3E8EF2-3A3D-4AB5-885C-BDF5384941A8}" type="datetimeFigureOut">
               <a:rPr lang="en-US" smtClean="0"/>
               <a:pPr/>
-              <a:t>10/22/2013</a:t>
+              <a:t>10/23/2013</a:t>
             </a:fld>
             <a:endParaRPr lang="en-US"/>
           </a:p>
@@ -3820,7 +3820,7 @@
             <a:fld id="{8B3E8EF2-3A3D-4AB5-885C-BDF5384941A8}" type="datetimeFigureOut">
               <a:rPr lang="en-US" smtClean="0"/>
               <a:pPr/>
-              <a:t>10/22/2013</a:t>
+              <a:t>10/23/2013</a:t>
             </a:fld>
             <a:endParaRPr lang="en-US"/>
           </a:p>
@@ -4030,7 +4030,7 @@
             <a:fld id="{8B3E8EF2-3A3D-4AB5-885C-BDF5384941A8}" type="datetimeFigureOut">
               <a:rPr lang="en-US" smtClean="0"/>
               <a:pPr/>
-              <a:t>10/22/2013</a:t>
+              <a:t>10/23/2013</a:t>
             </a:fld>
             <a:endParaRPr lang="en-US"/>
           </a:p>
@@ -4793,7 +4793,7 @@
     </p:spTree>
     <p:extLst>
       <p:ext uri="{BB962C8B-B14F-4D97-AF65-F5344CB8AC3E}">
-        <p14:creationId xmlns:p14="http://schemas.microsoft.com/office/powerpoint/2010/main" xmlns="" val="4136638121"/>
+        <p14:creationId xmlns:p14="http://schemas.microsoft.com/office/powerpoint/2010/main" val="4136638121"/>
       </p:ext>
     </p:extLst>
   </p:cSld>
@@ -5004,7 +5004,7 @@
     </p:spTree>
     <p:extLst>
       <p:ext uri="{BB962C8B-B14F-4D97-AF65-F5344CB8AC3E}">
-        <p14:creationId xmlns:p14="http://schemas.microsoft.com/office/powerpoint/2010/main" xmlns="" val="4141454704"/>
+        <p14:creationId xmlns:p14="http://schemas.microsoft.com/office/powerpoint/2010/main" val="4141454704"/>
       </p:ext>
     </p:extLst>
   </p:cSld>
@@ -5210,7 +5210,9 @@
         </p:nvSpPr>
         <p:spPr/>
         <p:txBody>
-          <a:bodyPr/>
+          <a:bodyPr>
+            <a:normAutofit fontScale="92500" lnSpcReduction="10000"/>
+          </a:bodyPr>
           <a:lstStyle/>
           <a:p>
             <a:pPr algn="ctr">
@@ -5237,8 +5239,54 @@
               <a:rPr lang="en-US" dirty="0" err="1" smtClean="0"/>
               <a:t>TheJerrel</a:t>
             </a:r>
+            <a:endParaRPr lang="en-US" dirty="0" smtClean="0"/>
+          </a:p>
+          <a:p>
+            <a:pPr algn="ctr">
+              <a:buNone/>
+            </a:pPr>
             <a:endParaRPr lang="en-US" dirty="0"/>
           </a:p>
+          <a:p>
+            <a:r>
+              <a:rPr lang="en-US" dirty="0"/>
+              <a:t>Software Engineer at </a:t>
+            </a:r>
+            <a:r>
+              <a:rPr lang="en-US" dirty="0" err="1"/>
+              <a:t>RelayHealth</a:t>
+            </a:r>
+            <a:endParaRPr lang="en-US" dirty="0"/>
+          </a:p>
+          <a:p>
+            <a:r>
+              <a:rPr lang="en-US" dirty="0"/>
+              <a:t>Author: </a:t>
+            </a:r>
+            <a:r>
+              <a:rPr lang="en-US" i="1" dirty="0"/>
+              <a:t>Pro Agile .NET Development with Scrum</a:t>
+            </a:r>
+          </a:p>
+          <a:p>
+            <a:r>
+              <a:rPr lang="en-US" i="1" dirty="0"/>
+              <a:t>Striving Software Craftsman</a:t>
+            </a:r>
+          </a:p>
+          <a:p>
+            <a:r>
+              <a:rPr lang="en-US" i="1" dirty="0"/>
+              <a:t>Certified Scrum Master</a:t>
+            </a:r>
+            <a:endParaRPr lang="en-US" dirty="0"/>
+          </a:p>
+          <a:p>
+            <a:pPr algn="ctr">
+              <a:buNone/>
+            </a:pPr>
+            <a:endParaRPr lang="en-US" dirty="0"/>
+          </a:p>
         </p:txBody>
       </p:sp>
       <p:sp>
@@ -5253,7 +5301,9 @@
         </p:nvSpPr>
         <p:spPr/>
         <p:txBody>
-          <a:bodyPr/>
+          <a:bodyPr>
+            <a:normAutofit fontScale="92500" lnSpcReduction="10000"/>
+          </a:bodyPr>
           <a:lstStyle/>
           <a:p>
             <a:pPr algn="ctr">
@@ -5534,7 +5584,7 @@
     </p:spTree>
     <p:extLst>
       <p:ext uri="{BB962C8B-B14F-4D97-AF65-F5344CB8AC3E}">
-        <p14:creationId xmlns:p14="http://schemas.microsoft.com/office/powerpoint/2010/main" xmlns="" val="1918943846"/>
+        <p14:creationId xmlns:p14="http://schemas.microsoft.com/office/powerpoint/2010/main" val="1918943846"/>
       </p:ext>
     </p:extLst>
   </p:cSld>

</xml_diff>

<commit_message>
more changes to slides
</commit_message>
<xml_diff>
--- a/JointSpeakerTalks/PhoneGapXamarin/M3Conf2013/PhoneGap and Xamarin.pptx
+++ b/JointSpeakerTalks/PhoneGapXamarin/M3Conf2013/PhoneGap and Xamarin.pptx
@@ -5,7 +5,7 @@
     <p:sldMasterId id="2147483648" r:id="rId1"/>
   </p:sldMasterIdLst>
   <p:notesMasterIdLst>
-    <p:notesMasterId r:id="rId18"/>
+    <p:notesMasterId r:id="rId19"/>
   </p:notesMasterIdLst>
   <p:sldIdLst>
     <p:sldId id="256" r:id="rId2"/>
@@ -19,11 +19,12 @@
     <p:sldId id="264" r:id="rId10"/>
     <p:sldId id="263" r:id="rId11"/>
     <p:sldId id="266" r:id="rId12"/>
-    <p:sldId id="267" r:id="rId13"/>
-    <p:sldId id="273" r:id="rId14"/>
-    <p:sldId id="270" r:id="rId15"/>
-    <p:sldId id="274" r:id="rId16"/>
-    <p:sldId id="271" r:id="rId17"/>
+    <p:sldId id="275" r:id="rId13"/>
+    <p:sldId id="267" r:id="rId14"/>
+    <p:sldId id="273" r:id="rId15"/>
+    <p:sldId id="270" r:id="rId16"/>
+    <p:sldId id="274" r:id="rId17"/>
+    <p:sldId id="271" r:id="rId18"/>
   </p:sldIdLst>
   <p:sldSz cx="9144000" cy="6858000" type="screen4x3"/>
   <p:notesSz cx="6858000" cy="9144000"/>
@@ -710,9 +711,7 @@
         </p:nvSpPr>
         <p:spPr/>
         <p:txBody>
-          <a:bodyPr>
-            <a:normAutofit/>
-          </a:bodyPr>
+          <a:bodyPr/>
           <a:lstStyle/>
           <a:p>
             <a:endParaRPr lang="en-US" dirty="0"/>
@@ -737,7 +736,7 @@
             <a:fld id="{B9DFB3AD-BC26-4EB1-9A72-FD37058C7E87}" type="slidenum">
               <a:rPr lang="en-US" smtClean="0"/>
               <a:pPr/>
-              <a:t>6</a:t>
+              <a:t>4</a:t>
             </a:fld>
             <a:endParaRPr lang="en-US"/>
           </a:p>
@@ -746,7 +745,7 @@
     </p:spTree>
     <p:extLst>
       <p:ext uri="{BB962C8B-B14F-4D97-AF65-F5344CB8AC3E}">
-        <p14:creationId xmlns:p14="http://schemas.microsoft.com/office/powerpoint/2010/main" val="3078225192"/>
+        <p14:creationId xmlns:p14="http://schemas.microsoft.com/office/powerpoint/2010/main" val="837323356"/>
       </p:ext>
     </p:extLst>
   </p:cSld>
@@ -802,114 +801,6 @@
           </a:bodyPr>
           <a:lstStyle/>
           <a:p>
-            <a:pPr marL="0" marR="0" indent="0" algn="l" defTabSz="914400" rtl="0" eaLnBrk="1" fontAlgn="auto" latinLnBrk="0" hangingPunct="1">
-              <a:lnSpc>
-                <a:spcPct val="100000"/>
-              </a:lnSpc>
-              <a:spcBef>
-                <a:spcPts val="0"/>
-              </a:spcBef>
-              <a:spcAft>
-                <a:spcPts val="0"/>
-              </a:spcAft>
-              <a:buClrTx/>
-              <a:buSzTx/>
-              <a:buFontTx/>
-              <a:buNone/>
-              <a:tabLst/>
-              <a:defRPr/>
-            </a:pPr>
-            <a:r>
-              <a:rPr lang="en-US" dirty="0" smtClean="0"/>
-              <a:t>Essentially, this is what the </a:t>
-            </a:r>
-            <a:r>
-              <a:rPr lang="en-US" dirty="0" err="1" smtClean="0"/>
-              <a:t>PhoneGap</a:t>
-            </a:r>
-            <a:r>
-              <a:rPr lang="en-US" dirty="0" smtClean="0"/>
-              <a:t> application creation process looks like.  You take your IDE of choice as well as the </a:t>
-            </a:r>
-            <a:r>
-              <a:rPr lang="en-US" dirty="0" err="1" smtClean="0"/>
-              <a:t>javascript</a:t>
-            </a:r>
-            <a:r>
-              <a:rPr lang="en-US" dirty="0" smtClean="0"/>
-              <a:t> libraries you know and love, like</a:t>
-            </a:r>
-            <a:r>
-              <a:rPr lang="en-US" baseline="0" dirty="0" smtClean="0"/>
-              <a:t> </a:t>
-            </a:r>
-            <a:r>
-              <a:rPr lang="en-US" baseline="0" dirty="0" err="1" smtClean="0"/>
-              <a:t>jQuery</a:t>
-            </a:r>
-            <a:r>
-              <a:rPr lang="en-US" baseline="0" dirty="0" smtClean="0"/>
-              <a:t> mobile.  You create one codebase, thereby eliminating the maintenance nightmares we face with redundant codebases.  You wrap your html, </a:t>
-            </a:r>
-            <a:r>
-              <a:rPr lang="en-US" baseline="0" dirty="0" err="1" smtClean="0"/>
-              <a:t>css</a:t>
-            </a:r>
-            <a:r>
-              <a:rPr lang="en-US" baseline="0" dirty="0" smtClean="0"/>
-              <a:t>, and </a:t>
-            </a:r>
-            <a:r>
-              <a:rPr lang="en-US" baseline="0" dirty="0" err="1" smtClean="0"/>
-              <a:t>javascript</a:t>
-            </a:r>
-            <a:r>
-              <a:rPr lang="en-US" baseline="0" dirty="0" smtClean="0"/>
-              <a:t> files with </a:t>
-            </a:r>
-            <a:r>
-              <a:rPr lang="en-US" baseline="0" dirty="0" err="1" smtClean="0"/>
-              <a:t>PhoneGap</a:t>
-            </a:r>
-            <a:r>
-              <a:rPr lang="en-US" baseline="0" dirty="0" smtClean="0"/>
-              <a:t>, and you can take advantage of the </a:t>
-            </a:r>
-            <a:r>
-              <a:rPr lang="en-US" baseline="0" dirty="0" err="1" smtClean="0"/>
-              <a:t>PhoneGap</a:t>
-            </a:r>
-            <a:r>
-              <a:rPr lang="en-US" baseline="0" dirty="0" smtClean="0"/>
-              <a:t> </a:t>
-            </a:r>
-            <a:r>
-              <a:rPr lang="en-US" baseline="0" dirty="0" err="1" smtClean="0"/>
-              <a:t>plugins</a:t>
-            </a:r>
-            <a:r>
-              <a:rPr lang="en-US" baseline="0" dirty="0" smtClean="0"/>
-              <a:t> that interact with your device’s capabilities, like the camera and </a:t>
-            </a:r>
-            <a:r>
-              <a:rPr lang="en-US" baseline="0" dirty="0" err="1" smtClean="0"/>
-              <a:t>geolocation</a:t>
-            </a:r>
-            <a:r>
-              <a:rPr lang="en-US" baseline="0" dirty="0" smtClean="0"/>
-              <a:t> services.  You send your app to </a:t>
-            </a:r>
-            <a:r>
-              <a:rPr lang="en-US" baseline="0" dirty="0" err="1" smtClean="0"/>
-              <a:t>PhoneGap</a:t>
-            </a:r>
-            <a:r>
-              <a:rPr lang="en-US" baseline="0" dirty="0" smtClean="0"/>
-              <a:t> build, and you end up with ready-to-submit app packages for each of the target platforms.</a:t>
-            </a:r>
-            <a:endParaRPr lang="en-US" dirty="0" smtClean="0"/>
-          </a:p>
-          <a:p>
             <a:endParaRPr lang="en-US" dirty="0"/>
           </a:p>
         </p:txBody>
@@ -932,7 +823,7 @@
             <a:fld id="{B9DFB3AD-BC26-4EB1-9A72-FD37058C7E87}" type="slidenum">
               <a:rPr lang="en-US" smtClean="0"/>
               <a:pPr/>
-              <a:t>7</a:t>
+              <a:t>6</a:t>
             </a:fld>
             <a:endParaRPr lang="en-US"/>
           </a:p>
@@ -941,7 +832,7 @@
     </p:spTree>
     <p:extLst>
       <p:ext uri="{BB962C8B-B14F-4D97-AF65-F5344CB8AC3E}">
-        <p14:creationId xmlns:p14="http://schemas.microsoft.com/office/powerpoint/2010/main" val="3095546884"/>
+        <p14:creationId xmlns:p14="http://schemas.microsoft.com/office/powerpoint/2010/main" val="3078225192"/>
       </p:ext>
     </p:extLst>
   </p:cSld>
@@ -997,17 +888,70 @@
           </a:bodyPr>
           <a:lstStyle/>
           <a:p>
+            <a:pPr marL="0" marR="0" indent="0" algn="l" defTabSz="914400" rtl="0" eaLnBrk="1" fontAlgn="auto" latinLnBrk="0" hangingPunct="1">
+              <a:lnSpc>
+                <a:spcPct val="100000"/>
+              </a:lnSpc>
+              <a:spcBef>
+                <a:spcPts val="0"/>
+              </a:spcBef>
+              <a:spcAft>
+                <a:spcPts val="0"/>
+              </a:spcAft>
+              <a:buClrTx/>
+              <a:buSzTx/>
+              <a:buFontTx/>
+              <a:buNone/>
+              <a:tabLst/>
+              <a:defRPr/>
+            </a:pPr>
+            <a:r>
+              <a:rPr lang="en-US" dirty="0" smtClean="0"/>
+              <a:t>Essentially, this is what the </a:t>
+            </a:r>
+            <a:r>
+              <a:rPr lang="en-US" dirty="0" err="1" smtClean="0"/>
+              <a:t>PhoneGap</a:t>
+            </a:r>
+            <a:r>
+              <a:rPr lang="en-US" dirty="0" smtClean="0"/>
+              <a:t> application creation process looks like.  You take your IDE of choice as well as the </a:t>
+            </a:r>
+            <a:r>
+              <a:rPr lang="en-US" dirty="0" err="1" smtClean="0"/>
+              <a:t>javascript</a:t>
+            </a:r>
+            <a:r>
+              <a:rPr lang="en-US" dirty="0" smtClean="0"/>
+              <a:t> libraries you know and love, like</a:t>
+            </a:r>
             <a:r>
               <a:rPr lang="en-US" baseline="0" dirty="0" smtClean="0"/>
-              <a:t>When I’m developing for the web, for me, Chrome developer tools are second to none.  So yes, while there are ways to debug </a:t>
+              <a:t> </a:t>
             </a:r>
             <a:r>
               <a:rPr lang="en-US" baseline="0" dirty="0" err="1" smtClean="0"/>
-              <a:t>Javascript</a:t>
+              <a:t>jQuery</a:t>
             </a:r>
             <a:r>
               <a:rPr lang="en-US" baseline="0" dirty="0" smtClean="0"/>
-              <a:t> in Visual Studio, I typically choose not to, and in my experiments with </a:t>
+              <a:t> mobile.  You create one codebase, thereby eliminating the maintenance nightmares we face with redundant codebases.  You wrap your html, </a:t>
+            </a:r>
+            <a:r>
+              <a:rPr lang="en-US" baseline="0" dirty="0" err="1" smtClean="0"/>
+              <a:t>css</a:t>
+            </a:r>
+            <a:r>
+              <a:rPr lang="en-US" baseline="0" dirty="0" smtClean="0"/>
+              <a:t>, and </a:t>
+            </a:r>
+            <a:r>
+              <a:rPr lang="en-US" baseline="0" dirty="0" err="1" smtClean="0"/>
+              <a:t>javascript</a:t>
+            </a:r>
+            <a:r>
+              <a:rPr lang="en-US" baseline="0" dirty="0" smtClean="0"/>
+              <a:t> files with </a:t>
             </a:r>
             <a:r>
               <a:rPr lang="en-US" baseline="0" dirty="0" err="1" smtClean="0"/>
@@ -1015,78 +959,41 @@
             </a:r>
             <a:r>
               <a:rPr lang="en-US" baseline="0" dirty="0" smtClean="0"/>
-              <a:t>, I also chose to pursue an alternative route.</a:t>
-            </a:r>
-          </a:p>
-          <a:p>
-            <a:endParaRPr lang="en-US" baseline="0" dirty="0" smtClean="0"/>
-          </a:p>
-          <a:p>
-            <a:r>
-              <a:rPr lang="en-US" dirty="0" smtClean="0"/>
-              <a:t>Fortunately,</a:t>
+              <a:t>, and you can take advantage of the </a:t>
+            </a:r>
+            <a:r>
+              <a:rPr lang="en-US" baseline="0" dirty="0" err="1" smtClean="0"/>
+              <a:t>PhoneGap</a:t>
             </a:r>
             <a:r>
               <a:rPr lang="en-US" baseline="0" dirty="0" smtClean="0"/>
-              <a:t> there’s a Chrome extension called the Ripple Emulator.  The idea is that you can get a sense for how your app will look on different screen sizes, and you have the added benefit of being able to use Chrome’s </a:t>
+              <a:t> </a:t>
             </a:r>
             <a:r>
               <a:rPr lang="en-US" baseline="0" dirty="0" err="1" smtClean="0"/>
-              <a:t>Javascript</a:t>
+              <a:t>plugins</a:t>
             </a:r>
             <a:r>
               <a:rPr lang="en-US" baseline="0" dirty="0" smtClean="0"/>
-              <a:t> debugging tools.</a:t>
-            </a:r>
-          </a:p>
-          <a:p>
-            <a:endParaRPr lang="en-US" baseline="0" dirty="0" smtClean="0"/>
-          </a:p>
-          <a:p>
+              <a:t> that interact with your device’s capabilities, like the camera and </a:t>
+            </a:r>
+            <a:r>
+              <a:rPr lang="en-US" baseline="0" dirty="0" err="1" smtClean="0"/>
+              <a:t>geolocation</a:t>
+            </a:r>
             <a:r>
               <a:rPr lang="en-US" baseline="0" dirty="0" smtClean="0"/>
-              <a:t>With the Ripple Emulator, you can view any website or any app, provided that it has been deployed to a URL your computer can reach. In Visual Studio, I can open my solution as a web site, run that locally using Chrome, and enable Ripple.</a:t>
-            </a:r>
-          </a:p>
-          <a:p>
-            <a:endParaRPr lang="en-US" baseline="0" dirty="0" smtClean="0"/>
-          </a:p>
-          <a:p>
-            <a:r>
-              <a:rPr lang="en-US" dirty="0" smtClean="0"/>
-              <a:t>One</a:t>
+              <a:t> services.  You send your app to </a:t>
+            </a:r>
+            <a:r>
+              <a:rPr lang="en-US" baseline="0" dirty="0" err="1" smtClean="0"/>
+              <a:t>PhoneGap</a:t>
             </a:r>
             <a:r>
               <a:rPr lang="en-US" baseline="0" dirty="0" smtClean="0"/>
-              <a:t> caveat with the Ripple Emulator – it really should be used only to debug </a:t>
-            </a:r>
-            <a:r>
-              <a:rPr lang="en-US" baseline="0" dirty="0" err="1" smtClean="0"/>
-              <a:t>Javascript</a:t>
-            </a:r>
-            <a:r>
-              <a:rPr lang="en-US" baseline="0" dirty="0" smtClean="0"/>
-              <a:t>.  While you’ll see your app in what looks like an </a:t>
-            </a:r>
-            <a:r>
-              <a:rPr lang="en-US" baseline="0" dirty="0" err="1" smtClean="0"/>
-              <a:t>iPhone</a:t>
-            </a:r>
-            <a:r>
-              <a:rPr lang="en-US" baseline="0" dirty="0" smtClean="0"/>
-              <a:t> 4, the emulator unapologetically doesn’t render your app the same way an </a:t>
-            </a:r>
-            <a:r>
-              <a:rPr lang="en-US" baseline="0" dirty="0" err="1" smtClean="0"/>
-              <a:t>iPhone</a:t>
-            </a:r>
-            <a:r>
-              <a:rPr lang="en-US" baseline="0" dirty="0" smtClean="0"/>
-              <a:t> would.  As always, before deploying your app to an app store, you’ll want to test it on an actual device.</a:t>
-            </a:r>
-          </a:p>
-          <a:p>
-            <a:endParaRPr lang="en-US" baseline="0" dirty="0" smtClean="0"/>
+              <a:t> build, and you end up with ready-to-submit app packages for each of the target platforms.</a:t>
+            </a:r>
+            <a:endParaRPr lang="en-US" dirty="0" smtClean="0"/>
           </a:p>
           <a:p>
             <a:endParaRPr lang="en-US" dirty="0"/>
@@ -1111,7 +1018,7 @@
             <a:fld id="{B9DFB3AD-BC26-4EB1-9A72-FD37058C7E87}" type="slidenum">
               <a:rPr lang="en-US" smtClean="0"/>
               <a:pPr/>
-              <a:t>9</a:t>
+              <a:t>7</a:t>
             </a:fld>
             <a:endParaRPr lang="en-US"/>
           </a:p>
@@ -1120,7 +1027,7 @@
     </p:spTree>
     <p:extLst>
       <p:ext uri="{BB962C8B-B14F-4D97-AF65-F5344CB8AC3E}">
-        <p14:creationId xmlns:p14="http://schemas.microsoft.com/office/powerpoint/2010/main" val="2980022477"/>
+        <p14:creationId xmlns:p14="http://schemas.microsoft.com/office/powerpoint/2010/main" val="3095546884"/>
       </p:ext>
     </p:extLst>
   </p:cSld>
@@ -1176,8 +1083,100 @@
           </a:bodyPr>
           <a:lstStyle/>
           <a:p>
+            <a:r>
+              <a:rPr lang="en-US" baseline="0" dirty="0" smtClean="0"/>
+              <a:t>When I’m developing for the web, for me, Chrome developer tools are second to none.  So yes, while there are ways to debug </a:t>
+            </a:r>
+            <a:r>
+              <a:rPr lang="en-US" baseline="0" dirty="0" err="1" smtClean="0"/>
+              <a:t>Javascript</a:t>
+            </a:r>
+            <a:r>
+              <a:rPr lang="en-US" baseline="0" dirty="0" smtClean="0"/>
+              <a:t> in Visual Studio, I typically choose not to, and in my experiments with </a:t>
+            </a:r>
+            <a:r>
+              <a:rPr lang="en-US" baseline="0" dirty="0" err="1" smtClean="0"/>
+              <a:t>PhoneGap</a:t>
+            </a:r>
+            <a:r>
+              <a:rPr lang="en-US" baseline="0" dirty="0" smtClean="0"/>
+              <a:t>, I also chose to pursue an alternative route.</a:t>
+            </a:r>
+          </a:p>
+          <a:p>
             <a:endParaRPr lang="en-US" baseline="0" dirty="0" smtClean="0"/>
           </a:p>
+          <a:p>
+            <a:r>
+              <a:rPr lang="en-US" dirty="0" smtClean="0"/>
+              <a:t>Fortunately,</a:t>
+            </a:r>
+            <a:r>
+              <a:rPr lang="en-US" baseline="0" dirty="0" smtClean="0"/>
+              <a:t> there’s a Chrome extension called the Ripple Emulator.  The idea is that you can get a sense for how your app will look on different screen sizes, and you have the added benefit of being able to use Chrome’s </a:t>
+            </a:r>
+            <a:r>
+              <a:rPr lang="en-US" baseline="0" dirty="0" err="1" smtClean="0"/>
+              <a:t>Javascript</a:t>
+            </a:r>
+            <a:r>
+              <a:rPr lang="en-US" baseline="0" dirty="0" smtClean="0"/>
+              <a:t> debugging tools.</a:t>
+            </a:r>
+          </a:p>
+          <a:p>
+            <a:endParaRPr lang="en-US" baseline="0" dirty="0" smtClean="0"/>
+          </a:p>
+          <a:p>
+            <a:r>
+              <a:rPr lang="en-US" baseline="0" dirty="0" smtClean="0"/>
+              <a:t>With the Ripple Emulator, you can view any website or any app, provided that it has been deployed to a URL your computer can reach. In Visual Studio, I can open my solution as a web site, run that locally using Chrome, and enable Ripple.</a:t>
+            </a:r>
+          </a:p>
+          <a:p>
+            <a:endParaRPr lang="en-US" baseline="0" dirty="0" smtClean="0"/>
+          </a:p>
+          <a:p>
+            <a:r>
+              <a:rPr lang="en-US" dirty="0" smtClean="0"/>
+              <a:t>One</a:t>
+            </a:r>
+            <a:r>
+              <a:rPr lang="en-US" baseline="0" dirty="0" smtClean="0"/>
+              <a:t> caveat with the Ripple Emulator – it really should be used only to debug </a:t>
+            </a:r>
+            <a:r>
+              <a:rPr lang="en-US" baseline="0" dirty="0" err="1" smtClean="0"/>
+              <a:t>Javascript</a:t>
+            </a:r>
+            <a:r>
+              <a:rPr lang="en-US" baseline="0" dirty="0" smtClean="0"/>
+              <a:t>.  While you’ll see your app in what looks like an </a:t>
+            </a:r>
+            <a:r>
+              <a:rPr lang="en-US" baseline="0" dirty="0" err="1" smtClean="0"/>
+              <a:t>iPhone</a:t>
+            </a:r>
+            <a:r>
+              <a:rPr lang="en-US" baseline="0" dirty="0" smtClean="0"/>
+              <a:t> 4, the emulator unapologetically doesn’t render your app the same way an </a:t>
+            </a:r>
+            <a:r>
+              <a:rPr lang="en-US" baseline="0" dirty="0" err="1" smtClean="0"/>
+              <a:t>iPhone</a:t>
+            </a:r>
+            <a:r>
+              <a:rPr lang="en-US" baseline="0" dirty="0" smtClean="0"/>
+              <a:t> would.  As always, before deploying your app to an app store, you’ll want to test it on an actual device.</a:t>
+            </a:r>
+          </a:p>
+          <a:p>
+            <a:endParaRPr lang="en-US" baseline="0" dirty="0" smtClean="0"/>
+          </a:p>
+          <a:p>
+            <a:endParaRPr lang="en-US" dirty="0"/>
+          </a:p>
         </p:txBody>
       </p:sp>
       <p:sp>
@@ -1198,7 +1197,7 @@
             <a:fld id="{B9DFB3AD-BC26-4EB1-9A72-FD37058C7E87}" type="slidenum">
               <a:rPr lang="en-US" smtClean="0"/>
               <a:pPr/>
-              <a:t>10</a:t>
+              <a:t>9</a:t>
             </a:fld>
             <a:endParaRPr lang="en-US"/>
           </a:p>
@@ -1207,7 +1206,7 @@
     </p:spTree>
     <p:extLst>
       <p:ext uri="{BB962C8B-B14F-4D97-AF65-F5344CB8AC3E}">
-        <p14:creationId xmlns:p14="http://schemas.microsoft.com/office/powerpoint/2010/main" val="1850633223"/>
+        <p14:creationId xmlns:p14="http://schemas.microsoft.com/office/powerpoint/2010/main" val="2980022477"/>
       </p:ext>
     </p:extLst>
   </p:cSld>
@@ -1263,37 +1262,8 @@
           </a:bodyPr>
           <a:lstStyle/>
           <a:p>
-            <a:r>
-              <a:rPr lang="en-US" dirty="0" smtClean="0"/>
-              <a:t>Jamie: Now</a:t>
-            </a:r>
-            <a:r>
-              <a:rPr lang="en-US" baseline="0" dirty="0" smtClean="0"/>
-              <a:t> that we’ve shown you two tools for cross-platform mobile development, the question becomes “which one should I use?”</a:t>
-            </a:r>
-          </a:p>
-          <a:p>
             <a:endParaRPr lang="en-US" baseline="0" dirty="0" smtClean="0"/>
           </a:p>
-          <a:p>
-            <a:r>
-              <a:rPr lang="en-US" baseline="0" dirty="0" err="1" smtClean="0"/>
-              <a:t>Jerrel</a:t>
-            </a:r>
-            <a:r>
-              <a:rPr lang="en-US" baseline="0" dirty="0" smtClean="0"/>
-              <a:t>: Clearly, both of these tools allow you to easily create an app to deploy to all of the major app stores, so it really comes down to what you’re trying to accomplish.</a:t>
-            </a:r>
-          </a:p>
-          <a:p>
-            <a:endParaRPr lang="en-US" baseline="0" dirty="0" smtClean="0"/>
-          </a:p>
-          <a:p>
-            <a:r>
-              <a:rPr lang="en-US" baseline="0" dirty="0" smtClean="0"/>
-              <a:t>Jamie: Let’s take a look at the advantages and disadvantages of each.</a:t>
-            </a:r>
-          </a:p>
         </p:txBody>
       </p:sp>
       <p:sp>
@@ -1314,7 +1284,7 @@
             <a:fld id="{B9DFB3AD-BC26-4EB1-9A72-FD37058C7E87}" type="slidenum">
               <a:rPr lang="en-US" smtClean="0"/>
               <a:pPr/>
-              <a:t>12</a:t>
+              <a:t>10</a:t>
             </a:fld>
             <a:endParaRPr lang="en-US"/>
           </a:p>
@@ -1323,7 +1293,7 @@
     </p:spTree>
     <p:extLst>
       <p:ext uri="{BB962C8B-B14F-4D97-AF65-F5344CB8AC3E}">
-        <p14:creationId xmlns:p14="http://schemas.microsoft.com/office/powerpoint/2010/main" val="3915659578"/>
+        <p14:creationId xmlns:p14="http://schemas.microsoft.com/office/powerpoint/2010/main" val="1850633223"/>
       </p:ext>
     </p:extLst>
   </p:cSld>
@@ -1381,6 +1351,122 @@
           <a:p>
             <a:r>
               <a:rPr lang="en-US" dirty="0" smtClean="0"/>
+              <a:t>Jamie: Now</a:t>
+            </a:r>
+            <a:r>
+              <a:rPr lang="en-US" baseline="0" dirty="0" smtClean="0"/>
+              <a:t> that we’ve shown you two tools for cross-platform mobile development, the question becomes “which one should I use?”</a:t>
+            </a:r>
+          </a:p>
+          <a:p>
+            <a:endParaRPr lang="en-US" baseline="0" dirty="0" smtClean="0"/>
+          </a:p>
+          <a:p>
+            <a:r>
+              <a:rPr lang="en-US" baseline="0" dirty="0" err="1" smtClean="0"/>
+              <a:t>Jerrel</a:t>
+            </a:r>
+            <a:r>
+              <a:rPr lang="en-US" baseline="0" dirty="0" smtClean="0"/>
+              <a:t>: Clearly, both of these tools allow you to easily create an app to deploy to all of the major app stores, so it really comes down to what you’re trying to accomplish.</a:t>
+            </a:r>
+          </a:p>
+          <a:p>
+            <a:endParaRPr lang="en-US" baseline="0" dirty="0" smtClean="0"/>
+          </a:p>
+          <a:p>
+            <a:r>
+              <a:rPr lang="en-US" baseline="0" dirty="0" smtClean="0"/>
+              <a:t>Jamie: Let’s take a look at the advantages and disadvantages of each.</a:t>
+            </a:r>
+          </a:p>
+        </p:txBody>
+      </p:sp>
+      <p:sp>
+        <p:nvSpPr>
+          <p:cNvPr id="4" name="Slide Number Placeholder 3"/>
+          <p:cNvSpPr>
+            <a:spLocks noGrp="1"/>
+          </p:cNvSpPr>
+          <p:nvPr>
+            <p:ph type="sldNum" sz="quarter" idx="10"/>
+          </p:nvPr>
+        </p:nvSpPr>
+        <p:spPr/>
+        <p:txBody>
+          <a:bodyPr/>
+          <a:lstStyle/>
+          <a:p>
+            <a:fld id="{B9DFB3AD-BC26-4EB1-9A72-FD37058C7E87}" type="slidenum">
+              <a:rPr lang="en-US" smtClean="0"/>
+              <a:pPr/>
+              <a:t>13</a:t>
+            </a:fld>
+            <a:endParaRPr lang="en-US"/>
+          </a:p>
+        </p:txBody>
+      </p:sp>
+    </p:spTree>
+    <p:extLst>
+      <p:ext uri="{BB962C8B-B14F-4D97-AF65-F5344CB8AC3E}">
+        <p14:creationId xmlns:p14="http://schemas.microsoft.com/office/powerpoint/2010/main" val="3915659578"/>
+      </p:ext>
+    </p:extLst>
+  </p:cSld>
+  <p:clrMapOvr>
+    <a:masterClrMapping/>
+  </p:clrMapOvr>
+</p:notes>
+</file>
+
+<file path=ppt/notesSlides/notesSlide9.xml><?xml version="1.0" encoding="utf-8"?>
+<p:notes xmlns:a="http://schemas.openxmlformats.org/drawingml/2006/main" xmlns:r="http://schemas.openxmlformats.org/officeDocument/2006/relationships" xmlns:p="http://schemas.openxmlformats.org/presentationml/2006/main">
+  <p:cSld>
+    <p:spTree>
+      <p:nvGrpSpPr>
+        <p:cNvPr id="1" name=""/>
+        <p:cNvGrpSpPr/>
+        <p:nvPr/>
+      </p:nvGrpSpPr>
+      <p:grpSpPr>
+        <a:xfrm>
+          <a:off x="0" y="0"/>
+          <a:ext cx="0" cy="0"/>
+          <a:chOff x="0" y="0"/>
+          <a:chExt cx="0" cy="0"/>
+        </a:xfrm>
+      </p:grpSpPr>
+      <p:sp>
+        <p:nvSpPr>
+          <p:cNvPr id="2" name="Slide Image Placeholder 1"/>
+          <p:cNvSpPr>
+            <a:spLocks noGrp="1" noRot="1" noChangeAspect="1"/>
+          </p:cNvSpPr>
+          <p:nvPr>
+            <p:ph type="sldImg"/>
+          </p:nvPr>
+        </p:nvSpPr>
+        <p:spPr/>
+      </p:sp>
+      <p:sp>
+        <p:nvSpPr>
+          <p:cNvPr id="3" name="Notes Placeholder 2"/>
+          <p:cNvSpPr>
+            <a:spLocks noGrp="1"/>
+          </p:cNvSpPr>
+          <p:nvPr>
+            <p:ph type="body" idx="1"/>
+          </p:nvPr>
+        </p:nvSpPr>
+        <p:spPr/>
+        <p:txBody>
+          <a:bodyPr>
+            <a:normAutofit/>
+          </a:bodyPr>
+          <a:lstStyle/>
+          <a:p>
+            <a:r>
+              <a:rPr lang="en-US" dirty="0" smtClean="0"/>
               <a:t>Jamie: Well, there you have</a:t>
             </a:r>
             <a:r>
@@ -1430,7 +1516,7 @@
             <a:fld id="{B9DFB3AD-BC26-4EB1-9A72-FD37058C7E87}" type="slidenum">
               <a:rPr lang="en-US" smtClean="0"/>
               <a:pPr/>
-              <a:t>14</a:t>
+              <a:t>15</a:t>
             </a:fld>
             <a:endParaRPr lang="en-US"/>
           </a:p>
@@ -4654,58 +4740,116 @@
       </p:grpSpPr>
       <p:sp>
         <p:nvSpPr>
-          <p:cNvPr id="4" name="Title 3"/>
-          <p:cNvSpPr>
-            <a:spLocks noGrp="1"/>
-          </p:cNvSpPr>
-          <p:nvPr>
-            <p:ph type="ctrTitle"/>
-          </p:nvPr>
-        </p:nvSpPr>
-        <p:spPr/>
-        <p:txBody>
-          <a:bodyPr/>
-          <a:lstStyle/>
-          <a:p>
-            <a:r>
-              <a:rPr lang="en-US" dirty="0" err="1" smtClean="0"/>
-              <a:t>PhoneGap</a:t>
-            </a:r>
-            <a:r>
-              <a:rPr lang="en-US" dirty="0" smtClean="0"/>
-              <a:t> v. </a:t>
-            </a:r>
+          <p:cNvPr id="2" name="Title 1"/>
+          <p:cNvSpPr>
+            <a:spLocks noGrp="1"/>
+          </p:cNvSpPr>
+          <p:nvPr>
+            <p:ph type="title"/>
+          </p:nvPr>
+        </p:nvSpPr>
+        <p:spPr/>
+        <p:txBody>
+          <a:bodyPr/>
+          <a:lstStyle/>
+          <a:p>
             <a:r>
               <a:rPr lang="en-US" dirty="0" err="1" smtClean="0"/>
               <a:t>Xamarin</a:t>
             </a:r>
             <a:r>
               <a:rPr lang="en-US" dirty="0" smtClean="0"/>
-              <a:t>:</a:t>
-            </a:r>
-            <a:br>
+              <a:t> Details</a:t>
+            </a:r>
+            <a:endParaRPr lang="en-US" dirty="0"/>
+          </a:p>
+        </p:txBody>
+      </p:sp>
+      <p:sp>
+        <p:nvSpPr>
+          <p:cNvPr id="3" name="Content Placeholder 2"/>
+          <p:cNvSpPr>
+            <a:spLocks noGrp="1"/>
+          </p:cNvSpPr>
+          <p:nvPr>
+            <p:ph idx="1"/>
+          </p:nvPr>
+        </p:nvSpPr>
+        <p:spPr/>
+        <p:txBody>
+          <a:bodyPr/>
+          <a:lstStyle/>
+          <a:p>
+            <a:r>
               <a:rPr lang="en-US" dirty="0" smtClean="0"/>
-            </a:br>
+              <a:t>Cross-platform development with C#</a:t>
+            </a:r>
+          </a:p>
+          <a:p>
+            <a:pPr lvl="1"/>
             <a:r>
               <a:rPr lang="en-US" dirty="0" smtClean="0"/>
-              <a:t>Which do I choose?</a:t>
+              <a:t>Can develop Android and </a:t>
+            </a:r>
+            <a:r>
+              <a:rPr lang="en-US" dirty="0" err="1" smtClean="0"/>
+              <a:t>iOS</a:t>
+            </a:r>
+            <a:r>
+              <a:rPr lang="en-US" dirty="0" smtClean="0"/>
+              <a:t> apps</a:t>
+            </a:r>
+          </a:p>
+          <a:p>
+            <a:pPr lvl="2"/>
+            <a:r>
+              <a:rPr lang="en-US" dirty="0" err="1" smtClean="0"/>
+              <a:t>iOS</a:t>
+            </a:r>
+            <a:r>
+              <a:rPr lang="en-US" dirty="0" smtClean="0"/>
+              <a:t> requires network connection to Mac</a:t>
+            </a:r>
+          </a:p>
+          <a:p>
+            <a:r>
+              <a:rPr lang="en-US" dirty="0" smtClean="0"/>
+              <a:t>Create native apps using Native APIs</a:t>
+            </a:r>
+          </a:p>
+          <a:p>
+            <a:pPr lvl="1"/>
+            <a:r>
+              <a:rPr lang="en-US" dirty="0" smtClean="0"/>
+              <a:t>Compiled code</a:t>
+            </a:r>
+          </a:p>
+          <a:p>
+            <a:r>
+              <a:rPr lang="en-US" dirty="0" smtClean="0"/>
+              <a:t>Use any existing .NET Libraries</a:t>
+            </a:r>
+          </a:p>
+          <a:p>
+            <a:pPr lvl="1"/>
+            <a:r>
+              <a:rPr lang="en-US" dirty="0" smtClean="0"/>
+              <a:t>Visual Studio Integration </a:t>
             </a:r>
             <a:endParaRPr lang="en-US" dirty="0"/>
           </a:p>
         </p:txBody>
       </p:sp>
     </p:spTree>
+    <p:extLst>
+      <p:ext uri="{BB962C8B-B14F-4D97-AF65-F5344CB8AC3E}">
+        <p14:creationId xmlns:p14="http://schemas.microsoft.com/office/powerpoint/2010/main" val="4125018363"/>
+      </p:ext>
+    </p:extLst>
   </p:cSld>
   <p:clrMapOvr>
     <a:masterClrMapping/>
   </p:clrMapOvr>
-  <p:timing>
-    <p:tnLst>
-      <p:par>
-        <p:cTn id="1" dur="indefinite" restart="never" nodeType="tmRoot"/>
-      </p:par>
-    </p:tnLst>
-  </p:timing>
 </p:sld>
 </file>
 
@@ -4728,74 +4872,47 @@
       </p:grpSpPr>
       <p:sp>
         <p:nvSpPr>
-          <p:cNvPr id="2" name="Title 1"/>
-          <p:cNvSpPr>
-            <a:spLocks noGrp="1"/>
-          </p:cNvSpPr>
-          <p:nvPr>
-            <p:ph type="title"/>
-          </p:nvPr>
-        </p:nvSpPr>
-        <p:spPr/>
-        <p:txBody>
-          <a:bodyPr/>
-          <a:lstStyle/>
-          <a:p>
+          <p:cNvPr id="4" name="Title 3"/>
+          <p:cNvSpPr>
+            <a:spLocks noGrp="1"/>
+          </p:cNvSpPr>
+          <p:nvPr>
+            <p:ph type="ctrTitle"/>
+          </p:nvPr>
+        </p:nvSpPr>
+        <p:spPr/>
+        <p:txBody>
+          <a:bodyPr/>
+          <a:lstStyle/>
+          <a:p>
+            <a:r>
+              <a:rPr lang="en-US" dirty="0" err="1" smtClean="0"/>
+              <a:t>PhoneGap</a:t>
+            </a:r>
             <a:r>
               <a:rPr lang="en-US" dirty="0" smtClean="0"/>
-              <a:t>Key Considerations</a:t>
+              <a:t> v. </a:t>
+            </a:r>
+            <a:r>
+              <a:rPr lang="en-US" dirty="0" err="1" smtClean="0"/>
+              <a:t>Xamarin</a:t>
+            </a:r>
+            <a:r>
+              <a:rPr lang="en-US" dirty="0" smtClean="0"/>
+              <a:t>:</a:t>
+            </a:r>
+            <a:br>
+              <a:rPr lang="en-US" dirty="0" smtClean="0"/>
+            </a:br>
+            <a:r>
+              <a:rPr lang="en-US" dirty="0" smtClean="0"/>
+              <a:t>Which do I choose?</a:t>
             </a:r>
             <a:endParaRPr lang="en-US" dirty="0"/>
           </a:p>
         </p:txBody>
       </p:sp>
-      <p:sp>
-        <p:nvSpPr>
-          <p:cNvPr id="3" name="Content Placeholder 2"/>
-          <p:cNvSpPr>
-            <a:spLocks noGrp="1"/>
-          </p:cNvSpPr>
-          <p:nvPr>
-            <p:ph idx="1"/>
-          </p:nvPr>
-        </p:nvSpPr>
-        <p:spPr/>
-        <p:txBody>
-          <a:bodyPr/>
-          <a:lstStyle/>
-          <a:p>
-            <a:r>
-              <a:rPr lang="en-US" dirty="0" smtClean="0"/>
-              <a:t>Cost</a:t>
-            </a:r>
-          </a:p>
-          <a:p>
-            <a:r>
-              <a:rPr lang="en-US" dirty="0" smtClean="0"/>
-              <a:t>Performance</a:t>
-            </a:r>
-          </a:p>
-          <a:p>
-            <a:r>
-              <a:rPr lang="en-US" dirty="0" smtClean="0"/>
-              <a:t>Supported platforms</a:t>
-            </a:r>
-          </a:p>
-          <a:p>
-            <a:r>
-              <a:rPr lang="en-US" dirty="0" smtClean="0"/>
-              <a:t>Native app experience</a:t>
-            </a:r>
-            <a:endParaRPr lang="en-US" dirty="0"/>
-          </a:p>
-        </p:txBody>
-      </p:sp>
     </p:spTree>
-    <p:extLst>
-      <p:ext uri="{BB962C8B-B14F-4D97-AF65-F5344CB8AC3E}">
-        <p14:creationId xmlns:p14="http://schemas.microsoft.com/office/powerpoint/2010/main" val="4136638121"/>
-      </p:ext>
-    </p:extLst>
   </p:cSld>
   <p:clrMapOvr>
     <a:masterClrMapping/>
@@ -4829,12 +4946,12 @@
       </p:grpSpPr>
       <p:sp>
         <p:nvSpPr>
-          <p:cNvPr id="5" name="Title 4"/>
-          <p:cNvSpPr>
-            <a:spLocks noGrp="1"/>
-          </p:cNvSpPr>
-          <p:nvPr>
-            <p:ph type="ctrTitle"/>
+          <p:cNvPr id="2" name="Title 1"/>
+          <p:cNvSpPr>
+            <a:spLocks noGrp="1"/>
+          </p:cNvSpPr>
+          <p:nvPr>
+            <p:ph type="title"/>
           </p:nvPr>
         </p:nvSpPr>
         <p:spPr/>
@@ -4844,13 +4961,59 @@
           <a:p>
             <a:r>
               <a:rPr lang="en-US" dirty="0" smtClean="0"/>
-              <a:t>Questions?</a:t>
+              <a:t>Key Considerations</a:t>
             </a:r>
             <a:endParaRPr lang="en-US" dirty="0"/>
           </a:p>
         </p:txBody>
       </p:sp>
+      <p:sp>
+        <p:nvSpPr>
+          <p:cNvPr id="3" name="Content Placeholder 2"/>
+          <p:cNvSpPr>
+            <a:spLocks noGrp="1"/>
+          </p:cNvSpPr>
+          <p:nvPr>
+            <p:ph idx="1"/>
+          </p:nvPr>
+        </p:nvSpPr>
+        <p:spPr/>
+        <p:txBody>
+          <a:bodyPr/>
+          <a:lstStyle/>
+          <a:p>
+            <a:r>
+              <a:rPr lang="en-US" dirty="0" smtClean="0"/>
+              <a:t>Cost</a:t>
+            </a:r>
+          </a:p>
+          <a:p>
+            <a:r>
+              <a:rPr lang="en-US" dirty="0" smtClean="0"/>
+              <a:t>Performance</a:t>
+            </a:r>
+          </a:p>
+          <a:p>
+            <a:r>
+              <a:rPr lang="en-US" dirty="0" smtClean="0"/>
+              <a:t>Supported platforms</a:t>
+            </a:r>
+          </a:p>
+          <a:p>
+            <a:r>
+              <a:rPr lang="en-US" dirty="0" smtClean="0"/>
+              <a:t>Native app experience</a:t>
+            </a:r>
+            <a:endParaRPr lang="en-US" dirty="0"/>
+          </a:p>
+        </p:txBody>
+      </p:sp>
     </p:spTree>
+    <p:extLst>
+      <p:ext uri="{BB962C8B-B14F-4D97-AF65-F5344CB8AC3E}">
+        <p14:creationId xmlns:p14="http://schemas.microsoft.com/office/powerpoint/2010/main" val="4136638121"/>
+      </p:ext>
+    </p:extLst>
   </p:cSld>
   <p:clrMapOvr>
     <a:masterClrMapping/>
@@ -4884,6 +5047,61 @@
       </p:grpSpPr>
       <p:sp>
         <p:nvSpPr>
+          <p:cNvPr id="5" name="Title 4"/>
+          <p:cNvSpPr>
+            <a:spLocks noGrp="1"/>
+          </p:cNvSpPr>
+          <p:nvPr>
+            <p:ph type="ctrTitle"/>
+          </p:nvPr>
+        </p:nvSpPr>
+        <p:spPr/>
+        <p:txBody>
+          <a:bodyPr/>
+          <a:lstStyle/>
+          <a:p>
+            <a:r>
+              <a:rPr lang="en-US" dirty="0" smtClean="0"/>
+              <a:t>Questions?</a:t>
+            </a:r>
+            <a:endParaRPr lang="en-US" dirty="0"/>
+          </a:p>
+        </p:txBody>
+      </p:sp>
+    </p:spTree>
+  </p:cSld>
+  <p:clrMapOvr>
+    <a:masterClrMapping/>
+  </p:clrMapOvr>
+  <p:timing>
+    <p:tnLst>
+      <p:par>
+        <p:cTn id="1" dur="indefinite" restart="never" nodeType="tmRoot"/>
+      </p:par>
+    </p:tnLst>
+  </p:timing>
+</p:sld>
+</file>
+
+<file path=ppt/slides/slide16.xml><?xml version="1.0" encoding="utf-8"?>
+<p:sld xmlns:a="http://schemas.openxmlformats.org/drawingml/2006/main" xmlns:r="http://schemas.openxmlformats.org/officeDocument/2006/relationships" xmlns:p="http://schemas.openxmlformats.org/presentationml/2006/main">
+  <p:cSld>
+    <p:spTree>
+      <p:nvGrpSpPr>
+        <p:cNvPr id="1" name=""/>
+        <p:cNvGrpSpPr/>
+        <p:nvPr/>
+      </p:nvGrpSpPr>
+      <p:grpSpPr>
+        <a:xfrm>
+          <a:off x="0" y="0"/>
+          <a:ext cx="0" cy="0"/>
+          <a:chOff x="0" y="0"/>
+          <a:chExt cx="0" cy="0"/>
+        </a:xfrm>
+      </p:grpSpPr>
+      <p:sp>
+        <p:nvSpPr>
           <p:cNvPr id="2" name="Title 1"/>
           <p:cNvSpPr>
             <a:spLocks noGrp="1"/>
@@ -5021,7 +5239,7 @@
 </p:sld>
 </file>
 
-<file path=ppt/slides/slide16.xml><?xml version="1.0" encoding="utf-8"?>
+<file path=ppt/slides/slide17.xml><?xml version="1.0" encoding="utf-8"?>
 <p:sld xmlns:a="http://schemas.openxmlformats.org/drawingml/2006/main" xmlns:r="http://schemas.openxmlformats.org/officeDocument/2006/relationships" xmlns:p="http://schemas.openxmlformats.org/presentationml/2006/main">
   <p:cSld>
     <p:spTree>

</xml_diff>

<commit_message>
First run through of talk and changes resulting
</commit_message>
<xml_diff>
--- a/JointSpeakerTalks/PhoneGapXamarin/M3Conf2013/PhoneGap and Xamarin.pptx
+++ b/JointSpeakerTalks/PhoneGapXamarin/M3Conf2013/PhoneGap and Xamarin.pptx
@@ -16,10 +16,10 @@
     <p:sldId id="259" r:id="rId7"/>
     <p:sldId id="261" r:id="rId8"/>
     <p:sldId id="262" r:id="rId9"/>
-    <p:sldId id="264" r:id="rId10"/>
-    <p:sldId id="263" r:id="rId11"/>
-    <p:sldId id="266" r:id="rId12"/>
-    <p:sldId id="275" r:id="rId13"/>
+    <p:sldId id="266" r:id="rId10"/>
+    <p:sldId id="275" r:id="rId11"/>
+    <p:sldId id="277" r:id="rId12"/>
+    <p:sldId id="276" r:id="rId13"/>
     <p:sldId id="267" r:id="rId14"/>
     <p:sldId id="273" r:id="rId15"/>
     <p:sldId id="270" r:id="rId16"/>
@@ -1078,104 +1078,103 @@
         </p:nvSpPr>
         <p:spPr/>
         <p:txBody>
-          <a:bodyPr>
-            <a:normAutofit/>
-          </a:bodyPr>
-          <a:lstStyle/>
-          <a:p>
-            <a:r>
-              <a:rPr lang="en-US" baseline="0" dirty="0" smtClean="0"/>
-              <a:t>When I’m developing for the web, for me, Chrome developer tools are second to none.  So yes, while there are ways to debug </a:t>
-            </a:r>
-            <a:r>
-              <a:rPr lang="en-US" baseline="0" dirty="0" err="1" smtClean="0"/>
-              <a:t>Javascript</a:t>
-            </a:r>
-            <a:r>
-              <a:rPr lang="en-US" baseline="0" dirty="0" smtClean="0"/>
-              <a:t> in Visual Studio, I typically choose not to, and in my experiments with </a:t>
-            </a:r>
-            <a:r>
-              <a:rPr lang="en-US" baseline="0" dirty="0" err="1" smtClean="0"/>
-              <a:t>PhoneGap</a:t>
-            </a:r>
-            <a:r>
-              <a:rPr lang="en-US" baseline="0" dirty="0" smtClean="0"/>
-              <a:t>, I also chose to pursue an alternative route.</a:t>
-            </a:r>
-          </a:p>
-          <a:p>
-            <a:endParaRPr lang="en-US" baseline="0" dirty="0" smtClean="0"/>
-          </a:p>
-          <a:p>
+          <a:bodyPr/>
+          <a:lstStyle/>
+          <a:p>
+            <a:pPr lvl="0"/>
             <a:r>
               <a:rPr lang="en-US" dirty="0" smtClean="0"/>
-              <a:t>Fortunately,</a:t>
-            </a:r>
-            <a:r>
-              <a:rPr lang="en-US" baseline="0" dirty="0" smtClean="0"/>
-              <a:t> there’s a Chrome extension called the Ripple Emulator.  The idea is that you can get a sense for how your app will look on different screen sizes, and you have the added benefit of being able to use Chrome’s </a:t>
-            </a:r>
-            <a:r>
-              <a:rPr lang="en-US" baseline="0" dirty="0" err="1" smtClean="0"/>
-              <a:t>Javascript</a:t>
-            </a:r>
-            <a:r>
-              <a:rPr lang="en-US" baseline="0" dirty="0" smtClean="0"/>
-              <a:t> debugging tools.</a:t>
-            </a:r>
-          </a:p>
-          <a:p>
-            <a:endParaRPr lang="en-US" baseline="0" dirty="0" smtClean="0"/>
-          </a:p>
-          <a:p>
-            <a:r>
-              <a:rPr lang="en-US" baseline="0" dirty="0" smtClean="0"/>
-              <a:t>With the Ripple Emulator, you can view any website or any app, provided that it has been deployed to a URL your computer can reach. In Visual Studio, I can open my solution as a web site, run that locally using Chrome, and enable Ripple.</a:t>
-            </a:r>
-          </a:p>
-          <a:p>
-            <a:endParaRPr lang="en-US" baseline="0" dirty="0" smtClean="0"/>
-          </a:p>
-          <a:p>
+              <a:t>Can develop Android and </a:t>
+            </a:r>
+            <a:r>
+              <a:rPr lang="en-US" dirty="0" err="1" smtClean="0"/>
+              <a:t>iOS</a:t>
+            </a:r>
             <a:r>
               <a:rPr lang="en-US" dirty="0" smtClean="0"/>
-              <a:t>One</a:t>
-            </a:r>
-            <a:r>
-              <a:rPr lang="en-US" baseline="0" dirty="0" smtClean="0"/>
-              <a:t> caveat with the Ripple Emulator – it really should be used only to debug </a:t>
-            </a:r>
-            <a:r>
-              <a:rPr lang="en-US" baseline="0" dirty="0" err="1" smtClean="0"/>
-              <a:t>Javascript</a:t>
-            </a:r>
-            <a:r>
-              <a:rPr lang="en-US" baseline="0" dirty="0" smtClean="0"/>
-              <a:t>.  While you’ll see your app in what looks like an </a:t>
-            </a:r>
-            <a:r>
-              <a:rPr lang="en-US" baseline="0" dirty="0" err="1" smtClean="0"/>
-              <a:t>iPhone</a:t>
-            </a:r>
-            <a:r>
-              <a:rPr lang="en-US" baseline="0" dirty="0" smtClean="0"/>
-              <a:t> 4, the emulator unapologetically doesn’t render your app the same way an </a:t>
-            </a:r>
-            <a:r>
-              <a:rPr lang="en-US" baseline="0" dirty="0" err="1" smtClean="0"/>
-              <a:t>iPhone</a:t>
-            </a:r>
-            <a:r>
-              <a:rPr lang="en-US" baseline="0" dirty="0" smtClean="0"/>
-              <a:t> would.  As always, before deploying your app to an app store, you’ll want to test it on an actual device.</a:t>
-            </a:r>
-          </a:p>
-          <a:p>
-            <a:endParaRPr lang="en-US" baseline="0" dirty="0" smtClean="0"/>
-          </a:p>
-          <a:p>
-            <a:endParaRPr lang="en-US" dirty="0"/>
+              <a:t> apps</a:t>
+            </a:r>
+          </a:p>
+          <a:p>
+            <a:pPr lvl="0"/>
+            <a:r>
+              <a:rPr lang="en-US" dirty="0" err="1" smtClean="0"/>
+              <a:t>iOS</a:t>
+            </a:r>
+            <a:r>
+              <a:rPr lang="en-US" dirty="0" smtClean="0"/>
+              <a:t> requires network connection to Mac</a:t>
+            </a:r>
+          </a:p>
+          <a:p>
+            <a:pPr marL="0" marR="0" lvl="0" indent="0" algn="l" defTabSz="914400" rtl="0" eaLnBrk="1" fontAlgn="auto" latinLnBrk="0" hangingPunct="1">
+              <a:lnSpc>
+                <a:spcPct val="100000"/>
+              </a:lnSpc>
+              <a:spcBef>
+                <a:spcPts val="0"/>
+              </a:spcBef>
+              <a:spcAft>
+                <a:spcPts val="0"/>
+              </a:spcAft>
+              <a:buClrTx/>
+              <a:buSzTx/>
+              <a:buFontTx/>
+              <a:buNone/>
+              <a:tabLst/>
+              <a:defRPr/>
+            </a:pPr>
+            <a:r>
+              <a:rPr lang="en-US" dirty="0" smtClean="0"/>
+              <a:t>Compiled code</a:t>
+            </a:r>
+          </a:p>
+          <a:p>
+            <a:pPr marL="0" marR="0" lvl="0" indent="0" algn="l" defTabSz="914400" rtl="0" eaLnBrk="1" fontAlgn="auto" latinLnBrk="0" hangingPunct="1">
+              <a:lnSpc>
+                <a:spcPct val="100000"/>
+              </a:lnSpc>
+              <a:spcBef>
+                <a:spcPts val="0"/>
+              </a:spcBef>
+              <a:spcAft>
+                <a:spcPts val="0"/>
+              </a:spcAft>
+              <a:buClrTx/>
+              <a:buSzTx/>
+              <a:buFontTx/>
+              <a:buNone/>
+              <a:tabLst/>
+              <a:defRPr/>
+            </a:pPr>
+            <a:r>
+              <a:rPr lang="en-US" dirty="0" smtClean="0"/>
+              <a:t>Visual Studio Integration </a:t>
+            </a:r>
+          </a:p>
+          <a:p>
+            <a:pPr marL="0" marR="0" lvl="0" indent="0" algn="l" defTabSz="914400" rtl="0" eaLnBrk="1" fontAlgn="auto" latinLnBrk="0" hangingPunct="1">
+              <a:lnSpc>
+                <a:spcPct val="100000"/>
+              </a:lnSpc>
+              <a:spcBef>
+                <a:spcPts val="0"/>
+              </a:spcBef>
+              <a:spcAft>
+                <a:spcPts val="0"/>
+              </a:spcAft>
+              <a:buClrTx/>
+              <a:buSzTx/>
+              <a:buFontTx/>
+              <a:buNone/>
+              <a:tabLst/>
+              <a:defRPr/>
+            </a:pPr>
+            <a:endParaRPr lang="en-US" dirty="0" smtClean="0"/>
+          </a:p>
+          <a:p>
+            <a:pPr lvl="0"/>
+            <a:endParaRPr lang="en-US" dirty="0" smtClean="0"/>
           </a:p>
         </p:txBody>
       </p:sp>
@@ -1197,7 +1196,7 @@
             <a:fld id="{B9DFB3AD-BC26-4EB1-9A72-FD37058C7E87}" type="slidenum">
               <a:rPr lang="en-US" smtClean="0"/>
               <a:pPr/>
-              <a:t>9</a:t>
+              <a:t>10</a:t>
             </a:fld>
             <a:endParaRPr lang="en-US"/>
           </a:p>
@@ -1206,7 +1205,7 @@
     </p:spTree>
     <p:extLst>
       <p:ext uri="{BB962C8B-B14F-4D97-AF65-F5344CB8AC3E}">
-        <p14:creationId xmlns:p14="http://schemas.microsoft.com/office/powerpoint/2010/main" val="2980022477"/>
+        <p14:creationId xmlns:p14="http://schemas.microsoft.com/office/powerpoint/2010/main" val="4113876280"/>
       </p:ext>
     </p:extLst>
   </p:cSld>
@@ -1262,93 +1261,6 @@
           </a:bodyPr>
           <a:lstStyle/>
           <a:p>
-            <a:endParaRPr lang="en-US" baseline="0" dirty="0" smtClean="0"/>
-          </a:p>
-        </p:txBody>
-      </p:sp>
-      <p:sp>
-        <p:nvSpPr>
-          <p:cNvPr id="4" name="Slide Number Placeholder 3"/>
-          <p:cNvSpPr>
-            <a:spLocks noGrp="1"/>
-          </p:cNvSpPr>
-          <p:nvPr>
-            <p:ph type="sldNum" sz="quarter" idx="10"/>
-          </p:nvPr>
-        </p:nvSpPr>
-        <p:spPr/>
-        <p:txBody>
-          <a:bodyPr/>
-          <a:lstStyle/>
-          <a:p>
-            <a:fld id="{B9DFB3AD-BC26-4EB1-9A72-FD37058C7E87}" type="slidenum">
-              <a:rPr lang="en-US" smtClean="0"/>
-              <a:pPr/>
-              <a:t>10</a:t>
-            </a:fld>
-            <a:endParaRPr lang="en-US"/>
-          </a:p>
-        </p:txBody>
-      </p:sp>
-    </p:spTree>
-    <p:extLst>
-      <p:ext uri="{BB962C8B-B14F-4D97-AF65-F5344CB8AC3E}">
-        <p14:creationId xmlns:p14="http://schemas.microsoft.com/office/powerpoint/2010/main" val="1850633223"/>
-      </p:ext>
-    </p:extLst>
-  </p:cSld>
-  <p:clrMapOvr>
-    <a:masterClrMapping/>
-  </p:clrMapOvr>
-</p:notes>
-</file>
-
-<file path=ppt/notesSlides/notesSlide8.xml><?xml version="1.0" encoding="utf-8"?>
-<p:notes xmlns:a="http://schemas.openxmlformats.org/drawingml/2006/main" xmlns:r="http://schemas.openxmlformats.org/officeDocument/2006/relationships" xmlns:p="http://schemas.openxmlformats.org/presentationml/2006/main">
-  <p:cSld>
-    <p:spTree>
-      <p:nvGrpSpPr>
-        <p:cNvPr id="1" name=""/>
-        <p:cNvGrpSpPr/>
-        <p:nvPr/>
-      </p:nvGrpSpPr>
-      <p:grpSpPr>
-        <a:xfrm>
-          <a:off x="0" y="0"/>
-          <a:ext cx="0" cy="0"/>
-          <a:chOff x="0" y="0"/>
-          <a:chExt cx="0" cy="0"/>
-        </a:xfrm>
-      </p:grpSpPr>
-      <p:sp>
-        <p:nvSpPr>
-          <p:cNvPr id="2" name="Slide Image Placeholder 1"/>
-          <p:cNvSpPr>
-            <a:spLocks noGrp="1" noRot="1" noChangeAspect="1"/>
-          </p:cNvSpPr>
-          <p:nvPr>
-            <p:ph type="sldImg"/>
-          </p:nvPr>
-        </p:nvSpPr>
-        <p:spPr/>
-      </p:sp>
-      <p:sp>
-        <p:nvSpPr>
-          <p:cNvPr id="3" name="Notes Placeholder 2"/>
-          <p:cNvSpPr>
-            <a:spLocks noGrp="1"/>
-          </p:cNvSpPr>
-          <p:nvPr>
-            <p:ph type="body" idx="1"/>
-          </p:nvPr>
-        </p:nvSpPr>
-        <p:spPr/>
-        <p:txBody>
-          <a:bodyPr>
-            <a:normAutofit/>
-          </a:bodyPr>
-          <a:lstStyle/>
-          <a:p>
             <a:r>
               <a:rPr lang="en-US" dirty="0" smtClean="0"/>
               <a:t>Jamie: Now</a:t>
@@ -1419,7 +1331,7 @@
 </p:notes>
 </file>
 
-<file path=ppt/notesSlides/notesSlide9.xml><?xml version="1.0" encoding="utf-8"?>
+<file path=ppt/notesSlides/notesSlide8.xml><?xml version="1.0" encoding="utf-8"?>
 <p:notes xmlns:a="http://schemas.openxmlformats.org/drawingml/2006/main" xmlns:r="http://schemas.openxmlformats.org/officeDocument/2006/relationships" xmlns:p="http://schemas.openxmlformats.org/presentationml/2006/main">
   <p:cSld>
     <p:spTree>
@@ -4618,40 +4530,69 @@
           <a:p>
             <a:r>
               <a:rPr lang="en-US" dirty="0" err="1" smtClean="0"/>
-              <a:t>PhoneGap</a:t>
+              <a:t>Xamarin</a:t>
             </a:r>
             <a:r>
               <a:rPr lang="en-US" dirty="0" smtClean="0"/>
-              <a:t> Build</a:t>
+              <a:t> Details</a:t>
             </a:r>
             <a:endParaRPr lang="en-US" dirty="0"/>
           </a:p>
         </p:txBody>
       </p:sp>
-      <p:pic>
-        <p:nvPicPr>
-          <p:cNvPr id="4" name="Content Placeholder 3" descr="Build-Diagram-3.png"/>
-          <p:cNvPicPr>
-            <a:picLocks noGrp="1" noChangeAspect="1"/>
-          </p:cNvPicPr>
+      <p:sp>
+        <p:nvSpPr>
+          <p:cNvPr id="3" name="Content Placeholder 2"/>
+          <p:cNvSpPr>
+            <a:spLocks noGrp="1"/>
+          </p:cNvSpPr>
           <p:nvPr>
             <p:ph idx="1"/>
           </p:nvPr>
-        </p:nvPicPr>
-        <p:blipFill>
-          <a:blip r:embed="rId3" cstate="print"/>
-          <a:stretch>
-            <a:fillRect/>
-          </a:stretch>
-        </p:blipFill>
-        <p:spPr>
-          <a:xfrm>
-            <a:off x="886362" y="1600200"/>
-            <a:ext cx="7371275" cy="4525963"/>
-          </a:xfrm>
-        </p:spPr>
-      </p:pic>
+        </p:nvSpPr>
+        <p:spPr/>
+        <p:txBody>
+          <a:bodyPr/>
+          <a:lstStyle/>
+          <a:p>
+            <a:r>
+              <a:rPr lang="en-US" dirty="0" smtClean="0"/>
+              <a:t>Cross-platform development with C#</a:t>
+            </a:r>
+          </a:p>
+          <a:p>
+            <a:r>
+              <a:rPr lang="en-US" dirty="0" smtClean="0"/>
+              <a:t>Create </a:t>
+            </a:r>
+            <a:r>
+              <a:rPr lang="en-US" dirty="0" smtClean="0"/>
+              <a:t>native apps using Native APIs</a:t>
+            </a:r>
+          </a:p>
+          <a:p>
+            <a:r>
+              <a:rPr lang="en-US" dirty="0" smtClean="0"/>
+              <a:t>Use </a:t>
+            </a:r>
+            <a:r>
+              <a:rPr lang="en-US" dirty="0" smtClean="0"/>
+              <a:t>any existing .NET </a:t>
+            </a:r>
+            <a:r>
+              <a:rPr lang="en-US" dirty="0" smtClean="0"/>
+              <a:t>Libraries</a:t>
+            </a:r>
+            <a:endParaRPr lang="en-US" dirty="0" smtClean="0"/>
+          </a:p>
+        </p:txBody>
+      </p:sp>
     </p:spTree>
+    <p:extLst>
+      <p:ext uri="{BB962C8B-B14F-4D97-AF65-F5344CB8AC3E}">
+        <p14:creationId xmlns:p14="http://schemas.microsoft.com/office/powerpoint/2010/main" val="4125018363"/>
+      </p:ext>
+    </p:extLst>
   </p:cSld>
   <p:clrMapOvr>
     <a:masterClrMapping/>
@@ -4685,28 +4626,58 @@
       </p:grpSpPr>
       <p:sp>
         <p:nvSpPr>
-          <p:cNvPr id="4" name="Title 3"/>
-          <p:cNvSpPr>
-            <a:spLocks noGrp="1"/>
-          </p:cNvSpPr>
-          <p:nvPr>
-            <p:ph type="ctrTitle"/>
-          </p:nvPr>
-        </p:nvSpPr>
-        <p:spPr/>
-        <p:txBody>
-          <a:bodyPr/>
-          <a:lstStyle/>
-          <a:p>
-            <a:r>
-              <a:rPr lang="en-US" dirty="0" err="1" smtClean="0"/>
-              <a:t>Xamarin</a:t>
-            </a:r>
-            <a:endParaRPr lang="en-US" dirty="0"/>
-          </a:p>
-        </p:txBody>
-      </p:sp>
+          <p:cNvPr id="2" name="Title 1"/>
+          <p:cNvSpPr>
+            <a:spLocks noGrp="1"/>
+          </p:cNvSpPr>
+          <p:nvPr>
+            <p:ph type="title"/>
+          </p:nvPr>
+        </p:nvSpPr>
+        <p:spPr/>
+        <p:txBody>
+          <a:bodyPr/>
+          <a:lstStyle/>
+          <a:p>
+            <a:endParaRPr lang="en-US"/>
+          </a:p>
+        </p:txBody>
+      </p:sp>
+      <p:pic>
+        <p:nvPicPr>
+          <p:cNvPr id="4" name="Content Placeholder 3"/>
+          <p:cNvPicPr>
+            <a:picLocks noGrp="1" noChangeAspect="1"/>
+          </p:cNvPicPr>
+          <p:nvPr>
+            <p:ph idx="1"/>
+          </p:nvPr>
+        </p:nvPicPr>
+        <p:blipFill>
+          <a:blip r:embed="rId2">
+            <a:extLst>
+              <a:ext uri="{28A0092B-C50C-407E-A947-70E740481C1C}">
+                <a14:useLocalDpi xmlns:a14="http://schemas.microsoft.com/office/drawing/2010/main" val="0"/>
+              </a:ext>
+            </a:extLst>
+          </a:blip>
+          <a:stretch>
+            <a:fillRect/>
+          </a:stretch>
+        </p:blipFill>
+        <p:spPr>
+          <a:xfrm>
+            <a:off x="1607127" y="2209800"/>
+            <a:ext cx="5929745" cy="2438400"/>
+          </a:xfrm>
+        </p:spPr>
+      </p:pic>
     </p:spTree>
+    <p:extLst>
+      <p:ext uri="{BB962C8B-B14F-4D97-AF65-F5344CB8AC3E}">
+        <p14:creationId xmlns:p14="http://schemas.microsoft.com/office/powerpoint/2010/main" val="2004705028"/>
+      </p:ext>
+    </p:extLst>
   </p:cSld>
   <p:clrMapOvr>
     <a:masterClrMapping/>
@@ -4740,26 +4711,22 @@
       </p:grpSpPr>
       <p:sp>
         <p:nvSpPr>
-          <p:cNvPr id="2" name="Title 1"/>
-          <p:cNvSpPr>
-            <a:spLocks noGrp="1"/>
-          </p:cNvSpPr>
-          <p:nvPr>
-            <p:ph type="title"/>
-          </p:nvPr>
-        </p:nvSpPr>
-        <p:spPr/>
-        <p:txBody>
-          <a:bodyPr/>
-          <a:lstStyle/>
-          <a:p>
-            <a:r>
-              <a:rPr lang="en-US" dirty="0" err="1" smtClean="0"/>
-              <a:t>Xamarin</a:t>
-            </a:r>
+          <p:cNvPr id="4" name="Title 3"/>
+          <p:cNvSpPr>
+            <a:spLocks noGrp="1"/>
+          </p:cNvSpPr>
+          <p:nvPr>
+            <p:ph type="ctrTitle"/>
+          </p:nvPr>
+        </p:nvSpPr>
+        <p:spPr/>
+        <p:txBody>
+          <a:bodyPr/>
+          <a:lstStyle/>
+          <a:p>
             <a:r>
               <a:rPr lang="en-US" dirty="0" smtClean="0"/>
-              <a:t> Details</a:t>
+              <a:t>Code Time</a:t>
             </a:r>
             <a:endParaRPr lang="en-US" dirty="0"/>
           </a:p>
@@ -4767,89 +4734,40 @@
       </p:sp>
       <p:sp>
         <p:nvSpPr>
-          <p:cNvPr id="3" name="Content Placeholder 2"/>
-          <p:cNvSpPr>
-            <a:spLocks noGrp="1"/>
-          </p:cNvSpPr>
-          <p:nvPr>
-            <p:ph idx="1"/>
-          </p:nvPr>
-        </p:nvSpPr>
-        <p:spPr/>
-        <p:txBody>
-          <a:bodyPr/>
-          <a:lstStyle/>
-          <a:p>
-            <a:r>
-              <a:rPr lang="en-US" dirty="0" smtClean="0"/>
-              <a:t>Cross-platform development with C#</a:t>
-            </a:r>
-          </a:p>
-          <a:p>
-            <a:pPr lvl="1"/>
-            <a:r>
-              <a:rPr lang="en-US" dirty="0" smtClean="0"/>
-              <a:t>Can develop Android and </a:t>
-            </a:r>
-            <a:r>
-              <a:rPr lang="en-US" dirty="0" err="1" smtClean="0"/>
-              <a:t>iOS</a:t>
-            </a:r>
-            <a:r>
-              <a:rPr lang="en-US" dirty="0" smtClean="0"/>
-              <a:t> apps</a:t>
-            </a:r>
-          </a:p>
-          <a:p>
-            <a:pPr lvl="2"/>
-            <a:r>
-              <a:rPr lang="en-US" dirty="0" err="1" smtClean="0"/>
-              <a:t>iOS</a:t>
-            </a:r>
-            <a:r>
-              <a:rPr lang="en-US" dirty="0" smtClean="0"/>
-              <a:t> requires network connection to Mac</a:t>
-            </a:r>
-          </a:p>
-          <a:p>
-            <a:r>
-              <a:rPr lang="en-US" dirty="0" smtClean="0"/>
-              <a:t>Create native apps using Native APIs</a:t>
-            </a:r>
-          </a:p>
-          <a:p>
-            <a:pPr lvl="1"/>
-            <a:r>
-              <a:rPr lang="en-US" dirty="0" smtClean="0"/>
-              <a:t>Compiled code</a:t>
-            </a:r>
-          </a:p>
-          <a:p>
-            <a:r>
-              <a:rPr lang="en-US" dirty="0" smtClean="0"/>
-              <a:t>Use any existing .NET Libraries</a:t>
-            </a:r>
-          </a:p>
-          <a:p>
-            <a:pPr lvl="1"/>
-            <a:r>
-              <a:rPr lang="en-US" dirty="0" smtClean="0"/>
-              <a:t>Visual Studio Integration </a:t>
-            </a:r>
-            <a:endParaRPr lang="en-US" dirty="0"/>
+          <p:cNvPr id="5" name="Subtitle 4"/>
+          <p:cNvSpPr>
+            <a:spLocks noGrp="1"/>
+          </p:cNvSpPr>
+          <p:nvPr>
+            <p:ph type="subTitle" idx="1"/>
+          </p:nvPr>
+        </p:nvSpPr>
+        <p:spPr/>
+        <p:txBody>
+          <a:bodyPr/>
+          <a:lstStyle/>
+          <a:p>
+            <a:endParaRPr lang="en-US"/>
           </a:p>
         </p:txBody>
       </p:sp>
     </p:spTree>
     <p:extLst>
       <p:ext uri="{BB962C8B-B14F-4D97-AF65-F5344CB8AC3E}">
-        <p14:creationId xmlns:p14="http://schemas.microsoft.com/office/powerpoint/2010/main" val="4125018363"/>
+        <p14:creationId xmlns:p14="http://schemas.microsoft.com/office/powerpoint/2010/main" val="3859893264"/>
       </p:ext>
     </p:extLst>
   </p:cSld>
   <p:clrMapOvr>
     <a:masterClrMapping/>
   </p:clrMapOvr>
+  <p:timing>
+    <p:tnLst>
+      <p:par>
+        <p:cTn id="1" dur="indefinite" restart="never" nodeType="tmRoot"/>
+      </p:par>
+    </p:tnLst>
+  </p:timing>
 </p:sld>
 </file>
 
@@ -6157,16 +6075,8 @@
           <a:lstStyle/>
           <a:p>
             <a:r>
-              <a:rPr lang="en-US" dirty="0" smtClean="0"/>
-              <a:t>Testing a </a:t>
-            </a:r>
-            <a:r>
               <a:rPr lang="en-US" dirty="0" err="1" smtClean="0"/>
-              <a:t>PhoneGap</a:t>
-            </a:r>
-            <a:r>
-              <a:rPr lang="en-US" dirty="0" smtClean="0"/>
-              <a:t> App</a:t>
+              <a:t>Xamarin</a:t>
             </a:r>
             <a:endParaRPr lang="en-US" dirty="0"/>
           </a:p>

</xml_diff>

<commit_message>
Added vendor thanks slide
</commit_message>
<xml_diff>
--- a/JointSpeakerTalks/PhoneGapXamarin/M3Conf2013/PhoneGap and Xamarin.pptx
+++ b/JointSpeakerTalks/PhoneGapXamarin/M3Conf2013/PhoneGap and Xamarin.pptx
@@ -5,7 +5,7 @@
     <p:sldMasterId id="2147483648" r:id="rId1"/>
   </p:sldMasterIdLst>
   <p:notesMasterIdLst>
-    <p:notesMasterId r:id="rId19"/>
+    <p:notesMasterId r:id="rId20"/>
   </p:notesMasterIdLst>
   <p:sldIdLst>
     <p:sldId id="256" r:id="rId2"/>
@@ -23,8 +23,9 @@
     <p:sldId id="267" r:id="rId14"/>
     <p:sldId id="273" r:id="rId15"/>
     <p:sldId id="270" r:id="rId16"/>
-    <p:sldId id="274" r:id="rId17"/>
-    <p:sldId id="271" r:id="rId18"/>
+    <p:sldId id="278" r:id="rId17"/>
+    <p:sldId id="274" r:id="rId18"/>
+    <p:sldId id="271" r:id="rId19"/>
   </p:sldIdLst>
   <p:sldSz cx="9144000" cy="6858000" type="screen4x3"/>
   <p:notesSz cx="6858000" cy="9144000"/>
@@ -5105,6 +5106,91 @@
           <a:bodyPr/>
           <a:lstStyle/>
           <a:p>
+            <a:endParaRPr lang="en-US"/>
+          </a:p>
+        </p:txBody>
+      </p:sp>
+      <p:pic>
+        <p:nvPicPr>
+          <p:cNvPr id="7" name="Content Placeholder 6"/>
+          <p:cNvPicPr>
+            <a:picLocks noGrp="1" noChangeAspect="1"/>
+          </p:cNvPicPr>
+          <p:nvPr>
+            <p:ph idx="1"/>
+          </p:nvPr>
+        </p:nvPicPr>
+        <p:blipFill>
+          <a:blip r:embed="rId2" cstate="print">
+            <a:extLst>
+              <a:ext uri="{28A0092B-C50C-407E-A947-70E740481C1C}">
+                <a14:useLocalDpi xmlns:a14="http://schemas.microsoft.com/office/drawing/2010/main" val="0"/>
+              </a:ext>
+            </a:extLst>
+          </a:blip>
+          <a:stretch>
+            <a:fillRect/>
+          </a:stretch>
+        </p:blipFill>
+        <p:spPr>
+          <a:xfrm>
+            <a:off x="203200" y="152400"/>
+            <a:ext cx="8737600" cy="6553200"/>
+          </a:xfrm>
+        </p:spPr>
+      </p:pic>
+    </p:spTree>
+    <p:extLst>
+      <p:ext uri="{BB962C8B-B14F-4D97-AF65-F5344CB8AC3E}">
+        <p14:creationId xmlns:p14="http://schemas.microsoft.com/office/powerpoint/2010/main" val="1309489257"/>
+      </p:ext>
+    </p:extLst>
+  </p:cSld>
+  <p:clrMapOvr>
+    <a:masterClrMapping/>
+  </p:clrMapOvr>
+  <p:timing>
+    <p:tnLst>
+      <p:par>
+        <p:cTn id="1" dur="indefinite" restart="never" nodeType="tmRoot"/>
+      </p:par>
+    </p:tnLst>
+  </p:timing>
+</p:sld>
+</file>
+
+<file path=ppt/slides/slide17.xml><?xml version="1.0" encoding="utf-8"?>
+<p:sld xmlns:a="http://schemas.openxmlformats.org/drawingml/2006/main" xmlns:r="http://schemas.openxmlformats.org/officeDocument/2006/relationships" xmlns:p="http://schemas.openxmlformats.org/presentationml/2006/main">
+  <p:cSld>
+    <p:spTree>
+      <p:nvGrpSpPr>
+        <p:cNvPr id="1" name=""/>
+        <p:cNvGrpSpPr/>
+        <p:nvPr/>
+      </p:nvGrpSpPr>
+      <p:grpSpPr>
+        <a:xfrm>
+          <a:off x="0" y="0"/>
+          <a:ext cx="0" cy="0"/>
+          <a:chOff x="0" y="0"/>
+          <a:chExt cx="0" cy="0"/>
+        </a:xfrm>
+      </p:grpSpPr>
+      <p:sp>
+        <p:nvSpPr>
+          <p:cNvPr id="2" name="Title 1"/>
+          <p:cNvSpPr>
+            <a:spLocks noGrp="1"/>
+          </p:cNvSpPr>
+          <p:nvPr>
+            <p:ph type="title"/>
+          </p:nvPr>
+        </p:nvSpPr>
+        <p:spPr/>
+        <p:txBody>
+          <a:bodyPr/>
+          <a:lstStyle/>
+          <a:p>
             <a:r>
               <a:rPr lang="en-US" dirty="0" smtClean="0"/>
               <a:t>Contact Us</a:t>
@@ -5234,7 +5320,6 @@
               <a:rPr lang="en-US" dirty="0"/>
               <a:t>http://bit.ly/16wOVaP</a:t>
             </a:r>
-            <a:endParaRPr lang="en-US" dirty="0"/>
           </a:p>
         </p:txBody>
       </p:sp>
@@ -5258,7 +5343,7 @@
 </p:sld>
 </file>
 
-<file path=ppt/slides/slide17.xml><?xml version="1.0" encoding="utf-8"?>
+<file path=ppt/slides/slide18.xml><?xml version="1.0" encoding="utf-8"?>
 <p:sld xmlns:a="http://schemas.openxmlformats.org/drawingml/2006/main" xmlns:r="http://schemas.openxmlformats.org/officeDocument/2006/relationships" xmlns:p="http://schemas.openxmlformats.org/presentationml/2006/main">
   <p:cSld>
     <p:spTree>

</xml_diff>

<commit_message>
added contact email and changed layout of contact slide
</commit_message>
<xml_diff>
--- a/JointSpeakerTalks/PhoneGapXamarin/M3Conf2013/PhoneGap and Xamarin.pptx
+++ b/JointSpeakerTalks/PhoneGapXamarin/M3Conf2013/PhoneGap and Xamarin.pptx
@@ -5206,13 +5206,18 @@
             <a:spLocks noGrp="1"/>
           </p:cNvSpPr>
           <p:nvPr>
-            <p:ph idx="1"/>
-          </p:nvPr>
-        </p:nvSpPr>
-        <p:spPr/>
+            <p:ph sz="half" idx="1"/>
+          </p:nvPr>
+        </p:nvSpPr>
+        <p:spPr>
+          <a:xfrm>
+            <a:off x="457200" y="1600201"/>
+            <a:ext cx="4038600" cy="2057400"/>
+          </a:xfrm>
+        </p:spPr>
         <p:txBody>
           <a:bodyPr>
-            <a:normAutofit fontScale="85000" lnSpcReduction="20000"/>
+            <a:normAutofit/>
           </a:bodyPr>
           <a:lstStyle/>
           <a:p>
@@ -5220,12 +5225,12 @@
               <a:buNone/>
             </a:pPr>
             <a:r>
-              <a:rPr lang="en-US" b="1" dirty="0" err="1" smtClean="0"/>
-              <a:t>Jerrel</a:t>
-            </a:r>
-            <a:r>
-              <a:rPr lang="en-US" b="1" dirty="0" smtClean="0"/>
-              <a:t> Blankenship</a:t>
+              <a:rPr lang="en-US" sz="2400" b="1" dirty="0" smtClean="0"/>
+              <a:t>Jerrel </a:t>
+            </a:r>
+            <a:r>
+              <a:rPr lang="en-US" sz="2400" b="1" dirty="0" smtClean="0"/>
+              <a:t>Blankenship</a:t>
             </a:r>
           </a:p>
           <a:p>
@@ -5233,21 +5238,26 @@
               <a:buNone/>
             </a:pPr>
             <a:r>
-              <a:rPr lang="en-US" dirty="0" smtClean="0"/>
-              <a:t>@</a:t>
-            </a:r>
-            <a:r>
-              <a:rPr lang="en-US" dirty="0" err="1" smtClean="0"/>
-              <a:t>TheJerrel</a:t>
-            </a:r>
-            <a:endParaRPr lang="en-US" dirty="0" smtClean="0"/>
+              <a:rPr lang="en-US" sz="2400" dirty="0" smtClean="0"/>
+              <a:t>Jerrel@jerrelblankenship.com</a:t>
+            </a:r>
+            <a:endParaRPr lang="en-US" sz="2400" dirty="0" smtClean="0"/>
           </a:p>
           <a:p>
             <a:pPr algn="ctr">
               <a:buNone/>
             </a:pPr>
             <a:r>
-              <a:rPr lang="en-US" dirty="0" smtClean="0"/>
+              <a:rPr lang="en-US" sz="2400" dirty="0" smtClean="0"/>
+              <a:t>@TheJerrel</a:t>
+            </a:r>
+          </a:p>
+          <a:p>
+            <a:pPr algn="ctr">
+              <a:buNone/>
+            </a:pPr>
+            <a:r>
+              <a:rPr lang="en-US" sz="2400" dirty="0" smtClean="0"/>
               <a:t>www.jerrelblankenship.com</a:t>
             </a:r>
           </a:p>
@@ -5261,65 +5271,113 @@
             <a:pPr algn="ctr">
               <a:buNone/>
             </a:pPr>
-            <a:r>
-              <a:rPr lang="en-US" b="1" dirty="0" smtClean="0"/>
-              <a:t>Jamie </a:t>
-            </a:r>
-            <a:r>
-              <a:rPr lang="en-US" b="1" dirty="0" err="1" smtClean="0"/>
-              <a:t>Dicken</a:t>
-            </a:r>
-            <a:endParaRPr lang="en-US" b="1" dirty="0" smtClean="0"/>
-          </a:p>
+            <a:endParaRPr lang="en-US" dirty="0"/>
+          </a:p>
+        </p:txBody>
+      </p:sp>
+      <p:sp>
+        <p:nvSpPr>
+          <p:cNvPr id="4" name="Content Placeholder 3"/>
+          <p:cNvSpPr>
+            <a:spLocks noGrp="1"/>
+          </p:cNvSpPr>
+          <p:nvPr>
+            <p:ph sz="half" idx="2"/>
+          </p:nvPr>
+        </p:nvSpPr>
+        <p:spPr>
+          <a:xfrm>
+            <a:off x="4648200" y="1600200"/>
+            <a:ext cx="4038600" cy="2057401"/>
+          </a:xfrm>
+        </p:spPr>
+        <p:txBody>
+          <a:bodyPr>
+            <a:normAutofit/>
+          </a:bodyPr>
+          <a:lstStyle/>
           <a:p>
             <a:pPr algn="ctr">
               <a:buNone/>
             </a:pPr>
             <a:r>
-              <a:rPr lang="en-US" dirty="0" smtClean="0"/>
-              <a:t>@</a:t>
-            </a:r>
-            <a:r>
-              <a:rPr lang="en-US" dirty="0" err="1" smtClean="0"/>
-              <a:t>DotNetGeekette</a:t>
-            </a:r>
-            <a:endParaRPr lang="en-US" dirty="0" smtClean="0"/>
+              <a:rPr lang="en-US" sz="2400" b="1" dirty="0"/>
+              <a:t>Jamie Dicken</a:t>
+            </a:r>
           </a:p>
           <a:p>
             <a:pPr algn="ctr">
               <a:buNone/>
             </a:pPr>
             <a:r>
-              <a:rPr lang="en-US" dirty="0" smtClean="0">
-                <a:hlinkClick r:id="rId2"/>
-              </a:rPr>
+              <a:rPr lang="en-US" sz="2400" dirty="0"/>
+              <a:t>Jamie@dotnetgeekette.com</a:t>
+            </a:r>
+          </a:p>
+          <a:p>
+            <a:pPr algn="ctr">
+              <a:buNone/>
+            </a:pPr>
+            <a:r>
+              <a:rPr lang="en-US" sz="2400" dirty="0"/>
+              <a:t>@DotNetGeekette</a:t>
+            </a:r>
+          </a:p>
+          <a:p>
+            <a:pPr algn="ctr">
+              <a:buNone/>
+            </a:pPr>
+            <a:r>
+              <a:rPr lang="en-US" sz="2400" dirty="0"/>
               <a:t>www.dotnetgeekette.com</a:t>
             </a:r>
-            <a:endParaRPr lang="en-US" dirty="0" smtClean="0"/>
-          </a:p>
+          </a:p>
+          <a:p>
+            <a:endParaRPr lang="en-US" dirty="0"/>
+          </a:p>
+        </p:txBody>
+      </p:sp>
+      <p:sp>
+        <p:nvSpPr>
+          <p:cNvPr id="5" name="TextBox 4"/>
+          <p:cNvSpPr txBox="1"/>
+          <p:nvPr/>
+        </p:nvSpPr>
+        <p:spPr>
+          <a:xfrm>
+            <a:off x="2307957" y="4114800"/>
+            <a:ext cx="4528085" cy="1200329"/>
+          </a:xfrm>
+          <a:prstGeom prst="rect">
+            <a:avLst/>
+          </a:prstGeom>
+          <a:noFill/>
+        </p:spPr>
+        <p:txBody>
+          <a:bodyPr wrap="square" rtlCol="0">
+            <a:spAutoFit/>
+          </a:bodyPr>
+          <a:lstStyle/>
           <a:p>
             <a:pPr algn="ctr">
               <a:buNone/>
             </a:pPr>
-            <a:endParaRPr lang="en-US" dirty="0"/>
+            <a:r>
+              <a:rPr lang="en-US" sz="2400" dirty="0"/>
+              <a:t>Slide Deck Link:</a:t>
+            </a:r>
           </a:p>
           <a:p>
             <a:pPr algn="ctr">
               <a:buNone/>
             </a:pPr>
             <a:r>
-              <a:rPr lang="en-US" dirty="0" smtClean="0"/>
-              <a:t>Slide Link:</a:t>
-            </a:r>
-          </a:p>
-          <a:p>
-            <a:pPr algn="ctr">
-              <a:buNone/>
-            </a:pPr>
-            <a:r>
-              <a:rPr lang="en-US" dirty="0"/>
+              <a:rPr lang="en-US" sz="2400" dirty="0"/>
               <a:t>http://bit.ly/16wOVaP</a:t>
             </a:r>
+          </a:p>
+          <a:p>
+            <a:endParaRPr lang="en-US" sz="2400" dirty="0"/>
           </a:p>
         </p:txBody>
       </p:sp>
@@ -5555,13 +5613,8 @@
             </a:pPr>
             <a:r>
               <a:rPr lang="en-US" dirty="0" smtClean="0"/>
-              <a:t>@</a:t>
-            </a:r>
-            <a:r>
-              <a:rPr lang="en-US" dirty="0" err="1" smtClean="0"/>
-              <a:t>TheJerrel</a:t>
-            </a:r>
-            <a:endParaRPr lang="en-US" dirty="0" smtClean="0"/>
+              <a:t>@TheJerrel</a:t>
+            </a:r>
           </a:p>
           <a:p>
             <a:pPr algn="ctr">
@@ -5647,13 +5700,8 @@
             </a:pPr>
             <a:r>
               <a:rPr lang="en-US" dirty="0" smtClean="0"/>
-              <a:t>@</a:t>
-            </a:r>
-            <a:r>
-              <a:rPr lang="en-US" dirty="0" err="1" smtClean="0"/>
-              <a:t>DotNetGeekette</a:t>
-            </a:r>
-            <a:endParaRPr lang="en-US" dirty="0" smtClean="0"/>
+              <a:t>@DotNetGeekette</a:t>
+            </a:r>
           </a:p>
           <a:p>
             <a:pPr algn="ctr">

</xml_diff>

<commit_message>
merged two slides and changed title of slide #3
</commit_message>
<xml_diff>
--- a/JointSpeakerTalks/PhoneGapXamarin/M3Conf2013/PhoneGap and Xamarin.pptx
+++ b/JointSpeakerTalks/PhoneGapXamarin/M3Conf2013/PhoneGap and Xamarin.pptx
@@ -5,7 +5,7 @@
     <p:sldMasterId id="2147483648" r:id="rId1"/>
   </p:sldMasterIdLst>
   <p:notesMasterIdLst>
-    <p:notesMasterId r:id="rId20"/>
+    <p:notesMasterId r:id="rId19"/>
   </p:notesMasterIdLst>
   <p:sldIdLst>
     <p:sldId id="256" r:id="rId2"/>
@@ -18,14 +18,13 @@
     <p:sldId id="262" r:id="rId9"/>
     <p:sldId id="266" r:id="rId10"/>
     <p:sldId id="275" r:id="rId11"/>
-    <p:sldId id="277" r:id="rId12"/>
-    <p:sldId id="276" r:id="rId13"/>
-    <p:sldId id="267" r:id="rId14"/>
-    <p:sldId id="273" r:id="rId15"/>
-    <p:sldId id="270" r:id="rId16"/>
-    <p:sldId id="278" r:id="rId17"/>
-    <p:sldId id="274" r:id="rId18"/>
-    <p:sldId id="271" r:id="rId19"/>
+    <p:sldId id="276" r:id="rId12"/>
+    <p:sldId id="267" r:id="rId13"/>
+    <p:sldId id="273" r:id="rId14"/>
+    <p:sldId id="270" r:id="rId15"/>
+    <p:sldId id="278" r:id="rId16"/>
+    <p:sldId id="274" r:id="rId17"/>
+    <p:sldId id="271" r:id="rId18"/>
   </p:sldIdLst>
   <p:sldSz cx="9144000" cy="6858000" type="screen4x3"/>
   <p:notesSz cx="6858000" cy="9144000"/>
@@ -1398,7 +1397,7 @@
             <a:fld id="{B9DFB3AD-BC26-4EB1-9A72-FD37058C7E87}" type="slidenum">
               <a:rPr lang="en-US" smtClean="0"/>
               <a:pPr/>
-              <a:t>13</a:t>
+              <a:t>12</a:t>
             </a:fld>
             <a:endParaRPr lang="en-US"/>
           </a:p>
@@ -1514,7 +1513,7 @@
             <a:fld id="{B9DFB3AD-BC26-4EB1-9A72-FD37058C7E87}" type="slidenum">
               <a:rPr lang="en-US" smtClean="0"/>
               <a:pPr/>
-              <a:t>15</a:t>
+              <a:t>14</a:t>
             </a:fld>
             <a:endParaRPr lang="en-US"/>
           </a:p>
@@ -4552,18 +4551,9 @@
           <a:lstStyle/>
           <a:p>
             <a:r>
-              <a:rPr lang="en-US" dirty="0" err="1" smtClean="0"/>
-              <a:t>Jerrel</a:t>
-            </a:r>
-            <a:r>
               <a:rPr lang="en-US" dirty="0" smtClean="0"/>
-              <a:t> Blankenship &amp; Jamie </a:t>
-            </a:r>
-            <a:r>
-              <a:rPr lang="en-US" dirty="0" err="1" smtClean="0"/>
-              <a:t>Dicken</a:t>
-            </a:r>
-            <a:endParaRPr lang="en-US" dirty="0" smtClean="0"/>
+              <a:t>Jerrel Blankenship &amp; Jamie Dicken</a:t>
+            </a:r>
           </a:p>
         </p:txBody>
       </p:sp>
@@ -4660,6 +4650,36 @@
           </a:p>
         </p:txBody>
       </p:sp>
+      <p:pic>
+        <p:nvPicPr>
+          <p:cNvPr id="4" name="Content Placeholder 3"/>
+          <p:cNvPicPr>
+            <a:picLocks noChangeAspect="1"/>
+          </p:cNvPicPr>
+          <p:nvPr/>
+        </p:nvPicPr>
+        <p:blipFill>
+          <a:blip r:embed="rId3">
+            <a:extLst>
+              <a:ext uri="{28A0092B-C50C-407E-A947-70E740481C1C}">
+                <a14:useLocalDpi xmlns:a14="http://schemas.microsoft.com/office/drawing/2010/main" val="0"/>
+              </a:ext>
+            </a:extLst>
+          </a:blip>
+          <a:stretch>
+            <a:fillRect/>
+          </a:stretch>
+        </p:blipFill>
+        <p:spPr>
+          <a:xfrm>
+            <a:off x="1295400" y="3429000"/>
+            <a:ext cx="6553200" cy="2697163"/>
+          </a:xfrm>
+          <a:prstGeom prst="rect">
+            <a:avLst/>
+          </a:prstGeom>
+        </p:spPr>
+      </p:pic>
     </p:spTree>
     <p:extLst>
       <p:ext uri="{BB962C8B-B14F-4D97-AF65-F5344CB8AC3E}">
@@ -4673,7 +4693,121 @@
   <p:timing>
     <p:tnLst>
       <p:par>
-        <p:cTn id="1" dur="indefinite" restart="never" nodeType="tmRoot"/>
+        <p:cTn id="1" dur="indefinite" restart="never" nodeType="tmRoot">
+          <p:childTnLst>
+            <p:seq concurrent="1" nextAc="seek">
+              <p:cTn id="2" dur="indefinite" nodeType="mainSeq">
+                <p:childTnLst>
+                  <p:par>
+                    <p:cTn id="3" fill="hold">
+                      <p:stCondLst>
+                        <p:cond delay="indefinite"/>
+                      </p:stCondLst>
+                      <p:childTnLst>
+                        <p:par>
+                          <p:cTn id="4" fill="hold">
+                            <p:stCondLst>
+                              <p:cond delay="0"/>
+                            </p:stCondLst>
+                            <p:childTnLst>
+                              <p:par>
+                                <p:cTn id="5" presetID="2" presetClass="entr" presetSubtype="4" fill="hold" nodeType="clickEffect">
+                                  <p:stCondLst>
+                                    <p:cond delay="0"/>
+                                  </p:stCondLst>
+                                  <p:childTnLst>
+                                    <p:set>
+                                      <p:cBhvr>
+                                        <p:cTn id="6" dur="1" fill="hold">
+                                          <p:stCondLst>
+                                            <p:cond delay="0"/>
+                                          </p:stCondLst>
+                                        </p:cTn>
+                                        <p:tgtEl>
+                                          <p:spTgt spid="4"/>
+                                        </p:tgtEl>
+                                        <p:attrNameLst>
+                                          <p:attrName>style.visibility</p:attrName>
+                                        </p:attrNameLst>
+                                      </p:cBhvr>
+                                      <p:to>
+                                        <p:strVal val="visible"/>
+                                      </p:to>
+                                    </p:set>
+                                    <p:anim calcmode="lin" valueType="num">
+                                      <p:cBhvr additive="base">
+                                        <p:cTn id="7" dur="500" fill="hold"/>
+                                        <p:tgtEl>
+                                          <p:spTgt spid="4"/>
+                                        </p:tgtEl>
+                                        <p:attrNameLst>
+                                          <p:attrName>ppt_x</p:attrName>
+                                        </p:attrNameLst>
+                                      </p:cBhvr>
+                                      <p:tavLst>
+                                        <p:tav tm="0">
+                                          <p:val>
+                                            <p:strVal val="#ppt_x"/>
+                                          </p:val>
+                                        </p:tav>
+                                        <p:tav tm="100000">
+                                          <p:val>
+                                            <p:strVal val="#ppt_x"/>
+                                          </p:val>
+                                        </p:tav>
+                                      </p:tavLst>
+                                    </p:anim>
+                                    <p:anim calcmode="lin" valueType="num">
+                                      <p:cBhvr additive="base">
+                                        <p:cTn id="8" dur="500" fill="hold"/>
+                                        <p:tgtEl>
+                                          <p:spTgt spid="4"/>
+                                        </p:tgtEl>
+                                        <p:attrNameLst>
+                                          <p:attrName>ppt_y</p:attrName>
+                                        </p:attrNameLst>
+                                      </p:cBhvr>
+                                      <p:tavLst>
+                                        <p:tav tm="0">
+                                          <p:val>
+                                            <p:strVal val="1+#ppt_h/2"/>
+                                          </p:val>
+                                        </p:tav>
+                                        <p:tav tm="100000">
+                                          <p:val>
+                                            <p:strVal val="#ppt_y"/>
+                                          </p:val>
+                                        </p:tav>
+                                      </p:tavLst>
+                                    </p:anim>
+                                  </p:childTnLst>
+                                </p:cTn>
+                              </p:par>
+                            </p:childTnLst>
+                          </p:cTn>
+                        </p:par>
+                      </p:childTnLst>
+                    </p:cTn>
+                  </p:par>
+                </p:childTnLst>
+              </p:cTn>
+              <p:prevCondLst>
+                <p:cond evt="onPrev" delay="0">
+                  <p:tgtEl>
+                    <p:sldTgt/>
+                  </p:tgtEl>
+                </p:cond>
+              </p:prevCondLst>
+              <p:nextCondLst>
+                <p:cond evt="onNext" delay="0">
+                  <p:tgtEl>
+                    <p:sldTgt/>
+                  </p:tgtEl>
+                </p:cond>
+              </p:nextCondLst>
+            </p:seq>
+          </p:childTnLst>
+        </p:cTn>
       </p:par>
     </p:tnLst>
   </p:timing>
@@ -4699,56 +4833,50 @@
       </p:grpSpPr>
       <p:sp>
         <p:nvSpPr>
-          <p:cNvPr id="2" name="Title 1"/>
-          <p:cNvSpPr>
-            <a:spLocks noGrp="1"/>
-          </p:cNvSpPr>
-          <p:nvPr>
-            <p:ph type="title"/>
-          </p:nvPr>
-        </p:nvSpPr>
-        <p:spPr/>
-        <p:txBody>
-          <a:bodyPr/>
-          <a:lstStyle/>
-          <a:p>
-            <a:endParaRPr lang="en-US"/>
-          </a:p>
-        </p:txBody>
-      </p:sp>
-      <p:pic>
-        <p:nvPicPr>
-          <p:cNvPr id="4" name="Content Placeholder 3"/>
-          <p:cNvPicPr>
-            <a:picLocks noGrp="1" noChangeAspect="1"/>
-          </p:cNvPicPr>
-          <p:nvPr>
-            <p:ph idx="1"/>
-          </p:nvPr>
-        </p:nvPicPr>
-        <p:blipFill>
-          <a:blip r:embed="rId2">
-            <a:extLst>
-              <a:ext uri="{28A0092B-C50C-407E-A947-70E740481C1C}">
-                <a14:useLocalDpi xmlns:a14="http://schemas.microsoft.com/office/drawing/2010/main" val="0"/>
-              </a:ext>
-            </a:extLst>
-          </a:blip>
-          <a:stretch>
-            <a:fillRect/>
-          </a:stretch>
-        </p:blipFill>
-        <p:spPr>
-          <a:xfrm>
-            <a:off x="1607127" y="2209800"/>
-            <a:ext cx="5929745" cy="2438400"/>
-          </a:xfrm>
-        </p:spPr>
-      </p:pic>
+          <p:cNvPr id="4" name="Title 3"/>
+          <p:cNvSpPr>
+            <a:spLocks noGrp="1"/>
+          </p:cNvSpPr>
+          <p:nvPr>
+            <p:ph type="ctrTitle"/>
+          </p:nvPr>
+        </p:nvSpPr>
+        <p:spPr/>
+        <p:txBody>
+          <a:bodyPr/>
+          <a:lstStyle/>
+          <a:p>
+            <a:r>
+              <a:rPr lang="en-US" dirty="0" smtClean="0"/>
+              <a:t>Code Time</a:t>
+            </a:r>
+            <a:endParaRPr lang="en-US" dirty="0"/>
+          </a:p>
+        </p:txBody>
+      </p:sp>
+      <p:sp>
+        <p:nvSpPr>
+          <p:cNvPr id="5" name="Subtitle 4"/>
+          <p:cNvSpPr>
+            <a:spLocks noGrp="1"/>
+          </p:cNvSpPr>
+          <p:nvPr>
+            <p:ph type="subTitle" idx="1"/>
+          </p:nvPr>
+        </p:nvSpPr>
+        <p:spPr/>
+        <p:txBody>
+          <a:bodyPr/>
+          <a:lstStyle/>
+          <a:p>
+            <a:endParaRPr lang="en-US"/>
+          </a:p>
+        </p:txBody>
+      </p:sp>
     </p:spTree>
     <p:extLst>
       <p:ext uri="{BB962C8B-B14F-4D97-AF65-F5344CB8AC3E}">
-        <p14:creationId xmlns:p14="http://schemas.microsoft.com/office/powerpoint/2010/main" val="2004705028"/>
+        <p14:creationId xmlns:p14="http://schemas.microsoft.com/office/powerpoint/2010/main" val="3859893264"/>
       </p:ext>
     </p:extLst>
   </p:cSld>
@@ -4798,38 +4926,33 @@
           <a:lstStyle/>
           <a:p>
             <a:r>
+              <a:rPr lang="en-US" dirty="0" err="1" smtClean="0"/>
+              <a:t>PhoneGap</a:t>
+            </a:r>
+            <a:r>
               <a:rPr lang="en-US" dirty="0" smtClean="0"/>
-              <a:t>Code Time</a:t>
+              <a:t> v. </a:t>
+            </a:r>
+            <a:r>
+              <a:rPr lang="en-US" dirty="0" err="1" smtClean="0"/>
+              <a:t>Xamarin</a:t>
+            </a:r>
+            <a:r>
+              <a:rPr lang="en-US" dirty="0" smtClean="0"/>
+              <a:t>:</a:t>
+            </a:r>
+            <a:br>
+              <a:rPr lang="en-US" dirty="0" smtClean="0"/>
+            </a:br>
+            <a:r>
+              <a:rPr lang="en-US" dirty="0" smtClean="0"/>
+              <a:t>Which do I choose?</a:t>
             </a:r>
             <a:endParaRPr lang="en-US" dirty="0"/>
           </a:p>
         </p:txBody>
       </p:sp>
-      <p:sp>
-        <p:nvSpPr>
-          <p:cNvPr id="5" name="Subtitle 4"/>
-          <p:cNvSpPr>
-            <a:spLocks noGrp="1"/>
-          </p:cNvSpPr>
-          <p:nvPr>
-            <p:ph type="subTitle" idx="1"/>
-          </p:nvPr>
-        </p:nvSpPr>
-        <p:spPr/>
-        <p:txBody>
-          <a:bodyPr/>
-          <a:lstStyle/>
-          <a:p>
-            <a:endParaRPr lang="en-US"/>
-          </a:p>
-        </p:txBody>
-      </p:sp>
     </p:spTree>
-    <p:extLst>
-      <p:ext uri="{BB962C8B-B14F-4D97-AF65-F5344CB8AC3E}">
-        <p14:creationId xmlns:p14="http://schemas.microsoft.com/office/powerpoint/2010/main" val="3859893264"/>
-      </p:ext>
-    </p:extLst>
   </p:cSld>
   <p:clrMapOvr>
     <a:masterClrMapping/>
@@ -4863,47 +4986,74 @@
       </p:grpSpPr>
       <p:sp>
         <p:nvSpPr>
-          <p:cNvPr id="4" name="Title 3"/>
-          <p:cNvSpPr>
-            <a:spLocks noGrp="1"/>
-          </p:cNvSpPr>
-          <p:nvPr>
-            <p:ph type="ctrTitle"/>
-          </p:nvPr>
-        </p:nvSpPr>
-        <p:spPr/>
-        <p:txBody>
-          <a:bodyPr/>
-          <a:lstStyle/>
-          <a:p>
-            <a:r>
-              <a:rPr lang="en-US" dirty="0" err="1" smtClean="0"/>
-              <a:t>PhoneGap</a:t>
-            </a:r>
+          <p:cNvPr id="2" name="Title 1"/>
+          <p:cNvSpPr>
+            <a:spLocks noGrp="1"/>
+          </p:cNvSpPr>
+          <p:nvPr>
+            <p:ph type="title"/>
+          </p:nvPr>
+        </p:nvSpPr>
+        <p:spPr/>
+        <p:txBody>
+          <a:bodyPr/>
+          <a:lstStyle/>
+          <a:p>
             <a:r>
               <a:rPr lang="en-US" dirty="0" smtClean="0"/>
-              <a:t> v. </a:t>
-            </a:r>
-            <a:r>
-              <a:rPr lang="en-US" dirty="0" err="1" smtClean="0"/>
-              <a:t>Xamarin</a:t>
-            </a:r>
+              <a:t>Key Considerations</a:t>
+            </a:r>
+            <a:endParaRPr lang="en-US" dirty="0"/>
+          </a:p>
+        </p:txBody>
+      </p:sp>
+      <p:sp>
+        <p:nvSpPr>
+          <p:cNvPr id="3" name="Content Placeholder 2"/>
+          <p:cNvSpPr>
+            <a:spLocks noGrp="1"/>
+          </p:cNvSpPr>
+          <p:nvPr>
+            <p:ph idx="1"/>
+          </p:nvPr>
+        </p:nvSpPr>
+        <p:spPr/>
+        <p:txBody>
+          <a:bodyPr/>
+          <a:lstStyle/>
+          <a:p>
             <a:r>
               <a:rPr lang="en-US" dirty="0" smtClean="0"/>
-              <a:t>:</a:t>
-            </a:r>
-            <a:br>
+              <a:t>Cost</a:t>
+            </a:r>
+          </a:p>
+          <a:p>
+            <a:r>
               <a:rPr lang="en-US" dirty="0" smtClean="0"/>
-            </a:br>
+              <a:t>Performance</a:t>
+            </a:r>
+          </a:p>
+          <a:p>
             <a:r>
               <a:rPr lang="en-US" dirty="0" smtClean="0"/>
-              <a:t>Which do I choose?</a:t>
+              <a:t>Supported platforms</a:t>
+            </a:r>
+          </a:p>
+          <a:p>
+            <a:r>
+              <a:rPr lang="en-US" dirty="0" smtClean="0"/>
+              <a:t>Native app experience</a:t>
             </a:r>
             <a:endParaRPr lang="en-US" dirty="0"/>
           </a:p>
         </p:txBody>
       </p:sp>
     </p:spTree>
+    <p:extLst>
+      <p:ext uri="{BB962C8B-B14F-4D97-AF65-F5344CB8AC3E}">
+        <p14:creationId xmlns:p14="http://schemas.microsoft.com/office/powerpoint/2010/main" val="4136638121"/>
+      </p:ext>
+    </p:extLst>
   </p:cSld>
   <p:clrMapOvr>
     <a:masterClrMapping/>
@@ -4937,12 +5087,12 @@
       </p:grpSpPr>
       <p:sp>
         <p:nvSpPr>
-          <p:cNvPr id="2" name="Title 1"/>
-          <p:cNvSpPr>
-            <a:spLocks noGrp="1"/>
-          </p:cNvSpPr>
-          <p:nvPr>
-            <p:ph type="title"/>
+          <p:cNvPr id="5" name="Title 4"/>
+          <p:cNvSpPr>
+            <a:spLocks noGrp="1"/>
+          </p:cNvSpPr>
+          <p:nvPr>
+            <p:ph type="ctrTitle"/>
           </p:nvPr>
         </p:nvSpPr>
         <p:spPr/>
@@ -4952,59 +5102,13 @@
           <a:p>
             <a:r>
               <a:rPr lang="en-US" dirty="0" smtClean="0"/>
-              <a:t>Key Considerations</a:t>
+              <a:t>Questions?</a:t>
             </a:r>
             <a:endParaRPr lang="en-US" dirty="0"/>
           </a:p>
         </p:txBody>
       </p:sp>
-      <p:sp>
-        <p:nvSpPr>
-          <p:cNvPr id="3" name="Content Placeholder 2"/>
-          <p:cNvSpPr>
-            <a:spLocks noGrp="1"/>
-          </p:cNvSpPr>
-          <p:nvPr>
-            <p:ph idx="1"/>
-          </p:nvPr>
-        </p:nvSpPr>
-        <p:spPr/>
-        <p:txBody>
-          <a:bodyPr/>
-          <a:lstStyle/>
-          <a:p>
-            <a:r>
-              <a:rPr lang="en-US" dirty="0" smtClean="0"/>
-              <a:t>Cost</a:t>
-            </a:r>
-          </a:p>
-          <a:p>
-            <a:r>
-              <a:rPr lang="en-US" dirty="0" smtClean="0"/>
-              <a:t>Performance</a:t>
-            </a:r>
-          </a:p>
-          <a:p>
-            <a:r>
-              <a:rPr lang="en-US" dirty="0" smtClean="0"/>
-              <a:t>Supported platforms</a:t>
-            </a:r>
-          </a:p>
-          <a:p>
-            <a:r>
-              <a:rPr lang="en-US" dirty="0" smtClean="0"/>
-              <a:t>Native app experience</a:t>
-            </a:r>
-            <a:endParaRPr lang="en-US" dirty="0"/>
-          </a:p>
-        </p:txBody>
-      </p:sp>
     </p:spTree>
-    <p:extLst>
-      <p:ext uri="{BB962C8B-B14F-4D97-AF65-F5344CB8AC3E}">
-        <p14:creationId xmlns:p14="http://schemas.microsoft.com/office/powerpoint/2010/main" val="4136638121"/>
-      </p:ext>
-    </p:extLst>
   </p:cSld>
   <p:clrMapOvr>
     <a:masterClrMapping/>
@@ -5020,61 +5124,6 @@
 </file>
 
 <file path=ppt/slides/slide15.xml><?xml version="1.0" encoding="utf-8"?>
-<p:sld xmlns:a="http://schemas.openxmlformats.org/drawingml/2006/main" xmlns:r="http://schemas.openxmlformats.org/officeDocument/2006/relationships" xmlns:p="http://schemas.openxmlformats.org/presentationml/2006/main">
-  <p:cSld>
-    <p:spTree>
-      <p:nvGrpSpPr>
-        <p:cNvPr id="1" name=""/>
-        <p:cNvGrpSpPr/>
-        <p:nvPr/>
-      </p:nvGrpSpPr>
-      <p:grpSpPr>
-        <a:xfrm>
-          <a:off x="0" y="0"/>
-          <a:ext cx="0" cy="0"/>
-          <a:chOff x="0" y="0"/>
-          <a:chExt cx="0" cy="0"/>
-        </a:xfrm>
-      </p:grpSpPr>
-      <p:sp>
-        <p:nvSpPr>
-          <p:cNvPr id="5" name="Title 4"/>
-          <p:cNvSpPr>
-            <a:spLocks noGrp="1"/>
-          </p:cNvSpPr>
-          <p:nvPr>
-            <p:ph type="ctrTitle"/>
-          </p:nvPr>
-        </p:nvSpPr>
-        <p:spPr/>
-        <p:txBody>
-          <a:bodyPr/>
-          <a:lstStyle/>
-          <a:p>
-            <a:r>
-              <a:rPr lang="en-US" dirty="0" smtClean="0"/>
-              <a:t>Questions?</a:t>
-            </a:r>
-            <a:endParaRPr lang="en-US" dirty="0"/>
-          </a:p>
-        </p:txBody>
-      </p:sp>
-    </p:spTree>
-  </p:cSld>
-  <p:clrMapOvr>
-    <a:masterClrMapping/>
-  </p:clrMapOvr>
-  <p:timing>
-    <p:tnLst>
-      <p:par>
-        <p:cTn id="1" dur="indefinite" restart="never" nodeType="tmRoot"/>
-      </p:par>
-    </p:tnLst>
-  </p:timing>
-</p:sld>
-</file>
-
-<file path=ppt/slides/slide16.xml><?xml version="1.0" encoding="utf-8"?>
 <p:sld xmlns:a="http://schemas.openxmlformats.org/drawingml/2006/main" xmlns:r="http://schemas.openxmlformats.org/officeDocument/2006/relationships" xmlns:p="http://schemas.openxmlformats.org/presentationml/2006/main">
   <p:cSld>
     <p:spTree>
@@ -5159,7 +5208,7 @@
 </p:sld>
 </file>
 
-<file path=ppt/slides/slide17.xml><?xml version="1.0" encoding="utf-8"?>
+<file path=ppt/slides/slide16.xml><?xml version="1.0" encoding="utf-8"?>
 <p:sld xmlns:a="http://schemas.openxmlformats.org/drawingml/2006/main" xmlns:r="http://schemas.openxmlformats.org/officeDocument/2006/relationships" xmlns:p="http://schemas.openxmlformats.org/presentationml/2006/main">
   <p:cSld>
     <p:spTree>
@@ -5401,7 +5450,7 @@
 </p:sld>
 </file>
 
-<file path=ppt/slides/slide18.xml><?xml version="1.0" encoding="utf-8"?>
+<file path=ppt/slides/slide17.xml><?xml version="1.0" encoding="utf-8"?>
 <p:sld xmlns:a="http://schemas.openxmlformats.org/drawingml/2006/main" xmlns:r="http://schemas.openxmlformats.org/officeDocument/2006/relationships" xmlns:p="http://schemas.openxmlformats.org/presentationml/2006/main">
   <p:cSld>
     <p:spTree>
@@ -5599,12 +5648,8 @@
               <a:buNone/>
             </a:pPr>
             <a:r>
-              <a:rPr lang="en-US" b="1" dirty="0" err="1" smtClean="0"/>
-              <a:t>Jerrel</a:t>
-            </a:r>
-            <a:r>
               <a:rPr lang="en-US" b="1" dirty="0" smtClean="0"/>
-              <a:t> Blankenship</a:t>
+              <a:t>Jerrel Blankenship</a:t>
             </a:r>
           </a:p>
           <a:p>
@@ -5625,13 +5670,8 @@
           <a:p>
             <a:r>
               <a:rPr lang="en-US" dirty="0"/>
-              <a:t>Software Engineer at </a:t>
-            </a:r>
-            <a:r>
-              <a:rPr lang="en-US" dirty="0" err="1"/>
-              <a:t>RelayHealth</a:t>
-            </a:r>
-            <a:endParaRPr lang="en-US" dirty="0"/>
+              <a:t>Software Engineer at RelayHealth</a:t>
+            </a:r>
           </a:p>
           <a:p>
             <a:r>
@@ -5686,13 +5726,8 @@
             </a:pPr>
             <a:r>
               <a:rPr lang="en-US" b="1" dirty="0" smtClean="0"/>
-              <a:t>Jamie </a:t>
-            </a:r>
-            <a:r>
-              <a:rPr lang="en-US" b="1" dirty="0" err="1" smtClean="0"/>
-              <a:t>Dicken</a:t>
-            </a:r>
-            <a:endParaRPr lang="en-US" b="1" dirty="0" smtClean="0"/>
+              <a:t>Jamie Dicken</a:t>
+            </a:r>
           </a:p>
           <a:p>
             <a:pPr algn="ctr">
@@ -5712,13 +5747,8 @@
           <a:p>
             <a:r>
               <a:rPr lang="en-US" dirty="0" smtClean="0"/>
-              <a:t>Software developer and team lead at McKesson-</a:t>
-            </a:r>
-            <a:r>
-              <a:rPr lang="en-US" dirty="0" err="1" smtClean="0"/>
-              <a:t>RelayHealth</a:t>
-            </a:r>
-            <a:endParaRPr lang="en-US" dirty="0" smtClean="0"/>
+              <a:t>Software developer and team lead at McKesson-RelayHealth</a:t>
+            </a:r>
           </a:p>
           <a:p>
             <a:r>
@@ -5787,9 +5817,10 @@
           <a:lstStyle/>
           <a:p>
             <a:r>
-              <a:rPr lang="en-US" dirty="0"/>
-              <a:t>I Only Want To Write It Once</a:t>
-            </a:r>
+              <a:rPr lang="en-US" dirty="0" smtClean="0"/>
+              <a:t>Which One Do I Choose?</a:t>
+            </a:r>
+            <a:endParaRPr lang="en-US" dirty="0"/>
           </a:p>
         </p:txBody>
       </p:sp>

</xml_diff>

<commit_message>
Added notes on xamarin, also made cosmetic changes to slides
</commit_message>
<xml_diff>
--- a/JointSpeakerTalks/PhoneGapXamarin/M3Conf2013/PhoneGap and Xamarin.pptx
+++ b/JointSpeakerTalks/PhoneGapXamarin/M3Conf2013/PhoneGap and Xamarin.pptx
@@ -1168,8 +1168,44 @@
           <a:p>
             <a:pPr lvl="0"/>
             <a:r>
+              <a:rPr lang="en-US" sz="1200" b="0" i="0" kern="1200" dirty="0" err="1" smtClean="0">
+                <a:solidFill>
+                  <a:schemeClr val="tx1"/>
+                </a:solidFill>
+                <a:effectLst/>
+                <a:latin typeface="+mn-lt"/>
+                <a:ea typeface="+mn-ea"/>
+                <a:cs typeface="+mn-cs"/>
+              </a:rPr>
+              <a:t>Xamarin</a:t>
+            </a:r>
+            <a:r>
+              <a:rPr lang="en-US" sz="1200" b="0" i="0" kern="1200" dirty="0" smtClean="0">
+                <a:solidFill>
+                  <a:schemeClr val="tx1"/>
+                </a:solidFill>
+                <a:effectLst/>
+                <a:latin typeface="+mn-lt"/>
+                <a:ea typeface="+mn-ea"/>
+                <a:cs typeface="+mn-cs"/>
+              </a:rPr>
+              <a:t> contains a fully functional implementation of the .NET runtime, called Mono, which is bundled with your app so that your code executes with all of the power of C# and .NET, including memory management, reflection, and the .NET base class libraries</a:t>
+            </a:r>
+            <a:endParaRPr lang="en-US" dirty="0" smtClean="0"/>
+          </a:p>
+          <a:p>
+            <a:pPr lvl="0"/>
+            <a:endParaRPr lang="en-US" dirty="0" smtClean="0"/>
+          </a:p>
+          <a:p>
+            <a:pPr lvl="0"/>
+            <a:r>
               <a:rPr lang="en-US" dirty="0" smtClean="0"/>
-              <a:t>Can develop Android and </a:t>
+              <a:t>Can </a:t>
+            </a:r>
+            <a:r>
+              <a:rPr lang="en-US" dirty="0" smtClean="0"/>
+              <a:t>develop Android and </a:t>
             </a:r>
             <a:r>
               <a:rPr lang="en-US" dirty="0" err="1" smtClean="0"/>
@@ -1188,8 +1224,108 @@
             </a:r>
             <a:r>
               <a:rPr lang="en-US" dirty="0" smtClean="0"/>
-              <a:t> requires network connection to Mac</a:t>
-            </a:r>
+              <a:t> requires network connection to </a:t>
+            </a:r>
+            <a:r>
+              <a:rPr lang="en-US" dirty="0" smtClean="0"/>
+              <a:t>Mac</a:t>
+            </a:r>
+          </a:p>
+          <a:p>
+            <a:pPr lvl="0"/>
+            <a:endParaRPr lang="en-US" dirty="0" smtClean="0"/>
+          </a:p>
+          <a:p>
+            <a:r>
+              <a:rPr lang="en-US" sz="1200" b="0" i="0" kern="1200" dirty="0" err="1" smtClean="0">
+                <a:solidFill>
+                  <a:schemeClr val="tx1"/>
+                </a:solidFill>
+                <a:effectLst/>
+                <a:latin typeface="+mn-lt"/>
+                <a:ea typeface="+mn-ea"/>
+                <a:cs typeface="+mn-cs"/>
+              </a:rPr>
+              <a:t>Xamarin's</a:t>
+            </a:r>
+            <a:r>
+              <a:rPr lang="en-US" sz="1200" b="0" i="0" kern="1200" dirty="0" smtClean="0">
+                <a:solidFill>
+                  <a:schemeClr val="tx1"/>
+                </a:solidFill>
+                <a:effectLst/>
+                <a:latin typeface="+mn-lt"/>
+                <a:ea typeface="+mn-ea"/>
+                <a:cs typeface="+mn-cs"/>
+              </a:rPr>
+              <a:t> binding technology exposes all of the APIs available in </a:t>
+            </a:r>
+            <a:r>
+              <a:rPr lang="en-US" sz="1200" b="0" i="0" kern="1200" dirty="0" err="1" smtClean="0">
+                <a:solidFill>
+                  <a:schemeClr val="tx1"/>
+                </a:solidFill>
+                <a:effectLst/>
+                <a:latin typeface="+mn-lt"/>
+                <a:ea typeface="+mn-ea"/>
+                <a:cs typeface="+mn-cs"/>
+              </a:rPr>
+              <a:t>iOS</a:t>
+            </a:r>
+            <a:r>
+              <a:rPr lang="en-US" sz="1200" b="0" i="0" kern="1200" dirty="0" smtClean="0">
+                <a:solidFill>
+                  <a:schemeClr val="tx1"/>
+                </a:solidFill>
+                <a:effectLst/>
+                <a:latin typeface="+mn-lt"/>
+                <a:ea typeface="+mn-ea"/>
+                <a:cs typeface="+mn-cs"/>
+              </a:rPr>
+              <a:t> and Android to your applications as regular C# class libraries.</a:t>
+            </a:r>
+          </a:p>
+          <a:p>
+            <a:r>
+              <a:rPr lang="en-US" sz="1200" b="0" i="0" kern="1200" dirty="0" smtClean="0">
+                <a:solidFill>
+                  <a:schemeClr val="tx1"/>
+                </a:solidFill>
+                <a:effectLst/>
+                <a:latin typeface="+mn-lt"/>
+                <a:ea typeface="+mn-ea"/>
+                <a:cs typeface="+mn-cs"/>
+              </a:rPr>
+              <a:t>This means your </a:t>
+            </a:r>
+            <a:r>
+              <a:rPr lang="en-US" sz="1200" b="0" i="0" kern="1200" dirty="0" err="1" smtClean="0">
+                <a:solidFill>
+                  <a:schemeClr val="tx1"/>
+                </a:solidFill>
+                <a:effectLst/>
+                <a:latin typeface="+mn-lt"/>
+                <a:ea typeface="+mn-ea"/>
+                <a:cs typeface="+mn-cs"/>
+              </a:rPr>
+              <a:t>Xamarin</a:t>
+            </a:r>
+            <a:r>
+              <a:rPr lang="en-US" sz="1200" b="0" i="0" kern="1200" dirty="0" smtClean="0">
+                <a:solidFill>
+                  <a:schemeClr val="tx1"/>
+                </a:solidFill>
+                <a:effectLst/>
+                <a:latin typeface="+mn-lt"/>
+                <a:ea typeface="+mn-ea"/>
+                <a:cs typeface="+mn-cs"/>
+              </a:rPr>
+              <a:t> application can do anything a platform, or device, offers, with native user interface and excellent performance.</a:t>
+            </a:r>
+          </a:p>
+          <a:p>
+            <a:pPr lvl="0"/>
+            <a:endParaRPr lang="en-US" dirty="0" smtClean="0"/>
           </a:p>
           <a:p>
             <a:pPr marL="0" marR="0" lvl="0" indent="0" algn="l" defTabSz="914400" rtl="0" eaLnBrk="1" fontAlgn="auto" latinLnBrk="0" hangingPunct="1">
@@ -1210,9 +1346,50 @@
               <a:defRPr/>
             </a:pPr>
             <a:r>
-              <a:rPr lang="en-US" dirty="0" smtClean="0"/>
-              <a:t>Compiled code</a:t>
-            </a:r>
+              <a:rPr lang="en-US" sz="1200" b="0" i="0" kern="1200" dirty="0" err="1" smtClean="0">
+                <a:solidFill>
+                  <a:schemeClr val="tx1"/>
+                </a:solidFill>
+                <a:effectLst/>
+                <a:latin typeface="+mn-lt"/>
+                <a:ea typeface="+mn-ea"/>
+                <a:cs typeface="+mn-cs"/>
+              </a:rPr>
+              <a:t>Xamarin</a:t>
+            </a:r>
+            <a:r>
+              <a:rPr lang="en-US" sz="1200" b="0" i="0" kern="1200" smtClean="0">
+                <a:solidFill>
+                  <a:schemeClr val="tx1"/>
+                </a:solidFill>
+                <a:effectLst/>
+                <a:latin typeface="+mn-lt"/>
+                <a:ea typeface="+mn-ea"/>
+                <a:cs typeface="+mn-cs"/>
+              </a:rPr>
+              <a:t> compiles your app to a native binary, not cross-compiled, and not interpreted. </a:t>
+            </a:r>
+            <a:endParaRPr lang="en-US" dirty="0" smtClean="0"/>
+          </a:p>
+          <a:p>
+            <a:pPr marL="0" marR="0" lvl="0" indent="0" algn="l" defTabSz="914400" rtl="0" eaLnBrk="1" fontAlgn="auto" latinLnBrk="0" hangingPunct="1">
+              <a:lnSpc>
+                <a:spcPct val="100000"/>
+              </a:lnSpc>
+              <a:spcBef>
+                <a:spcPts val="0"/>
+              </a:spcBef>
+              <a:spcAft>
+                <a:spcPts val="0"/>
+              </a:spcAft>
+              <a:buClrTx/>
+              <a:buSzTx/>
+              <a:buFontTx/>
+              <a:buNone/>
+              <a:tabLst/>
+              <a:defRPr/>
+            </a:pPr>
+            <a:endParaRPr lang="en-US" dirty="0" smtClean="0"/>
           </a:p>
           <a:p>
             <a:pPr marL="0" marR="0" lvl="0" indent="0" algn="l" defTabSz="914400" rtl="0" eaLnBrk="1" fontAlgn="auto" latinLnBrk="0" hangingPunct="1">
@@ -4843,14 +5020,16 @@
         </p:nvSpPr>
         <p:spPr/>
         <p:txBody>
-          <a:bodyPr/>
-          <a:lstStyle/>
-          <a:p>
-            <a:r>
-              <a:rPr lang="en-US" dirty="0" smtClean="0"/>
-              <a:t>Code Time</a:t>
-            </a:r>
-            <a:endParaRPr lang="en-US" dirty="0"/>
+          <a:bodyPr>
+            <a:normAutofit/>
+          </a:bodyPr>
+          <a:lstStyle/>
+          <a:p>
+            <a:r>
+              <a:rPr lang="en-US" sz="6600" dirty="0" smtClean="0"/>
+              <a:t>Code</a:t>
+            </a:r>
+            <a:endParaRPr lang="en-US" sz="6600" dirty="0"/>
           </a:p>
         </p:txBody>
       </p:sp>
@@ -4922,33 +5101,35 @@
         </p:nvSpPr>
         <p:spPr/>
         <p:txBody>
-          <a:bodyPr/>
-          <a:lstStyle/>
-          <a:p>
-            <a:r>
-              <a:rPr lang="en-US" dirty="0" err="1" smtClean="0"/>
+          <a:bodyPr>
+            <a:noAutofit/>
+          </a:bodyPr>
+          <a:lstStyle/>
+          <a:p>
+            <a:r>
+              <a:rPr lang="en-US" sz="6600" dirty="0" err="1" smtClean="0"/>
               <a:t>PhoneGap</a:t>
             </a:r>
             <a:r>
-              <a:rPr lang="en-US" dirty="0" smtClean="0"/>
+              <a:rPr lang="en-US" sz="6600" dirty="0" smtClean="0"/>
               <a:t> v. </a:t>
             </a:r>
             <a:r>
-              <a:rPr lang="en-US" dirty="0" err="1" smtClean="0"/>
+              <a:rPr lang="en-US" sz="6600" dirty="0" err="1" smtClean="0"/>
               <a:t>Xamarin</a:t>
             </a:r>
             <a:r>
-              <a:rPr lang="en-US" dirty="0" smtClean="0"/>
+              <a:rPr lang="en-US" sz="6600" dirty="0" smtClean="0"/>
               <a:t>:</a:t>
             </a:r>
             <a:br>
-              <a:rPr lang="en-US" dirty="0" smtClean="0"/>
+              <a:rPr lang="en-US" sz="6600" dirty="0" smtClean="0"/>
             </a:br>
             <a:r>
-              <a:rPr lang="en-US" dirty="0" smtClean="0"/>
+              <a:rPr lang="en-US" sz="6000" dirty="0" smtClean="0"/>
               <a:t>Which do I choose?</a:t>
             </a:r>
-            <a:endParaRPr lang="en-US" dirty="0"/>
+            <a:endParaRPr lang="en-US" sz="6000" dirty="0"/>
           </a:p>
         </p:txBody>
       </p:sp>
@@ -5022,24 +5203,36 @@
           <a:bodyPr/>
           <a:lstStyle/>
           <a:p>
+            <a:pPr marL="0" indent="0" algn="ctr">
+              <a:buNone/>
+            </a:pPr>
             <a:r>
               <a:rPr lang="en-US" dirty="0" smtClean="0"/>
               <a:t>Cost</a:t>
             </a:r>
           </a:p>
           <a:p>
+            <a:pPr marL="0" indent="0" algn="ctr">
+              <a:buNone/>
+            </a:pPr>
             <a:r>
               <a:rPr lang="en-US" dirty="0" smtClean="0"/>
               <a:t>Performance</a:t>
             </a:r>
           </a:p>
           <a:p>
+            <a:pPr marL="0" indent="0" algn="ctr">
+              <a:buNone/>
+            </a:pPr>
             <a:r>
               <a:rPr lang="en-US" dirty="0" smtClean="0"/>
               <a:t>Supported platforms</a:t>
             </a:r>
           </a:p>
           <a:p>
+            <a:pPr marL="0" indent="0" algn="ctr">
+              <a:buNone/>
+            </a:pPr>
             <a:r>
               <a:rPr lang="en-US" dirty="0" smtClean="0"/>
               <a:t>Native app experience</a:t>
@@ -5061,7 +5254,490 @@
   <p:timing>
     <p:tnLst>
       <p:par>
-        <p:cTn id="1" dur="indefinite" restart="never" nodeType="tmRoot"/>
+        <p:cTn id="1" dur="indefinite" restart="never" nodeType="tmRoot">
+          <p:childTnLst>
+            <p:seq concurrent="1" nextAc="seek">
+              <p:cTn id="2" dur="indefinite" nodeType="mainSeq">
+                <p:childTnLst>
+                  <p:par>
+                    <p:cTn id="3" fill="hold">
+                      <p:stCondLst>
+                        <p:cond delay="indefinite"/>
+                      </p:stCondLst>
+                      <p:childTnLst>
+                        <p:par>
+                          <p:cTn id="4" fill="hold">
+                            <p:stCondLst>
+                              <p:cond delay="0"/>
+                            </p:stCondLst>
+                            <p:childTnLst>
+                              <p:par>
+                                <p:cTn id="5" presetID="42" presetClass="entr" presetSubtype="0" fill="hold" nodeType="clickEffect">
+                                  <p:stCondLst>
+                                    <p:cond delay="0"/>
+                                  </p:stCondLst>
+                                  <p:childTnLst>
+                                    <p:set>
+                                      <p:cBhvr>
+                                        <p:cTn id="6" dur="1" fill="hold">
+                                          <p:stCondLst>
+                                            <p:cond delay="0"/>
+                                          </p:stCondLst>
+                                        </p:cTn>
+                                        <p:tgtEl>
+                                          <p:spTgt spid="3">
+                                            <p:txEl>
+                                              <p:pRg st="0" end="0"/>
+                                            </p:txEl>
+                                          </p:spTgt>
+                                        </p:tgtEl>
+                                        <p:attrNameLst>
+                                          <p:attrName>style.visibility</p:attrName>
+                                        </p:attrNameLst>
+                                      </p:cBhvr>
+                                      <p:to>
+                                        <p:strVal val="visible"/>
+                                      </p:to>
+                                    </p:set>
+                                    <p:animEffect transition="in" filter="fade">
+                                      <p:cBhvr>
+                                        <p:cTn id="7" dur="1000"/>
+                                        <p:tgtEl>
+                                          <p:spTgt spid="3">
+                                            <p:txEl>
+                                              <p:pRg st="0" end="0"/>
+                                            </p:txEl>
+                                          </p:spTgt>
+                                        </p:tgtEl>
+                                      </p:cBhvr>
+                                    </p:animEffect>
+                                    <p:anim calcmode="lin" valueType="num">
+                                      <p:cBhvr>
+                                        <p:cTn id="8" dur="1000" fill="hold"/>
+                                        <p:tgtEl>
+                                          <p:spTgt spid="3">
+                                            <p:txEl>
+                                              <p:pRg st="0" end="0"/>
+                                            </p:txEl>
+                                          </p:spTgt>
+                                        </p:tgtEl>
+                                        <p:attrNameLst>
+                                          <p:attrName>ppt_x</p:attrName>
+                                        </p:attrNameLst>
+                                      </p:cBhvr>
+                                      <p:tavLst>
+                                        <p:tav tm="0">
+                                          <p:val>
+                                            <p:strVal val="#ppt_x"/>
+                                          </p:val>
+                                        </p:tav>
+                                        <p:tav tm="100000">
+                                          <p:val>
+                                            <p:strVal val="#ppt_x"/>
+                                          </p:val>
+                                        </p:tav>
+                                      </p:tavLst>
+                                    </p:anim>
+                                    <p:anim calcmode="lin" valueType="num">
+                                      <p:cBhvr>
+                                        <p:cTn id="9" dur="1000" fill="hold"/>
+                                        <p:tgtEl>
+                                          <p:spTgt spid="3">
+                                            <p:txEl>
+                                              <p:pRg st="0" end="0"/>
+                                            </p:txEl>
+                                          </p:spTgt>
+                                        </p:tgtEl>
+                                        <p:attrNameLst>
+                                          <p:attrName>ppt_y</p:attrName>
+                                        </p:attrNameLst>
+                                      </p:cBhvr>
+                                      <p:tavLst>
+                                        <p:tav tm="0">
+                                          <p:val>
+                                            <p:strVal val="#ppt_y+.1"/>
+                                          </p:val>
+                                        </p:tav>
+                                        <p:tav tm="100000">
+                                          <p:val>
+                                            <p:strVal val="#ppt_y"/>
+                                          </p:val>
+                                        </p:tav>
+                                      </p:tavLst>
+                                    </p:anim>
+                                  </p:childTnLst>
+                                </p:cTn>
+                              </p:par>
+                            </p:childTnLst>
+                          </p:cTn>
+                        </p:par>
+                      </p:childTnLst>
+                    </p:cTn>
+                  </p:par>
+                  <p:par>
+                    <p:cTn id="10" fill="hold">
+                      <p:stCondLst>
+                        <p:cond delay="indefinite"/>
+                      </p:stCondLst>
+                      <p:childTnLst>
+                        <p:par>
+                          <p:cTn id="11" fill="hold">
+                            <p:stCondLst>
+                              <p:cond delay="0"/>
+                            </p:stCondLst>
+                            <p:childTnLst>
+                              <p:par>
+                                <p:cTn id="12" presetID="42" presetClass="entr" presetSubtype="0" fill="hold" nodeType="clickEffect">
+                                  <p:stCondLst>
+                                    <p:cond delay="0"/>
+                                  </p:stCondLst>
+                                  <p:childTnLst>
+                                    <p:set>
+                                      <p:cBhvr>
+                                        <p:cTn id="13" dur="1" fill="hold">
+                                          <p:stCondLst>
+                                            <p:cond delay="0"/>
+                                          </p:stCondLst>
+                                        </p:cTn>
+                                        <p:tgtEl>
+                                          <p:spTgt spid="3">
+                                            <p:txEl>
+                                              <p:pRg st="1" end="1"/>
+                                            </p:txEl>
+                                          </p:spTgt>
+                                        </p:tgtEl>
+                                        <p:attrNameLst>
+                                          <p:attrName>style.visibility</p:attrName>
+                                        </p:attrNameLst>
+                                      </p:cBhvr>
+                                      <p:to>
+                                        <p:strVal val="visible"/>
+                                      </p:to>
+                                    </p:set>
+                                    <p:animEffect transition="in" filter="fade">
+                                      <p:cBhvr>
+                                        <p:cTn id="14" dur="1000"/>
+                                        <p:tgtEl>
+                                          <p:spTgt spid="3">
+                                            <p:txEl>
+                                              <p:pRg st="1" end="1"/>
+                                            </p:txEl>
+                                          </p:spTgt>
+                                        </p:tgtEl>
+                                      </p:cBhvr>
+                                    </p:animEffect>
+                                    <p:anim calcmode="lin" valueType="num">
+                                      <p:cBhvr>
+                                        <p:cTn id="15" dur="1000" fill="hold"/>
+                                        <p:tgtEl>
+                                          <p:spTgt spid="3">
+                                            <p:txEl>
+                                              <p:pRg st="1" end="1"/>
+                                            </p:txEl>
+                                          </p:spTgt>
+                                        </p:tgtEl>
+                                        <p:attrNameLst>
+                                          <p:attrName>ppt_x</p:attrName>
+                                        </p:attrNameLst>
+                                      </p:cBhvr>
+                                      <p:tavLst>
+                                        <p:tav tm="0">
+                                          <p:val>
+                                            <p:strVal val="#ppt_x"/>
+                                          </p:val>
+                                        </p:tav>
+                                        <p:tav tm="100000">
+                                          <p:val>
+                                            <p:strVal val="#ppt_x"/>
+                                          </p:val>
+                                        </p:tav>
+                                      </p:tavLst>
+                                    </p:anim>
+                                    <p:anim calcmode="lin" valueType="num">
+                                      <p:cBhvr>
+                                        <p:cTn id="16" dur="1000" fill="hold"/>
+                                        <p:tgtEl>
+                                          <p:spTgt spid="3">
+                                            <p:txEl>
+                                              <p:pRg st="1" end="1"/>
+                                            </p:txEl>
+                                          </p:spTgt>
+                                        </p:tgtEl>
+                                        <p:attrNameLst>
+                                          <p:attrName>ppt_y</p:attrName>
+                                        </p:attrNameLst>
+                                      </p:cBhvr>
+                                      <p:tavLst>
+                                        <p:tav tm="0">
+                                          <p:val>
+                                            <p:strVal val="#ppt_y+.1"/>
+                                          </p:val>
+                                        </p:tav>
+                                        <p:tav tm="100000">
+                                          <p:val>
+                                            <p:strVal val="#ppt_y"/>
+                                          </p:val>
+                                        </p:tav>
+                                      </p:tavLst>
+                                    </p:anim>
+                                  </p:childTnLst>
+                                </p:cTn>
+                              </p:par>
+                            </p:childTnLst>
+                          </p:cTn>
+                        </p:par>
+                      </p:childTnLst>
+                    </p:cTn>
+                  </p:par>
+                  <p:par>
+                    <p:cTn id="17" fill="hold">
+                      <p:stCondLst>
+                        <p:cond delay="indefinite"/>
+                      </p:stCondLst>
+                      <p:childTnLst>
+                        <p:par>
+                          <p:cTn id="18" fill="hold">
+                            <p:stCondLst>
+                              <p:cond delay="0"/>
+                            </p:stCondLst>
+                            <p:childTnLst>
+                              <p:par>
+                                <p:cTn id="19" presetID="42" presetClass="entr" presetSubtype="0" fill="hold" nodeType="clickEffect">
+                                  <p:stCondLst>
+                                    <p:cond delay="0"/>
+                                  </p:stCondLst>
+                                  <p:childTnLst>
+                                    <p:set>
+                                      <p:cBhvr>
+                                        <p:cTn id="20" dur="1" fill="hold">
+                                          <p:stCondLst>
+                                            <p:cond delay="0"/>
+                                          </p:stCondLst>
+                                        </p:cTn>
+                                        <p:tgtEl>
+                                          <p:spTgt spid="3">
+                                            <p:txEl>
+                                              <p:pRg st="2" end="2"/>
+                                            </p:txEl>
+                                          </p:spTgt>
+                                        </p:tgtEl>
+                                        <p:attrNameLst>
+                                          <p:attrName>style.visibility</p:attrName>
+                                        </p:attrNameLst>
+                                      </p:cBhvr>
+                                      <p:to>
+                                        <p:strVal val="visible"/>
+                                      </p:to>
+                                    </p:set>
+                                    <p:animEffect transition="in" filter="fade">
+                                      <p:cBhvr>
+                                        <p:cTn id="21" dur="1000"/>
+                                        <p:tgtEl>
+                                          <p:spTgt spid="3">
+                                            <p:txEl>
+                                              <p:pRg st="2" end="2"/>
+                                            </p:txEl>
+                                          </p:spTgt>
+                                        </p:tgtEl>
+                                      </p:cBhvr>
+                                    </p:animEffect>
+                                    <p:anim calcmode="lin" valueType="num">
+                                      <p:cBhvr>
+                                        <p:cTn id="22" dur="1000" fill="hold"/>
+                                        <p:tgtEl>
+                                          <p:spTgt spid="3">
+                                            <p:txEl>
+                                              <p:pRg st="2" end="2"/>
+                                            </p:txEl>
+                                          </p:spTgt>
+                                        </p:tgtEl>
+                                        <p:attrNameLst>
+                                          <p:attrName>ppt_x</p:attrName>
+                                        </p:attrNameLst>
+                                      </p:cBhvr>
+                                      <p:tavLst>
+                                        <p:tav tm="0">
+                                          <p:val>
+                                            <p:strVal val="#ppt_x"/>
+                                          </p:val>
+                                        </p:tav>
+                                        <p:tav tm="100000">
+                                          <p:val>
+                                            <p:strVal val="#ppt_x"/>
+                                          </p:val>
+                                        </p:tav>
+                                      </p:tavLst>
+                                    </p:anim>
+                                    <p:anim calcmode="lin" valueType="num">
+                                      <p:cBhvr>
+                                        <p:cTn id="23" dur="1000" fill="hold"/>
+                                        <p:tgtEl>
+                                          <p:spTgt spid="3">
+                                            <p:txEl>
+                                              <p:pRg st="2" end="2"/>
+                                            </p:txEl>
+                                          </p:spTgt>
+                                        </p:tgtEl>
+                                        <p:attrNameLst>
+                                          <p:attrName>ppt_y</p:attrName>
+                                        </p:attrNameLst>
+                                      </p:cBhvr>
+                                      <p:tavLst>
+                                        <p:tav tm="0">
+                                          <p:val>
+                                            <p:strVal val="#ppt_y+.1"/>
+                                          </p:val>
+                                        </p:tav>
+                                        <p:tav tm="100000">
+                                          <p:val>
+                                            <p:strVal val="#ppt_y"/>
+                                          </p:val>
+                                        </p:tav>
+                                      </p:tavLst>
+                                    </p:anim>
+                                  </p:childTnLst>
+                                </p:cTn>
+                              </p:par>
+                            </p:childTnLst>
+                          </p:cTn>
+                        </p:par>
+                      </p:childTnLst>
+                    </p:cTn>
+                  </p:par>
+                  <p:par>
+                    <p:cTn id="24" fill="hold">
+                      <p:stCondLst>
+                        <p:cond delay="indefinite"/>
+                      </p:stCondLst>
+                      <p:childTnLst>
+                        <p:par>
+                          <p:cTn id="25" fill="hold">
+                            <p:stCondLst>
+                              <p:cond delay="0"/>
+                            </p:stCondLst>
+                            <p:childTnLst>
+                              <p:par>
+                                <p:cTn id="26" presetID="42" presetClass="entr" presetSubtype="0" fill="hold" nodeType="clickEffect">
+                                  <p:stCondLst>
+                                    <p:cond delay="0"/>
+                                  </p:stCondLst>
+                                  <p:childTnLst>
+                                    <p:set>
+                                      <p:cBhvr>
+                                        <p:cTn id="27" dur="1" fill="hold">
+                                          <p:stCondLst>
+                                            <p:cond delay="0"/>
+                                          </p:stCondLst>
+                                        </p:cTn>
+                                        <p:tgtEl>
+                                          <p:spTgt spid="3">
+                                            <p:txEl>
+                                              <p:pRg st="3" end="3"/>
+                                            </p:txEl>
+                                          </p:spTgt>
+                                        </p:tgtEl>
+                                        <p:attrNameLst>
+                                          <p:attrName>style.visibility</p:attrName>
+                                        </p:attrNameLst>
+                                      </p:cBhvr>
+                                      <p:to>
+                                        <p:strVal val="visible"/>
+                                      </p:to>
+                                    </p:set>
+                                    <p:animEffect transition="in" filter="fade">
+                                      <p:cBhvr>
+                                        <p:cTn id="28" dur="1000"/>
+                                        <p:tgtEl>
+                                          <p:spTgt spid="3">
+                                            <p:txEl>
+                                              <p:pRg st="3" end="3"/>
+                                            </p:txEl>
+                                          </p:spTgt>
+                                        </p:tgtEl>
+                                      </p:cBhvr>
+                                    </p:animEffect>
+                                    <p:anim calcmode="lin" valueType="num">
+                                      <p:cBhvr>
+                                        <p:cTn id="29" dur="1000" fill="hold"/>
+                                        <p:tgtEl>
+                                          <p:spTgt spid="3">
+                                            <p:txEl>
+                                              <p:pRg st="3" end="3"/>
+                                            </p:txEl>
+                                          </p:spTgt>
+                                        </p:tgtEl>
+                                        <p:attrNameLst>
+                                          <p:attrName>ppt_x</p:attrName>
+                                        </p:attrNameLst>
+                                      </p:cBhvr>
+                                      <p:tavLst>
+                                        <p:tav tm="0">
+                                          <p:val>
+                                            <p:strVal val="#ppt_x"/>
+                                          </p:val>
+                                        </p:tav>
+                                        <p:tav tm="100000">
+                                          <p:val>
+                                            <p:strVal val="#ppt_x"/>
+                                          </p:val>
+                                        </p:tav>
+                                      </p:tavLst>
+                                    </p:anim>
+                                    <p:anim calcmode="lin" valueType="num">
+                                      <p:cBhvr>
+                                        <p:cTn id="30" dur="1000" fill="hold"/>
+                                        <p:tgtEl>
+                                          <p:spTgt spid="3">
+                                            <p:txEl>
+                                              <p:pRg st="3" end="3"/>
+                                            </p:txEl>
+                                          </p:spTgt>
+                                        </p:tgtEl>
+                                        <p:attrNameLst>
+                                          <p:attrName>ppt_y</p:attrName>
+                                        </p:attrNameLst>
+                                      </p:cBhvr>
+                                      <p:tavLst>
+                                        <p:tav tm="0">
+                                          <p:val>
+                                            <p:strVal val="#ppt_y+.1"/>
+                                          </p:val>
+                                        </p:tav>
+                                        <p:tav tm="100000">
+                                          <p:val>
+                                            <p:strVal val="#ppt_y"/>
+                                          </p:val>
+                                        </p:tav>
+                                      </p:tavLst>
+                                    </p:anim>
+                                  </p:childTnLst>
+                                </p:cTn>
+                              </p:par>
+                            </p:childTnLst>
+                          </p:cTn>
+                        </p:par>
+                      </p:childTnLst>
+                    </p:cTn>
+                  </p:par>
+                </p:childTnLst>
+              </p:cTn>
+              <p:prevCondLst>
+                <p:cond evt="onPrev" delay="0">
+                  <p:tgtEl>
+                    <p:sldTgt/>
+                  </p:tgtEl>
+                </p:cond>
+              </p:prevCondLst>
+              <p:nextCondLst>
+                <p:cond evt="onNext" delay="0">
+                  <p:tgtEl>
+                    <p:sldTgt/>
+                  </p:tgtEl>
+                </p:cond>
+              </p:nextCondLst>
+            </p:seq>
+          </p:childTnLst>
+        </p:cTn>
       </p:par>
     </p:tnLst>
   </p:timing>
@@ -5097,14 +5773,16 @@
         </p:nvSpPr>
         <p:spPr/>
         <p:txBody>
-          <a:bodyPr/>
-          <a:lstStyle/>
-          <a:p>
-            <a:r>
-              <a:rPr lang="en-US" dirty="0" smtClean="0"/>
+          <a:bodyPr>
+            <a:normAutofit/>
+          </a:bodyPr>
+          <a:lstStyle/>
+          <a:p>
+            <a:r>
+              <a:rPr lang="en-US" sz="6600" dirty="0" smtClean="0"/>
               <a:t>Questions?</a:t>
             </a:r>
-            <a:endParaRPr lang="en-US" dirty="0"/>
+            <a:endParaRPr lang="en-US" sz="6600" dirty="0"/>
           </a:p>
         </p:txBody>
       </p:sp>
@@ -6031,14 +6709,16 @@
         </p:nvSpPr>
         <p:spPr/>
         <p:txBody>
-          <a:bodyPr/>
-          <a:lstStyle/>
-          <a:p>
-            <a:r>
-              <a:rPr lang="en-US" dirty="0" err="1" smtClean="0"/>
+          <a:bodyPr>
+            <a:normAutofit/>
+          </a:bodyPr>
+          <a:lstStyle/>
+          <a:p>
+            <a:r>
+              <a:rPr lang="en-US" sz="6600" dirty="0" err="1" smtClean="0"/>
               <a:t>PhoneGap</a:t>
             </a:r>
-            <a:endParaRPr lang="en-US" dirty="0"/>
+            <a:endParaRPr lang="en-US" sz="6600" dirty="0"/>
           </a:p>
         </p:txBody>
       </p:sp>
@@ -6336,14 +7016,16 @@
         </p:nvSpPr>
         <p:spPr/>
         <p:txBody>
-          <a:bodyPr/>
-          <a:lstStyle/>
-          <a:p>
-            <a:r>
-              <a:rPr lang="en-US" dirty="0" err="1" smtClean="0"/>
+          <a:bodyPr>
+            <a:normAutofit/>
+          </a:bodyPr>
+          <a:lstStyle/>
+          <a:p>
+            <a:r>
+              <a:rPr lang="en-US" sz="6600" dirty="0" err="1" smtClean="0"/>
               <a:t>Xamarin</a:t>
             </a:r>
-            <a:endParaRPr lang="en-US" dirty="0"/>
+            <a:endParaRPr lang="en-US" sz="6600" dirty="0"/>
           </a:p>
         </p:txBody>
       </p:sp>

</xml_diff>

<commit_message>
some final cosmetic changes to slides
</commit_message>
<xml_diff>
--- a/JointSpeakerTalks/PhoneGapXamarin/M3Conf2013/PhoneGap and Xamarin.pptx
+++ b/JointSpeakerTalks/PhoneGapXamarin/M3Conf2013/PhoneGap and Xamarin.pptx
@@ -18,7 +18,7 @@
     <p:sldId id="262" r:id="rId9"/>
     <p:sldId id="266" r:id="rId10"/>
     <p:sldId id="275" r:id="rId11"/>
-    <p:sldId id="276" r:id="rId12"/>
+    <p:sldId id="279" r:id="rId12"/>
     <p:sldId id="267" r:id="rId13"/>
     <p:sldId id="273" r:id="rId14"/>
     <p:sldId id="270" r:id="rId15"/>
@@ -1201,11 +1201,7 @@
             <a:pPr lvl="0"/>
             <a:r>
               <a:rPr lang="en-US" dirty="0" smtClean="0"/>
-              <a:t>Can </a:t>
-            </a:r>
-            <a:r>
-              <a:rPr lang="en-US" dirty="0" smtClean="0"/>
-              <a:t>develop Android and </a:t>
+              <a:t>Can develop Android and </a:t>
             </a:r>
             <a:r>
               <a:rPr lang="en-US" dirty="0" err="1" smtClean="0"/>
@@ -1224,11 +1220,7 @@
             </a:r>
             <a:r>
               <a:rPr lang="en-US" dirty="0" smtClean="0"/>
-              <a:t> requires network connection to </a:t>
-            </a:r>
-            <a:r>
-              <a:rPr lang="en-US" dirty="0" smtClean="0"/>
-              <a:t>Mac</a:t>
+              <a:t> requires network connection to Mac</a:t>
             </a:r>
           </a:p>
           <a:p>
@@ -5010,7 +5002,7 @@
       </p:grpSpPr>
       <p:sp>
         <p:nvSpPr>
-          <p:cNvPr id="4" name="Title 3"/>
+          <p:cNvPr id="6" name="Title 5"/>
           <p:cNvSpPr>
             <a:spLocks noGrp="1"/>
           </p:cNvSpPr>
@@ -5027,35 +5019,16 @@
           <a:p>
             <a:r>
               <a:rPr lang="en-US" sz="6600" dirty="0" smtClean="0"/>
-              <a:t>Code</a:t>
+              <a:t>Let’s Create an App!</a:t>
             </a:r>
             <a:endParaRPr lang="en-US" sz="6600" dirty="0"/>
-          </a:p>
-        </p:txBody>
-      </p:sp>
-      <p:sp>
-        <p:nvSpPr>
-          <p:cNvPr id="5" name="Subtitle 4"/>
-          <p:cNvSpPr>
-            <a:spLocks noGrp="1"/>
-          </p:cNvSpPr>
-          <p:nvPr>
-            <p:ph type="subTitle" idx="1"/>
-          </p:nvPr>
-        </p:nvSpPr>
-        <p:spPr/>
-        <p:txBody>
-          <a:bodyPr/>
-          <a:lstStyle/>
-          <a:p>
-            <a:endParaRPr lang="en-US"/>
           </a:p>
         </p:txBody>
       </p:sp>
     </p:spTree>
     <p:extLst>
       <p:ext uri="{BB962C8B-B14F-4D97-AF65-F5344CB8AC3E}">
-        <p14:creationId xmlns:p14="http://schemas.microsoft.com/office/powerpoint/2010/main" val="3859893264"/>
+        <p14:creationId xmlns:p14="http://schemas.microsoft.com/office/powerpoint/2010/main" val="4006129889"/>
       </p:ext>
     </p:extLst>
   </p:cSld>
@@ -5953,11 +5926,7 @@
             </a:pPr>
             <a:r>
               <a:rPr lang="en-US" sz="2400" b="1" dirty="0" smtClean="0"/>
-              <a:t>Jerrel </a:t>
-            </a:r>
-            <a:r>
-              <a:rPr lang="en-US" sz="2400" b="1" dirty="0" smtClean="0"/>
-              <a:t>Blankenship</a:t>
+              <a:t>Jerrel Blankenship</a:t>
             </a:r>
           </a:p>
           <a:p>
@@ -5968,7 +5937,6 @@
               <a:rPr lang="en-US" sz="2400" dirty="0" smtClean="0"/>
               <a:t>Jerrel@jerrelblankenship.com</a:t>
             </a:r>
-            <a:endParaRPr lang="en-US" sz="2400" dirty="0" smtClean="0"/>
           </a:p>
           <a:p>
             <a:pPr algn="ctr">
@@ -6800,21 +6768,18 @@
           <a:bodyPr/>
           <a:lstStyle/>
           <a:p>
-            <a:pPr marL="0" indent="0"/>
             <a:r>
               <a:rPr lang="en-US" dirty="0" smtClean="0"/>
               <a:t>Open-source</a:t>
             </a:r>
           </a:p>
           <a:p>
-            <a:pPr marL="0" indent="0"/>
             <a:r>
               <a:rPr lang="en-US" dirty="0" smtClean="0"/>
               <a:t>Single codebase</a:t>
             </a:r>
           </a:p>
           <a:p>
-            <a:pPr marL="0" indent="0"/>
             <a:r>
               <a:rPr lang="en-US" dirty="0" smtClean="0"/>
               <a:t>Support for </a:t>
@@ -6961,14 +6926,16 @@
         </p:nvSpPr>
         <p:spPr/>
         <p:txBody>
-          <a:bodyPr/>
-          <a:lstStyle/>
-          <a:p>
-            <a:r>
-              <a:rPr lang="en-US" dirty="0" smtClean="0"/>
+          <a:bodyPr>
+            <a:normAutofit/>
+          </a:bodyPr>
+          <a:lstStyle/>
+          <a:p>
+            <a:r>
+              <a:rPr lang="en-US" sz="6600" dirty="0" smtClean="0"/>
               <a:t>Let’s Create an App!</a:t>
             </a:r>
-            <a:endParaRPr lang="en-US" dirty="0"/>
+            <a:endParaRPr lang="en-US" sz="6600" dirty="0"/>
           </a:p>
         </p:txBody>
       </p:sp>

</xml_diff>

<commit_message>
Added an emergency slide showing screenshots of emulators
</commit_message>
<xml_diff>
--- a/JointSpeakerTalks/PhoneGapXamarin/M3Conf2013/PhoneGap and Xamarin.pptx
+++ b/JointSpeakerTalks/PhoneGapXamarin/M3Conf2013/PhoneGap and Xamarin.pptx
@@ -5,7 +5,7 @@
     <p:sldMasterId id="2147483648" r:id="rId1"/>
   </p:sldMasterIdLst>
   <p:notesMasterIdLst>
-    <p:notesMasterId r:id="rId19"/>
+    <p:notesMasterId r:id="rId20"/>
   </p:notesMasterIdLst>
   <p:sldIdLst>
     <p:sldId id="256" r:id="rId2"/>
@@ -25,6 +25,7 @@
     <p:sldId id="278" r:id="rId16"/>
     <p:sldId id="274" r:id="rId17"/>
     <p:sldId id="271" r:id="rId18"/>
+    <p:sldId id="280" r:id="rId19"/>
   </p:sldIdLst>
   <p:sldSz cx="9144000" cy="6858000" type="screen4x3"/>
   <p:notesSz cx="6858000" cy="9144000"/>
@@ -225,7 +226,7 @@
             <a:fld id="{3471AF3C-204D-4F74-AA97-D43D4FF73362}" type="datetimeFigureOut">
               <a:rPr lang="en-US" smtClean="0"/>
               <a:pPr/>
-              <a:t>10/24/2013</a:t>
+              <a:t>10/25/2013</a:t>
             </a:fld>
             <a:endParaRPr lang="en-US"/>
           </a:p>
@@ -1883,7 +1884,7 @@
             <a:fld id="{8B3E8EF2-3A3D-4AB5-885C-BDF5384941A8}" type="datetimeFigureOut">
               <a:rPr lang="en-US" smtClean="0"/>
               <a:pPr/>
-              <a:t>10/24/2013</a:t>
+              <a:t>10/25/2013</a:t>
             </a:fld>
             <a:endParaRPr lang="en-US"/>
           </a:p>
@@ -2050,7 +2051,7 @@
             <a:fld id="{8B3E8EF2-3A3D-4AB5-885C-BDF5384941A8}" type="datetimeFigureOut">
               <a:rPr lang="en-US" smtClean="0"/>
               <a:pPr/>
-              <a:t>10/24/2013</a:t>
+              <a:t>10/25/2013</a:t>
             </a:fld>
             <a:endParaRPr lang="en-US"/>
           </a:p>
@@ -2227,7 +2228,7 @@
             <a:fld id="{8B3E8EF2-3A3D-4AB5-885C-BDF5384941A8}" type="datetimeFigureOut">
               <a:rPr lang="en-US" smtClean="0"/>
               <a:pPr/>
-              <a:t>10/24/2013</a:t>
+              <a:t>10/25/2013</a:t>
             </a:fld>
             <a:endParaRPr lang="en-US"/>
           </a:p>
@@ -2394,7 +2395,7 @@
             <a:fld id="{8B3E8EF2-3A3D-4AB5-885C-BDF5384941A8}" type="datetimeFigureOut">
               <a:rPr lang="en-US" smtClean="0"/>
               <a:pPr/>
-              <a:t>10/24/2013</a:t>
+              <a:t>10/25/2013</a:t>
             </a:fld>
             <a:endParaRPr lang="en-US"/>
           </a:p>
@@ -2637,7 +2638,7 @@
             <a:fld id="{8B3E8EF2-3A3D-4AB5-885C-BDF5384941A8}" type="datetimeFigureOut">
               <a:rPr lang="en-US" smtClean="0"/>
               <a:pPr/>
-              <a:t>10/24/2013</a:t>
+              <a:t>10/25/2013</a:t>
             </a:fld>
             <a:endParaRPr lang="en-US"/>
           </a:p>
@@ -2922,7 +2923,7 @@
             <a:fld id="{8B3E8EF2-3A3D-4AB5-885C-BDF5384941A8}" type="datetimeFigureOut">
               <a:rPr lang="en-US" smtClean="0"/>
               <a:pPr/>
-              <a:t>10/24/2013</a:t>
+              <a:t>10/25/2013</a:t>
             </a:fld>
             <a:endParaRPr lang="en-US"/>
           </a:p>
@@ -3341,7 +3342,7 @@
             <a:fld id="{8B3E8EF2-3A3D-4AB5-885C-BDF5384941A8}" type="datetimeFigureOut">
               <a:rPr lang="en-US" smtClean="0"/>
               <a:pPr/>
-              <a:t>10/24/2013</a:t>
+              <a:t>10/25/2013</a:t>
             </a:fld>
             <a:endParaRPr lang="en-US"/>
           </a:p>
@@ -3456,7 +3457,7 @@
             <a:fld id="{8B3E8EF2-3A3D-4AB5-885C-BDF5384941A8}" type="datetimeFigureOut">
               <a:rPr lang="en-US" smtClean="0"/>
               <a:pPr/>
-              <a:t>10/24/2013</a:t>
+              <a:t>10/25/2013</a:t>
             </a:fld>
             <a:endParaRPr lang="en-US"/>
           </a:p>
@@ -3548,7 +3549,7 @@
             <a:fld id="{8B3E8EF2-3A3D-4AB5-885C-BDF5384941A8}" type="datetimeFigureOut">
               <a:rPr lang="en-US" smtClean="0"/>
               <a:pPr/>
-              <a:t>10/24/2013</a:t>
+              <a:t>10/25/2013</a:t>
             </a:fld>
             <a:endParaRPr lang="en-US"/>
           </a:p>
@@ -3822,7 +3823,7 @@
             <a:fld id="{8B3E8EF2-3A3D-4AB5-885C-BDF5384941A8}" type="datetimeFigureOut">
               <a:rPr lang="en-US" smtClean="0"/>
               <a:pPr/>
-              <a:t>10/24/2013</a:t>
+              <a:t>10/25/2013</a:t>
             </a:fld>
             <a:endParaRPr lang="en-US"/>
           </a:p>
@@ -4072,7 +4073,7 @@
             <a:fld id="{8B3E8EF2-3A3D-4AB5-885C-BDF5384941A8}" type="datetimeFigureOut">
               <a:rPr lang="en-US" smtClean="0"/>
               <a:pPr/>
-              <a:t>10/24/2013</a:t>
+              <a:t>10/25/2013</a:t>
             </a:fld>
             <a:endParaRPr lang="en-US"/>
           </a:p>
@@ -4282,7 +4283,7 @@
             <a:fld id="{8B3E8EF2-3A3D-4AB5-885C-BDF5384941A8}" type="datetimeFigureOut">
               <a:rPr lang="en-US" smtClean="0"/>
               <a:pPr/>
-              <a:t>10/24/2013</a:t>
+              <a:t>10/25/2013</a:t>
             </a:fld>
             <a:endParaRPr lang="en-US"/>
           </a:p>
@@ -6219,6 +6220,172 @@
         </p:txBody>
       </p:sp>
     </p:spTree>
+  </p:cSld>
+  <p:clrMapOvr>
+    <a:masterClrMapping/>
+  </p:clrMapOvr>
+  <p:timing>
+    <p:tnLst>
+      <p:par>
+        <p:cTn id="1" dur="indefinite" restart="never" nodeType="tmRoot"/>
+      </p:par>
+    </p:tnLst>
+  </p:timing>
+</p:sld>
+</file>
+
+<file path=ppt/slides/slide18.xml><?xml version="1.0" encoding="utf-8"?>
+<p:sld xmlns:a="http://schemas.openxmlformats.org/drawingml/2006/main" xmlns:r="http://schemas.openxmlformats.org/officeDocument/2006/relationships" xmlns:p="http://schemas.openxmlformats.org/presentationml/2006/main">
+  <p:cSld>
+    <p:spTree>
+      <p:nvGrpSpPr>
+        <p:cNvPr id="1" name=""/>
+        <p:cNvGrpSpPr/>
+        <p:nvPr/>
+      </p:nvGrpSpPr>
+      <p:grpSpPr>
+        <a:xfrm>
+          <a:off x="0" y="0"/>
+          <a:ext cx="0" cy="0"/>
+          <a:chOff x="0" y="0"/>
+          <a:chExt cx="0" cy="0"/>
+        </a:xfrm>
+      </p:grpSpPr>
+      <p:sp>
+        <p:nvSpPr>
+          <p:cNvPr id="2" name="Title 1"/>
+          <p:cNvSpPr>
+            <a:spLocks noGrp="1"/>
+          </p:cNvSpPr>
+          <p:nvPr>
+            <p:ph type="title"/>
+          </p:nvPr>
+        </p:nvSpPr>
+        <p:spPr/>
+        <p:txBody>
+          <a:bodyPr/>
+          <a:lstStyle/>
+          <a:p>
+            <a:r>
+              <a:rPr lang="en-US" dirty="0" smtClean="0"/>
+              <a:t>Xamarin App Comparison</a:t>
+            </a:r>
+            <a:endParaRPr lang="en-US" dirty="0"/>
+          </a:p>
+        </p:txBody>
+      </p:sp>
+      <p:sp>
+        <p:nvSpPr>
+          <p:cNvPr id="4" name="Text Placeholder 3"/>
+          <p:cNvSpPr>
+            <a:spLocks noGrp="1"/>
+          </p:cNvSpPr>
+          <p:nvPr>
+            <p:ph type="body" idx="1"/>
+          </p:nvPr>
+        </p:nvSpPr>
+        <p:spPr/>
+        <p:txBody>
+          <a:bodyPr/>
+          <a:lstStyle/>
+          <a:p>
+            <a:pPr algn="ctr"/>
+            <a:r>
+              <a:rPr lang="en-US" dirty="0" smtClean="0"/>
+              <a:t>Windows Phone 8</a:t>
+            </a:r>
+            <a:endParaRPr lang="en-US" dirty="0"/>
+          </a:p>
+        </p:txBody>
+      </p:sp>
+      <p:pic>
+        <p:nvPicPr>
+          <p:cNvPr id="8" name="Content Placeholder 7"/>
+          <p:cNvPicPr>
+            <a:picLocks noGrp="1" noChangeAspect="1"/>
+          </p:cNvPicPr>
+          <p:nvPr>
+            <p:ph sz="half" idx="2"/>
+          </p:nvPr>
+        </p:nvPicPr>
+        <p:blipFill>
+          <a:blip r:embed="rId2">
+            <a:extLst>
+              <a:ext uri="{28A0092B-C50C-407E-A947-70E740481C1C}">
+                <a14:useLocalDpi xmlns:a14="http://schemas.microsoft.com/office/drawing/2010/main" val="0"/>
+              </a:ext>
+            </a:extLst>
+          </a:blip>
+          <a:stretch>
+            <a:fillRect/>
+          </a:stretch>
+        </p:blipFill>
+        <p:spPr>
+          <a:xfrm>
+            <a:off x="1291908" y="2174875"/>
+            <a:ext cx="2370772" cy="3951288"/>
+          </a:xfrm>
+        </p:spPr>
+      </p:pic>
+      <p:sp>
+        <p:nvSpPr>
+          <p:cNvPr id="6" name="Text Placeholder 5"/>
+          <p:cNvSpPr>
+            <a:spLocks noGrp="1"/>
+          </p:cNvSpPr>
+          <p:nvPr>
+            <p:ph type="body" sz="quarter" idx="3"/>
+          </p:nvPr>
+        </p:nvSpPr>
+        <p:spPr/>
+        <p:txBody>
+          <a:bodyPr/>
+          <a:lstStyle/>
+          <a:p>
+            <a:pPr algn="ctr"/>
+            <a:r>
+              <a:rPr lang="en-US" dirty="0" smtClean="0"/>
+              <a:t>Android</a:t>
+            </a:r>
+            <a:endParaRPr lang="en-US" dirty="0"/>
+          </a:p>
+        </p:txBody>
+      </p:sp>
+      <p:pic>
+        <p:nvPicPr>
+          <p:cNvPr id="9" name="Content Placeholder 8"/>
+          <p:cNvPicPr>
+            <a:picLocks noGrp="1" noChangeAspect="1"/>
+          </p:cNvPicPr>
+          <p:nvPr>
+            <p:ph sz="quarter" idx="4"/>
+          </p:nvPr>
+        </p:nvPicPr>
+        <p:blipFill>
+          <a:blip r:embed="rId3">
+            <a:extLst>
+              <a:ext uri="{28A0092B-C50C-407E-A947-70E740481C1C}">
+                <a14:useLocalDpi xmlns:a14="http://schemas.microsoft.com/office/drawing/2010/main" val="0"/>
+              </a:ext>
+            </a:extLst>
+          </a:blip>
+          <a:stretch>
+            <a:fillRect/>
+          </a:stretch>
+        </p:blipFill>
+        <p:spPr>
+          <a:xfrm>
+            <a:off x="5486400" y="2174875"/>
+            <a:ext cx="2472609" cy="3951288"/>
+          </a:xfrm>
+        </p:spPr>
+      </p:pic>
+    </p:spTree>
+    <p:extLst>
+      <p:ext uri="{BB962C8B-B14F-4D97-AF65-F5344CB8AC3E}">
+        <p14:creationId xmlns:p14="http://schemas.microsoft.com/office/powerpoint/2010/main" val="2878373410"/>
+      </p:ext>
+    </p:extLst>
   </p:cSld>
   <p:clrMapOvr>
     <a:masterClrMapping/>

</xml_diff>

<commit_message>
Moving my javascript locally. Un-italicized some stuff on the slides
</commit_message>
<xml_diff>
--- a/JointSpeakerTalks/PhoneGapXamarin/M3Conf2013/PhoneGap and Xamarin.pptx
+++ b/JointSpeakerTalks/PhoneGapXamarin/M3Conf2013/PhoneGap and Xamarin.pptx
@@ -126,7 +126,7 @@
   </p:defaultTextStyle>
   <p:extLst>
     <p:ext uri="{EFAFB233-063F-42B5-8137-9DF3F51BA10A}">
-      <p15:sldGuideLst xmlns:p15="http://schemas.microsoft.com/office/powerpoint/2012/main">
+      <p15:sldGuideLst xmlns:p15="http://schemas.microsoft.com/office/powerpoint/2012/main" xmlns="">
         <p15:guide id="1" orient="horz" pos="2160">
           <p15:clr>
             <a:srgbClr val="A4A3A4"/>
@@ -397,7 +397,7 @@
     </p:spTree>
     <p:extLst>
       <p:ext uri="{BB962C8B-B14F-4D97-AF65-F5344CB8AC3E}">
-        <p14:creationId xmlns:p14="http://schemas.microsoft.com/office/powerpoint/2010/main" val="1411853916"/>
+        <p14:creationId xmlns:p14="http://schemas.microsoft.com/office/powerpoint/2010/main" xmlns="" val="1411853916"/>
       </p:ext>
     </p:extLst>
   </p:cSld>
@@ -572,7 +572,7 @@
     </p:spTree>
     <p:extLst>
       <p:ext uri="{BB962C8B-B14F-4D97-AF65-F5344CB8AC3E}">
-        <p14:creationId xmlns:p14="http://schemas.microsoft.com/office/powerpoint/2010/main" val="2015088538"/>
+        <p14:creationId xmlns:p14="http://schemas.microsoft.com/office/powerpoint/2010/main" xmlns="" val="2015088538"/>
       </p:ext>
     </p:extLst>
   </p:cSld>
@@ -659,7 +659,7 @@
     </p:spTree>
     <p:extLst>
       <p:ext uri="{BB962C8B-B14F-4D97-AF65-F5344CB8AC3E}">
-        <p14:creationId xmlns:p14="http://schemas.microsoft.com/office/powerpoint/2010/main" val="3453155578"/>
+        <p14:creationId xmlns:p14="http://schemas.microsoft.com/office/powerpoint/2010/main" xmlns="" val="3453155578"/>
       </p:ext>
     </p:extLst>
   </p:cSld>
@@ -746,7 +746,7 @@
     </p:spTree>
     <p:extLst>
       <p:ext uri="{BB962C8B-B14F-4D97-AF65-F5344CB8AC3E}">
-        <p14:creationId xmlns:p14="http://schemas.microsoft.com/office/powerpoint/2010/main" val="2469189636"/>
+        <p14:creationId xmlns:p14="http://schemas.microsoft.com/office/powerpoint/2010/main" xmlns="" val="2469189636"/>
       </p:ext>
     </p:extLst>
   </p:cSld>
@@ -831,7 +831,7 @@
     </p:spTree>
     <p:extLst>
       <p:ext uri="{BB962C8B-B14F-4D97-AF65-F5344CB8AC3E}">
-        <p14:creationId xmlns:p14="http://schemas.microsoft.com/office/powerpoint/2010/main" val="837323356"/>
+        <p14:creationId xmlns:p14="http://schemas.microsoft.com/office/powerpoint/2010/main" xmlns="" val="837323356"/>
       </p:ext>
     </p:extLst>
   </p:cSld>
@@ -918,7 +918,7 @@
     </p:spTree>
     <p:extLst>
       <p:ext uri="{BB962C8B-B14F-4D97-AF65-F5344CB8AC3E}">
-        <p14:creationId xmlns:p14="http://schemas.microsoft.com/office/powerpoint/2010/main" val="3078225192"/>
+        <p14:creationId xmlns:p14="http://schemas.microsoft.com/office/powerpoint/2010/main" xmlns="" val="3078225192"/>
       </p:ext>
     </p:extLst>
   </p:cSld>
@@ -974,114 +974,6 @@
           </a:bodyPr>
           <a:lstStyle/>
           <a:p>
-            <a:pPr marL="0" marR="0" indent="0" algn="l" defTabSz="914400" rtl="0" eaLnBrk="1" fontAlgn="auto" latinLnBrk="0" hangingPunct="1">
-              <a:lnSpc>
-                <a:spcPct val="100000"/>
-              </a:lnSpc>
-              <a:spcBef>
-                <a:spcPts val="0"/>
-              </a:spcBef>
-              <a:spcAft>
-                <a:spcPts val="0"/>
-              </a:spcAft>
-              <a:buClrTx/>
-              <a:buSzTx/>
-              <a:buFontTx/>
-              <a:buNone/>
-              <a:tabLst/>
-              <a:defRPr/>
-            </a:pPr>
-            <a:r>
-              <a:rPr lang="en-US" dirty="0" smtClean="0"/>
-              <a:t>Essentially, this is what the </a:t>
-            </a:r>
-            <a:r>
-              <a:rPr lang="en-US" dirty="0" err="1" smtClean="0"/>
-              <a:t>PhoneGap</a:t>
-            </a:r>
-            <a:r>
-              <a:rPr lang="en-US" dirty="0" smtClean="0"/>
-              <a:t> application creation process looks like.  You take your IDE of choice as well as the </a:t>
-            </a:r>
-            <a:r>
-              <a:rPr lang="en-US" dirty="0" err="1" smtClean="0"/>
-              <a:t>javascript</a:t>
-            </a:r>
-            <a:r>
-              <a:rPr lang="en-US" dirty="0" smtClean="0"/>
-              <a:t> libraries you know and love, like</a:t>
-            </a:r>
-            <a:r>
-              <a:rPr lang="en-US" baseline="0" dirty="0" smtClean="0"/>
-              <a:t> </a:t>
-            </a:r>
-            <a:r>
-              <a:rPr lang="en-US" baseline="0" dirty="0" err="1" smtClean="0"/>
-              <a:t>jQuery</a:t>
-            </a:r>
-            <a:r>
-              <a:rPr lang="en-US" baseline="0" dirty="0" smtClean="0"/>
-              <a:t> mobile.  You create one codebase, thereby eliminating the maintenance nightmares we face with redundant codebases.  You wrap your html, </a:t>
-            </a:r>
-            <a:r>
-              <a:rPr lang="en-US" baseline="0" dirty="0" err="1" smtClean="0"/>
-              <a:t>css</a:t>
-            </a:r>
-            <a:r>
-              <a:rPr lang="en-US" baseline="0" dirty="0" smtClean="0"/>
-              <a:t>, and </a:t>
-            </a:r>
-            <a:r>
-              <a:rPr lang="en-US" baseline="0" dirty="0" err="1" smtClean="0"/>
-              <a:t>javascript</a:t>
-            </a:r>
-            <a:r>
-              <a:rPr lang="en-US" baseline="0" dirty="0" smtClean="0"/>
-              <a:t> files with </a:t>
-            </a:r>
-            <a:r>
-              <a:rPr lang="en-US" baseline="0" dirty="0" err="1" smtClean="0"/>
-              <a:t>PhoneGap</a:t>
-            </a:r>
-            <a:r>
-              <a:rPr lang="en-US" baseline="0" dirty="0" smtClean="0"/>
-              <a:t>, and you can take advantage of the </a:t>
-            </a:r>
-            <a:r>
-              <a:rPr lang="en-US" baseline="0" dirty="0" err="1" smtClean="0"/>
-              <a:t>PhoneGap</a:t>
-            </a:r>
-            <a:r>
-              <a:rPr lang="en-US" baseline="0" dirty="0" smtClean="0"/>
-              <a:t> </a:t>
-            </a:r>
-            <a:r>
-              <a:rPr lang="en-US" baseline="0" dirty="0" err="1" smtClean="0"/>
-              <a:t>plugins</a:t>
-            </a:r>
-            <a:r>
-              <a:rPr lang="en-US" baseline="0" dirty="0" smtClean="0"/>
-              <a:t> that interact with your device’s capabilities, like the camera and </a:t>
-            </a:r>
-            <a:r>
-              <a:rPr lang="en-US" baseline="0" dirty="0" err="1" smtClean="0"/>
-              <a:t>geolocation</a:t>
-            </a:r>
-            <a:r>
-              <a:rPr lang="en-US" baseline="0" dirty="0" smtClean="0"/>
-              <a:t> services.  You send your app to </a:t>
-            </a:r>
-            <a:r>
-              <a:rPr lang="en-US" baseline="0" dirty="0" err="1" smtClean="0"/>
-              <a:t>PhoneGap</a:t>
-            </a:r>
-            <a:r>
-              <a:rPr lang="en-US" baseline="0" dirty="0" smtClean="0"/>
-              <a:t> build, and you end up with ready-to-submit app packages for each of the target platforms.</a:t>
-            </a:r>
-            <a:endParaRPr lang="en-US" dirty="0" smtClean="0"/>
-          </a:p>
-          <a:p>
             <a:endParaRPr lang="en-US" dirty="0"/>
           </a:p>
         </p:txBody>
@@ -1113,7 +1005,7 @@
     </p:spTree>
     <p:extLst>
       <p:ext uri="{BB962C8B-B14F-4D97-AF65-F5344CB8AC3E}">
-        <p14:creationId xmlns:p14="http://schemas.microsoft.com/office/powerpoint/2010/main" val="3095546884"/>
+        <p14:creationId xmlns:p14="http://schemas.microsoft.com/office/powerpoint/2010/main" xmlns="" val="3095546884"/>
       </p:ext>
     </p:extLst>
   </p:cSld>
@@ -1460,7 +1352,7 @@
     </p:spTree>
     <p:extLst>
       <p:ext uri="{BB962C8B-B14F-4D97-AF65-F5344CB8AC3E}">
-        <p14:creationId xmlns:p14="http://schemas.microsoft.com/office/powerpoint/2010/main" val="4113876280"/>
+        <p14:creationId xmlns:p14="http://schemas.microsoft.com/office/powerpoint/2010/main" xmlns="" val="4113876280"/>
       </p:ext>
     </p:extLst>
   </p:cSld>
@@ -1516,36 +1408,7 @@
           </a:bodyPr>
           <a:lstStyle/>
           <a:p>
-            <a:r>
-              <a:rPr lang="en-US" dirty="0" smtClean="0"/>
-              <a:t>Jamie: Now</a:t>
-            </a:r>
-            <a:r>
-              <a:rPr lang="en-US" baseline="0" dirty="0" smtClean="0"/>
-              <a:t> that we’ve shown you two tools for cross-platform mobile development, the question becomes “which one should I use?”</a:t>
-            </a:r>
-          </a:p>
-          <a:p>
             <a:endParaRPr lang="en-US" baseline="0" dirty="0" smtClean="0"/>
-          </a:p>
-          <a:p>
-            <a:r>
-              <a:rPr lang="en-US" baseline="0" dirty="0" err="1" smtClean="0"/>
-              <a:t>Jerrel</a:t>
-            </a:r>
-            <a:r>
-              <a:rPr lang="en-US" baseline="0" dirty="0" smtClean="0"/>
-              <a:t>: Clearly, both of these tools allow you to easily create an app to deploy to all of the major app stores, so it really comes down to what you’re trying to accomplish.</a:t>
-            </a:r>
-          </a:p>
-          <a:p>
-            <a:endParaRPr lang="en-US" baseline="0" dirty="0" smtClean="0"/>
-          </a:p>
-          <a:p>
-            <a:r>
-              <a:rPr lang="en-US" baseline="0" dirty="0" smtClean="0"/>
-              <a:t>Jamie: Let’s take a look at the advantages and disadvantages of each.</a:t>
-            </a:r>
           </a:p>
         </p:txBody>
       </p:sp>
@@ -1576,7 +1439,7 @@
     </p:spTree>
     <p:extLst>
       <p:ext uri="{BB962C8B-B14F-4D97-AF65-F5344CB8AC3E}">
-        <p14:creationId xmlns:p14="http://schemas.microsoft.com/office/powerpoint/2010/main" val="3915659578"/>
+        <p14:creationId xmlns:p14="http://schemas.microsoft.com/office/powerpoint/2010/main" xmlns="" val="3915659578"/>
       </p:ext>
     </p:extLst>
   </p:cSld>
@@ -1692,7 +1555,7 @@
     </p:spTree>
     <p:extLst>
       <p:ext uri="{BB962C8B-B14F-4D97-AF65-F5344CB8AC3E}">
-        <p14:creationId xmlns:p14="http://schemas.microsoft.com/office/powerpoint/2010/main" val="1688177331"/>
+        <p14:creationId xmlns:p14="http://schemas.microsoft.com/office/powerpoint/2010/main" xmlns="" val="1688177331"/>
       </p:ext>
     </p:extLst>
   </p:cSld>
@@ -4829,10 +4692,10 @@
           <p:nvPr/>
         </p:nvPicPr>
         <p:blipFill>
-          <a:blip r:embed="rId3">
+          <a:blip r:embed="rId3" cstate="print">
             <a:extLst>
               <a:ext uri="{28A0092B-C50C-407E-A947-70E740481C1C}">
-                <a14:useLocalDpi xmlns:a14="http://schemas.microsoft.com/office/drawing/2010/main" val="0"/>
+                <a14:useLocalDpi xmlns:a14="http://schemas.microsoft.com/office/drawing/2010/main" xmlns="" val="0"/>
               </a:ext>
             </a:extLst>
           </a:blip>
@@ -4853,7 +4716,7 @@
     </p:spTree>
     <p:extLst>
       <p:ext uri="{BB962C8B-B14F-4D97-AF65-F5344CB8AC3E}">
-        <p14:creationId xmlns:p14="http://schemas.microsoft.com/office/powerpoint/2010/main" val="4125018363"/>
+        <p14:creationId xmlns:p14="http://schemas.microsoft.com/office/powerpoint/2010/main" xmlns="" val="4125018363"/>
       </p:ext>
     </p:extLst>
   </p:cSld>
@@ -5029,7 +4892,7 @@
     </p:spTree>
     <p:extLst>
       <p:ext uri="{BB962C8B-B14F-4D97-AF65-F5344CB8AC3E}">
-        <p14:creationId xmlns:p14="http://schemas.microsoft.com/office/powerpoint/2010/main" val="4006129889"/>
+        <p14:creationId xmlns:p14="http://schemas.microsoft.com/office/powerpoint/2010/main" xmlns="" val="4006129889"/>
       </p:ext>
     </p:extLst>
   </p:cSld>
@@ -5218,7 +5081,7 @@
     </p:spTree>
     <p:extLst>
       <p:ext uri="{BB962C8B-B14F-4D97-AF65-F5344CB8AC3E}">
-        <p14:creationId xmlns:p14="http://schemas.microsoft.com/office/powerpoint/2010/main" val="4136638121"/>
+        <p14:creationId xmlns:p14="http://schemas.microsoft.com/office/powerpoint/2010/main" xmlns="" val="4136638121"/>
       </p:ext>
     </p:extLst>
   </p:cSld>
@@ -5825,7 +5688,7 @@
           <a:blip r:embed="rId2" cstate="print">
             <a:extLst>
               <a:ext uri="{28A0092B-C50C-407E-A947-70E740481C1C}">
-                <a14:useLocalDpi xmlns:a14="http://schemas.microsoft.com/office/drawing/2010/main" val="0"/>
+                <a14:useLocalDpi xmlns:a14="http://schemas.microsoft.com/office/drawing/2010/main" xmlns="" val="0"/>
               </a:ext>
             </a:extLst>
           </a:blip>
@@ -5843,7 +5706,7 @@
     </p:spTree>
     <p:extLst>
       <p:ext uri="{BB962C8B-B14F-4D97-AF65-F5344CB8AC3E}">
-        <p14:creationId xmlns:p14="http://schemas.microsoft.com/office/powerpoint/2010/main" val="1309489257"/>
+        <p14:creationId xmlns:p14="http://schemas.microsoft.com/office/powerpoint/2010/main" xmlns="" val="1309489257"/>
       </p:ext>
     </p:extLst>
   </p:cSld>
@@ -6080,7 +5943,7 @@
     </p:spTree>
     <p:extLst>
       <p:ext uri="{BB962C8B-B14F-4D97-AF65-F5344CB8AC3E}">
-        <p14:creationId xmlns:p14="http://schemas.microsoft.com/office/powerpoint/2010/main" val="4141454704"/>
+        <p14:creationId xmlns:p14="http://schemas.microsoft.com/office/powerpoint/2010/main" xmlns="" val="4141454704"/>
       </p:ext>
     </p:extLst>
   </p:cSld>
@@ -6176,39 +6039,16 @@
               <a:rPr lang="en-US" dirty="0" err="1" smtClean="0"/>
               <a:t>Shimomae</a:t>
             </a:r>
-            <a:endParaRPr lang="en-US" dirty="0" smtClean="0"/>
-          </a:p>
-          <a:p>
+            <a:endParaRPr lang="en-US" smtClean="0"/>
+          </a:p>
+          <a:p>
+            <a:r>
+              <a:rPr lang="en-US" smtClean="0"/>
+              <a:t>Smart </a:t>
+            </a:r>
             <a:r>
               <a:rPr lang="en-US" dirty="0" smtClean="0"/>
-              <a:t>Diagram - </a:t>
-            </a:r>
-            <a:r>
-              <a:rPr lang="en-US" dirty="0" err="1" smtClean="0"/>
-              <a:t>PhoneGap</a:t>
-            </a:r>
-            <a:r>
-              <a:rPr lang="en-US" dirty="0" smtClean="0"/>
-              <a:t> Build by Adobe / </a:t>
-            </a:r>
-            <a:r>
-              <a:rPr lang="en-US" dirty="0" err="1" smtClean="0"/>
-              <a:t>Yohei</a:t>
-            </a:r>
-            <a:r>
-              <a:rPr lang="en-US" dirty="0" smtClean="0"/>
-              <a:t> </a:t>
-            </a:r>
-            <a:r>
-              <a:rPr lang="en-US" dirty="0" err="1" smtClean="0"/>
-              <a:t>Shimomae</a:t>
-            </a:r>
-            <a:endParaRPr lang="en-US" dirty="0" smtClean="0"/>
-          </a:p>
-          <a:p>
-            <a:r>
-              <a:rPr lang="en-US" dirty="0" smtClean="0"/>
-              <a:t>Smart Phone, Tablet, and PC – The Droid Guy</a:t>
+              <a:t>Phone, Tablet, and PC – The Droid Guy</a:t>
             </a:r>
           </a:p>
           <a:p>
@@ -6309,10 +6149,10 @@
           </p:nvPr>
         </p:nvPicPr>
         <p:blipFill>
-          <a:blip r:embed="rId2">
+          <a:blip r:embed="rId2" cstate="print">
             <a:extLst>
               <a:ext uri="{28A0092B-C50C-407E-A947-70E740481C1C}">
-                <a14:useLocalDpi xmlns:a14="http://schemas.microsoft.com/office/drawing/2010/main" val="0"/>
+                <a14:useLocalDpi xmlns:a14="http://schemas.microsoft.com/office/drawing/2010/main" xmlns="" val="0"/>
               </a:ext>
             </a:extLst>
           </a:blip>
@@ -6362,10 +6202,10 @@
           </p:nvPr>
         </p:nvPicPr>
         <p:blipFill>
-          <a:blip r:embed="rId3">
+          <a:blip r:embed="rId3" cstate="print">
             <a:extLst>
               <a:ext uri="{28A0092B-C50C-407E-A947-70E740481C1C}">
-                <a14:useLocalDpi xmlns:a14="http://schemas.microsoft.com/office/drawing/2010/main" val="0"/>
+                <a14:useLocalDpi xmlns:a14="http://schemas.microsoft.com/office/drawing/2010/main" xmlns="" val="0"/>
               </a:ext>
             </a:extLst>
           </a:blip>
@@ -6383,7 +6223,7 @@
     </p:spTree>
     <p:extLst>
       <p:ext uri="{BB962C8B-B14F-4D97-AF65-F5344CB8AC3E}">
-        <p14:creationId xmlns:p14="http://schemas.microsoft.com/office/powerpoint/2010/main" val="2878373410"/>
+        <p14:creationId xmlns:p14="http://schemas.microsoft.com/office/powerpoint/2010/main" xmlns="" val="2878373410"/>
       </p:ext>
     </p:extLst>
   </p:cSld>
@@ -6498,16 +6338,15 @@
           </a:p>
           <a:p>
             <a:r>
-              <a:rPr lang="en-US" i="1" dirty="0"/>
+              <a:rPr lang="en-US" dirty="0"/>
               <a:t>Striving Software Craftsman</a:t>
             </a:r>
           </a:p>
           <a:p>
             <a:r>
-              <a:rPr lang="en-US" i="1" dirty="0"/>
+              <a:rPr lang="en-US" dirty="0"/>
               <a:t>Certified Scrum Master</a:t>
             </a:r>
-            <a:endParaRPr lang="en-US" dirty="0"/>
           </a:p>
           <a:p>
             <a:pPr algn="ctr">
@@ -6560,8 +6399,13 @@
           <a:p>
             <a:r>
               <a:rPr lang="en-US" dirty="0" smtClean="0"/>
-              <a:t>Software developer and team lead at McKesson-RelayHealth</a:t>
-            </a:r>
+              <a:t>Software developer and team lead at </a:t>
+            </a:r>
+            <a:r>
+              <a:rPr lang="en-US" dirty="0" err="1" smtClean="0"/>
+              <a:t>RelayHealth</a:t>
+            </a:r>
+            <a:endParaRPr lang="en-US" dirty="0" smtClean="0"/>
           </a:p>
           <a:p>
             <a:r>
@@ -6798,7 +6642,7 @@
     </p:spTree>
     <p:extLst>
       <p:ext uri="{BB962C8B-B14F-4D97-AF65-F5344CB8AC3E}">
-        <p14:creationId xmlns:p14="http://schemas.microsoft.com/office/powerpoint/2010/main" val="1918943846"/>
+        <p14:creationId xmlns:p14="http://schemas.microsoft.com/office/powerpoint/2010/main" xmlns="" val="1918943846"/>
       </p:ext>
     </p:extLst>
   </p:cSld>

</xml_diff>